<commit_message>
create new pptxs from quarto
</commit_message>
<xml_diff>
--- a/notebooks/21_summary_presentation.pptx
+++ b/notebooks/21_summary_presentation.pptx
@@ -8,6 +8,16 @@
     <p:sldId id="256" r:id="rId2"/>
     <p:sldId id="257" r:id="rId3"/>
     <p:sldId id="258" r:id="rId4"/>
+    <p:sldId id="259" r:id="rId5"/>
+    <p:sldId id="260" r:id="rId6"/>
+    <p:sldId id="261" r:id="rId7"/>
+    <p:sldId id="262" r:id="rId8"/>
+    <p:sldId id="263" r:id="rId9"/>
+    <p:sldId id="264" r:id="rId10"/>
+    <p:sldId id="265" r:id="rId11"/>
+    <p:sldId id="266" r:id="rId12"/>
+    <p:sldId id="267" r:id="rId13"/>
+    <p:sldId id="268" r:id="rId14"/>
   </p:sldIdLst>
   <p:sldSz cx="9144000" cy="5143500" type="screen16x9"/>
   <p:notesSz cx="6858000" cy="9144000"/>
@@ -3117,7 +3127,7 @@
             </a:pPr>
             <a:r>
               <a:rPr/>
-              <a:t>Education, Qualification and Health Effects Summary</a:t>
+              <a:t>Education/Qualification and Health Effects Summary</a:t>
             </a:r>
           </a:p>
         </p:txBody>
@@ -3154,6 +3164,1032 @@
           </a:p>
         </p:txBody>
       </p:sp>
+    </p:spTree>
+  </p:cSld>
+</p:sld>
+</file>
+
+<file path=ppt/slides/slide10.xml><?xml version="1.0" encoding="utf-8"?>
+<p:sld xmlns:a="http://schemas.openxmlformats.org/drawingml/2006/main" xmlns:r="http://schemas.openxmlformats.org/officeDocument/2006/relationships" xmlns:p="http://schemas.openxmlformats.org/presentationml/2006/main">
+  <p:cSld>
+    <p:spTree>
+      <p:nvGrpSpPr>
+        <p:cNvPr id="1" name=""/>
+        <p:cNvGrpSpPr/>
+        <p:nvPr/>
+      </p:nvGrpSpPr>
+      <p:grpSpPr>
+        <a:xfrm>
+          <a:off x="0" y="0"/>
+          <a:ext cx="0" cy="0"/>
+          <a:chOff x="0" y="0"/>
+          <a:chExt cx="0" cy="0"/>
+        </a:xfrm>
+      </p:grpSpPr>
+      <p:sp>
+        <p:nvSpPr>
+          <p:cNvPr id="2" name="Title 1"/>
+          <p:cNvSpPr>
+            <a:spLocks noGrp="1"/>
+          </p:cNvSpPr>
+          <p:nvPr>
+            <p:ph type="title"/>
+          </p:nvPr>
+        </p:nvSpPr>
+        <p:spPr/>
+        <p:txBody>
+          <a:bodyPr/>
+          <a:lstStyle/>
+          <a:p>
+            <a:pPr lvl="0" indent="0" marL="0">
+              <a:buNone/>
+            </a:pPr>
+            <a:r>
+              <a:rPr/>
+              <a:t>Dilemma</a:t>
+            </a:r>
+          </a:p>
+        </p:txBody>
+      </p:sp>
+      <p:sp>
+        <p:nvSpPr>
+          <p:cNvPr id="3" name="Content Placeholder 2"/>
+          <p:cNvSpPr>
+            <a:spLocks noGrp="1"/>
+          </p:cNvSpPr>
+          <p:nvPr>
+            <p:ph idx="1"/>
+          </p:nvPr>
+        </p:nvSpPr>
+        <p:spPr/>
+        <p:txBody>
+          <a:bodyPr/>
+          <a:lstStyle/>
+          <a:p>
+            <a:pPr lvl="0"/>
+            <a:r>
+              <a:rPr/>
+              <a:t>The models with the best penalised fit are those considering </a:t>
+            </a:r>
+            <a:r>
+              <a:rPr b="1"/>
+              <a:t>Qualifications</a:t>
+            </a:r>
+            <a:r>
+              <a:rPr/>
+              <a:t> and </a:t>
+            </a:r>
+            <a:r>
+              <a:rPr b="1"/>
+              <a:t>Health</a:t>
+            </a:r>
+            <a:r>
+              <a:rPr/>
+              <a:t> separately</a:t>
+            </a:r>
+          </a:p>
+          <a:p>
+            <a:pPr lvl="0"/>
+            <a:r>
+              <a:rPr/>
+              <a:t>The model with the worst penalised fit is that with both </a:t>
+            </a:r>
+            <a:r>
+              <a:rPr b="1"/>
+              <a:t>Qualifications</a:t>
+            </a:r>
+            <a:r>
+              <a:rPr/>
+              <a:t> </a:t>
+            </a:r>
+            <a:r>
+              <a:rPr i="1"/>
+              <a:t>and</a:t>
+            </a:r>
+            <a:r>
+              <a:rPr/>
+              <a:t> </a:t>
+            </a:r>
+            <a:r>
+              <a:rPr b="1"/>
+              <a:t>Health</a:t>
+            </a:r>
+            <a:r>
+              <a:rPr/>
+              <a:t>.</a:t>
+            </a:r>
+          </a:p>
+          <a:p>
+            <a:pPr lvl="0"/>
+            <a:r>
+              <a:rPr/>
+              <a:t>But we are interested in something like </a:t>
+            </a:r>
+            <a:r>
+              <a:rPr i="1"/>
+              <a:t>ceteris paribus</a:t>
+            </a:r>
+            <a:r>
+              <a:rPr/>
+              <a:t> effects of intervening on one variable but not the other</a:t>
+            </a:r>
+          </a:p>
+          <a:p>
+            <a:pPr lvl="0" indent="0" marL="0">
+              <a:buNone/>
+            </a:pPr>
+            <a:r>
+              <a:rPr/>
+              <a:t>We will present results from the Both model even though it has the poorest performance by these measures</a:t>
+            </a:r>
+          </a:p>
+        </p:txBody>
+      </p:sp>
+    </p:spTree>
+  </p:cSld>
+</p:sld>
+</file>
+
+<file path=ppt/slides/slide11.xml><?xml version="1.0" encoding="utf-8"?>
+<p:sld xmlns:a="http://schemas.openxmlformats.org/drawingml/2006/main" xmlns:r="http://schemas.openxmlformats.org/officeDocument/2006/relationships" xmlns:p="http://schemas.openxmlformats.org/presentationml/2006/main">
+  <p:cSld>
+    <p:spTree>
+      <p:nvGrpSpPr>
+        <p:cNvPr id="1" name=""/>
+        <p:cNvGrpSpPr/>
+        <p:nvPr/>
+      </p:nvGrpSpPr>
+      <p:grpSpPr>
+        <a:xfrm>
+          <a:off x="0" y="0"/>
+          <a:ext cx="0" cy="0"/>
+          <a:chOff x="0" y="0"/>
+          <a:chExt cx="0" cy="0"/>
+        </a:xfrm>
+      </p:grpSpPr>
+      <p:sp>
+        <p:nvSpPr>
+          <p:cNvPr id="2" name="Title 1"/>
+          <p:cNvSpPr>
+            <a:spLocks noGrp="1"/>
+          </p:cNvSpPr>
+          <p:nvPr>
+            <p:ph type="title"/>
+          </p:nvPr>
+        </p:nvSpPr>
+        <p:spPr/>
+        <p:txBody>
+          <a:bodyPr/>
+          <a:lstStyle/>
+          <a:p>
+            <a:pPr lvl="0" indent="0" marL="0">
+              <a:buNone/>
+            </a:pPr>
+            <a:r>
+              <a:rPr/>
+              <a:t>Representative data</a:t>
+            </a:r>
+          </a:p>
+        </p:txBody>
+      </p:sp>
+      <p:sp>
+        <p:nvSpPr>
+          <p:cNvPr id="3" name="Content Placeholder 2"/>
+          <p:cNvSpPr>
+            <a:spLocks noGrp="1"/>
+          </p:cNvSpPr>
+          <p:nvPr>
+            <p:ph idx="1"/>
+          </p:nvPr>
+        </p:nvSpPr>
+        <p:spPr/>
+        <p:txBody>
+          <a:bodyPr/>
+          <a:lstStyle/>
+          <a:p>
+            <a:pPr lvl="0"/>
+            <a:r>
+              <a:rPr/>
+              <a:t>Select wave J from UKHLS as it’s comparatively recent (and/but pre-pandemic)</a:t>
+            </a:r>
+          </a:p>
+          <a:p>
+            <a:pPr lvl="0" indent="0" marL="0">
+              <a:buNone/>
+            </a:pPr>
+            <a:r>
+              <a:rPr/>
+              <a:t>Now let’s calculate the scenarios</a:t>
+            </a:r>
+          </a:p>
+        </p:txBody>
+      </p:sp>
+    </p:spTree>
+  </p:cSld>
+</p:sld>
+</file>
+
+<file path=ppt/slides/slide12.xml><?xml version="1.0" encoding="utf-8"?>
+<p:sld xmlns:a="http://schemas.openxmlformats.org/drawingml/2006/main" xmlns:r="http://schemas.openxmlformats.org/officeDocument/2006/relationships" xmlns:p="http://schemas.openxmlformats.org/presentationml/2006/main">
+  <p:cSld>
+    <p:spTree>
+      <p:nvGrpSpPr>
+        <p:cNvPr id="1" name=""/>
+        <p:cNvGrpSpPr/>
+        <p:nvPr/>
+      </p:nvGrpSpPr>
+      <p:grpSpPr>
+        <a:xfrm>
+          <a:off x="0" y="0"/>
+          <a:ext cx="0" cy="0"/>
+          <a:chOff x="0" y="0"/>
+          <a:chExt cx="0" cy="0"/>
+        </a:xfrm>
+      </p:grpSpPr>
+      <p:sp>
+        <p:nvSpPr>
+          <p:cNvPr id="2" name="Title 1"/>
+          <p:cNvSpPr>
+            <a:spLocks noGrp="1"/>
+          </p:cNvSpPr>
+          <p:nvPr>
+            <p:ph type="title"/>
+          </p:nvPr>
+        </p:nvSpPr>
+        <p:spPr>
+          <a:xfrm>
+            <a:off x="457201" y="204787"/>
+            <a:ext cx="3008313" cy="871538"/>
+          </a:xfrm>
+        </p:spPr>
+        <p:txBody>
+          <a:bodyPr/>
+          <a:lstStyle/>
+          <a:p>
+            <a:pPr lvl="0" indent="0" marL="0">
+              <a:buNone/>
+            </a:pPr>
+            <a:r>
+              <a:rPr/>
+              <a:t>Relative change, plotted</a:t>
+            </a:r>
+          </a:p>
+        </p:txBody>
+      </p:sp>
+      <p:sp>
+        <p:nvSpPr>
+          <p:cNvPr id="4" name="Text Placeholder 3"/>
+          <p:cNvSpPr>
+            <a:spLocks noGrp="1"/>
+          </p:cNvSpPr>
+          <p:nvPr>
+            <p:ph idx="2" sz="half" type="body"/>
+          </p:nvPr>
+        </p:nvSpPr>
+        <p:spPr/>
+        <p:txBody>
+          <a:bodyPr/>
+          <a:lstStyle/>
+          <a:p>
+            <a:pPr lvl="0" indent="0" marL="0">
+              <a:buNone/>
+            </a:pPr>
+            <a:r>
+              <a:rPr/>
+              <a:t>Now let’s at least visualise this</a:t>
+            </a:r>
+          </a:p>
+        </p:txBody>
+      </p:sp>
+      <p:pic>
+        <p:nvPicPr>
+          <p:cNvPr descr="21_summary_presentation_files/figure-pptx/unnamed-chunk-6-1.png" id="0" name="Picture 1"/>
+          <p:cNvPicPr>
+            <a:picLocks noGrp="1" noChangeAspect="1"/>
+          </p:cNvPicPr>
+          <p:nvPr/>
+        </p:nvPicPr>
+        <p:blipFill>
+          <a:blip r:embed="rId2"/>
+          <a:stretch>
+            <a:fillRect/>
+          </a:stretch>
+        </p:blipFill>
+        <p:spPr bwMode="auto">
+          <a:xfrm>
+            <a:off x="3568700" y="1117600"/>
+            <a:ext cx="5105400" cy="2552700"/>
+          </a:xfrm>
+          <a:prstGeom prst="rect">
+            <a:avLst/>
+          </a:prstGeom>
+          <a:noFill/>
+          <a:ln w="9525">
+            <a:noFill/>
+            <a:headEnd/>
+            <a:tailEnd/>
+          </a:ln>
+        </p:spPr>
+      </p:pic>
+    </p:spTree>
+  </p:cSld>
+</p:sld>
+</file>
+
+<file path=ppt/slides/slide13.xml><?xml version="1.0" encoding="utf-8"?>
+<p:sld xmlns:a="http://schemas.openxmlformats.org/drawingml/2006/main" xmlns:r="http://schemas.openxmlformats.org/officeDocument/2006/relationships" xmlns:p="http://schemas.openxmlformats.org/presentationml/2006/main">
+  <p:cSld>
+    <p:spTree>
+      <p:nvGrpSpPr>
+        <p:cNvPr id="1" name=""/>
+        <p:cNvGrpSpPr/>
+        <p:nvPr/>
+      </p:nvGrpSpPr>
+      <p:grpSpPr>
+        <a:xfrm>
+          <a:off x="0" y="0"/>
+          <a:ext cx="0" cy="0"/>
+          <a:chOff x="0" y="0"/>
+          <a:chExt cx="0" cy="0"/>
+        </a:xfrm>
+      </p:grpSpPr>
+      <p:sp>
+        <p:nvSpPr>
+          <p:cNvPr id="2" name="Title 1"/>
+          <p:cNvSpPr>
+            <a:spLocks noGrp="1"/>
+          </p:cNvSpPr>
+          <p:nvPr>
+            <p:ph type="title"/>
+          </p:nvPr>
+        </p:nvSpPr>
+        <p:spPr/>
+        <p:txBody>
+          <a:bodyPr/>
+          <a:lstStyle/>
+          <a:p>
+            <a:pPr lvl="0" indent="0" marL="0">
+              <a:buNone/>
+            </a:pPr>
+            <a:r>
+              <a:rPr/>
+              <a:t>Relative change, as a table</a:t>
+            </a:r>
+          </a:p>
+        </p:txBody>
+      </p:sp>
+      <p:graphicFrame>
+        <p:nvGraphicFramePr>
+          <p:cNvPr id="6" name="Content Placeholder 5"/>
+          <p:cNvGraphicFramePr>
+            <a:graphicFrameLocks noGrp="1"/>
+          </p:cNvGraphicFramePr>
+          <p:nvPr>
+            <p:ph idx="1"/>
+          </p:nvPr>
+        </p:nvGraphicFramePr>
+        <p:xfrm>
+          <a:off x="457200" y="1193800"/>
+          <a:ext cx="8229600" cy="3390900"/>
+        </p:xfrm>
+        <a:graphic>
+          <a:graphicData uri="http://schemas.openxmlformats.org/drawingml/2006/table">
+            <a:tbl>
+              <a:tblPr firstRow="1" bandRow="1">
+                <a:tableStyleId>{5C22544A-7EE6-4342-B048-85BDC9FD1C3A}</a:tableStyleId>
+              </a:tblPr>
+              <a:tblGrid>
+                <a:gridCol w="1638300"/>
+                <a:gridCol w="1638300"/>
+                <a:gridCol w="1638300"/>
+                <a:gridCol w="1638300"/>
+                <a:gridCol w="1638300"/>
+              </a:tblGrid>
+              <a:tr h="0">
+                <a:tc>
+                  <a:txBody>
+                    <a:bodyPr/>
+                    <a:lstStyle/>
+                    <a:p>
+                      <a:pPr lvl="0" indent="0" marL="0" algn="l">
+                        <a:buNone/>
+                      </a:pPr>
+                      <a:r>
+                        <a:rPr/>
+                        <a:t>output</a:t>
+                      </a:r>
+                    </a:p>
+                  </a:txBody>
+                  <a:tcPr/>
+                </a:tc>
+                <a:tc>
+                  <a:txBody>
+                    <a:bodyPr/>
+                    <a:lstStyle/>
+                    <a:p>
+                      <a:pPr lvl="0" indent="0" marL="0" algn="l">
+                        <a:buNone/>
+                      </a:pPr>
+                      <a:r>
+                        <a:rPr/>
+                        <a:t>state</a:t>
+                      </a:r>
+                    </a:p>
+                  </a:txBody>
+                  <a:tcPr/>
+                </a:tc>
+                <a:tc>
+                  <a:txBody>
+                    <a:bodyPr/>
+                    <a:lstStyle/>
+                    <a:p>
+                      <a:pPr lvl="0" indent="0" marL="0" algn="r">
+                        <a:buNone/>
+                      </a:pPr>
+                      <a:r>
+                        <a:rPr/>
+                        <a:t>counter_health</a:t>
+                      </a:r>
+                    </a:p>
+                  </a:txBody>
+                  <a:tcPr/>
+                </a:tc>
+                <a:tc>
+                  <a:txBody>
+                    <a:bodyPr/>
+                    <a:lstStyle/>
+                    <a:p>
+                      <a:pPr lvl="0" indent="0" marL="0" algn="r">
+                        <a:buNone/>
+                      </a:pPr>
+                      <a:r>
+                        <a:rPr/>
+                        <a:t>counter_quals</a:t>
+                      </a:r>
+                    </a:p>
+                  </a:txBody>
+                  <a:tcPr/>
+                </a:tc>
+                <a:tc>
+                  <a:txBody>
+                    <a:bodyPr/>
+                    <a:lstStyle/>
+                    <a:p>
+                      <a:pPr lvl="0" indent="0" marL="0" algn="r">
+                        <a:buNone/>
+                      </a:pPr>
+                      <a:r>
+                        <a:rPr/>
+                        <a:t>counter_both</a:t>
+                      </a:r>
+                    </a:p>
+                  </a:txBody>
+                  <a:tcPr/>
+                </a:tc>
+              </a:tr>
+              <a:tr h="0">
+                <a:tc>
+                  <a:txBody>
+                    <a:bodyPr/>
+                    <a:lstStyle/>
+                    <a:p>
+                      <a:pPr lvl="0" indent="0" marL="0" algn="l">
+                        <a:buNone/>
+                      </a:pPr>
+                      <a:r>
+                        <a:rPr/>
+                        <a:t>relative</a:t>
+                      </a:r>
+                    </a:p>
+                  </a:txBody>
+                </a:tc>
+                <a:tc>
+                  <a:txBody>
+                    <a:bodyPr/>
+                    <a:lstStyle/>
+                    <a:p>
+                      <a:pPr lvl="0" indent="0" marL="0" algn="l">
+                        <a:buNone/>
+                      </a:pPr>
+                      <a:r>
+                        <a:rPr/>
+                        <a:t>Employed</a:t>
+                      </a:r>
+                    </a:p>
+                  </a:txBody>
+                </a:tc>
+                <a:tc>
+                  <a:txBody>
+                    <a:bodyPr/>
+                    <a:lstStyle/>
+                    <a:p>
+                      <a:pPr lvl="0" indent="0" marL="0" algn="r">
+                        <a:buNone/>
+                      </a:pPr>
+                      <a:r>
+                        <a:rPr/>
+                        <a:t>102.4</a:t>
+                      </a:r>
+                    </a:p>
+                  </a:txBody>
+                </a:tc>
+                <a:tc>
+                  <a:txBody>
+                    <a:bodyPr/>
+                    <a:lstStyle/>
+                    <a:p>
+                      <a:pPr lvl="0" indent="0" marL="0" algn="r">
+                        <a:buNone/>
+                      </a:pPr>
+                      <a:r>
+                        <a:rPr/>
+                        <a:t>100.7</a:t>
+                      </a:r>
+                    </a:p>
+                  </a:txBody>
+                </a:tc>
+                <a:tc>
+                  <a:txBody>
+                    <a:bodyPr/>
+                    <a:lstStyle/>
+                    <a:p>
+                      <a:pPr lvl="0" indent="0" marL="0" algn="r">
+                        <a:buNone/>
+                      </a:pPr>
+                      <a:r>
+                        <a:rPr/>
+                        <a:t>103.1</a:t>
+                      </a:r>
+                    </a:p>
+                  </a:txBody>
+                </a:tc>
+              </a:tr>
+              <a:tr h="0">
+                <a:tc>
+                  <a:txBody>
+                    <a:bodyPr/>
+                    <a:lstStyle/>
+                    <a:p>
+                      <a:pPr lvl="0" indent="0" marL="0" algn="l">
+                        <a:buNone/>
+                      </a:pPr>
+                      <a:r>
+                        <a:rPr/>
+                        <a:t>relative</a:t>
+                      </a:r>
+                    </a:p>
+                  </a:txBody>
+                </a:tc>
+                <a:tc>
+                  <a:txBody>
+                    <a:bodyPr/>
+                    <a:lstStyle/>
+                    <a:p>
+                      <a:pPr lvl="0" indent="0" marL="0" algn="l">
+                        <a:buNone/>
+                      </a:pPr>
+                      <a:r>
+                        <a:rPr/>
+                        <a:t>Unemployed</a:t>
+                      </a:r>
+                    </a:p>
+                  </a:txBody>
+                </a:tc>
+                <a:tc>
+                  <a:txBody>
+                    <a:bodyPr/>
+                    <a:lstStyle/>
+                    <a:p>
+                      <a:pPr lvl="0" indent="0" marL="0" algn="r">
+                        <a:buNone/>
+                      </a:pPr>
+                      <a:r>
+                        <a:rPr/>
+                        <a:t>87.7</a:t>
+                      </a:r>
+                    </a:p>
+                  </a:txBody>
+                </a:tc>
+                <a:tc>
+                  <a:txBody>
+                    <a:bodyPr/>
+                    <a:lstStyle/>
+                    <a:p>
+                      <a:pPr lvl="0" indent="0" marL="0" algn="r">
+                        <a:buNone/>
+                      </a:pPr>
+                      <a:r>
+                        <a:rPr/>
+                        <a:t>90.0</a:t>
+                      </a:r>
+                    </a:p>
+                  </a:txBody>
+                </a:tc>
+                <a:tc>
+                  <a:txBody>
+                    <a:bodyPr/>
+                    <a:lstStyle/>
+                    <a:p>
+                      <a:pPr lvl="0" indent="0" marL="0" algn="r">
+                        <a:buNone/>
+                      </a:pPr>
+                      <a:r>
+                        <a:rPr/>
+                        <a:t>78.1</a:t>
+                      </a:r>
+                    </a:p>
+                  </a:txBody>
+                </a:tc>
+              </a:tr>
+              <a:tr h="0">
+                <a:tc>
+                  <a:txBody>
+                    <a:bodyPr/>
+                    <a:lstStyle/>
+                    <a:p>
+                      <a:pPr lvl="0" indent="0" marL="0" algn="l">
+                        <a:buNone/>
+                      </a:pPr>
+                      <a:r>
+                        <a:rPr/>
+                        <a:t>relative</a:t>
+                      </a:r>
+                    </a:p>
+                  </a:txBody>
+                </a:tc>
+                <a:tc>
+                  <a:txBody>
+                    <a:bodyPr/>
+                    <a:lstStyle/>
+                    <a:p>
+                      <a:pPr lvl="0" indent="0" marL="0" algn="l">
+                        <a:buNone/>
+                      </a:pPr>
+                      <a:r>
+                        <a:rPr/>
+                        <a:t>Inactive student</a:t>
+                      </a:r>
+                    </a:p>
+                  </a:txBody>
+                </a:tc>
+                <a:tc>
+                  <a:txBody>
+                    <a:bodyPr/>
+                    <a:lstStyle/>
+                    <a:p>
+                      <a:pPr lvl="0" indent="0" marL="0" algn="r">
+                        <a:buNone/>
+                      </a:pPr>
+                      <a:r>
+                        <a:rPr/>
+                        <a:t>106.7</a:t>
+                      </a:r>
+                    </a:p>
+                  </a:txBody>
+                </a:tc>
+                <a:tc>
+                  <a:txBody>
+                    <a:bodyPr/>
+                    <a:lstStyle/>
+                    <a:p>
+                      <a:pPr lvl="0" indent="0" marL="0" algn="r">
+                        <a:buNone/>
+                      </a:pPr>
+                      <a:r>
+                        <a:rPr/>
+                        <a:t>121.1</a:t>
+                      </a:r>
+                    </a:p>
+                  </a:txBody>
+                </a:tc>
+                <a:tc>
+                  <a:txBody>
+                    <a:bodyPr/>
+                    <a:lstStyle/>
+                    <a:p>
+                      <a:pPr lvl="0" indent="0" marL="0" algn="r">
+                        <a:buNone/>
+                      </a:pPr>
+                      <a:r>
+                        <a:rPr/>
+                        <a:t>130.0</a:t>
+                      </a:r>
+                    </a:p>
+                  </a:txBody>
+                </a:tc>
+              </a:tr>
+              <a:tr h="0">
+                <a:tc>
+                  <a:txBody>
+                    <a:bodyPr/>
+                    <a:lstStyle/>
+                    <a:p>
+                      <a:pPr lvl="0" indent="0" marL="0" algn="l">
+                        <a:buNone/>
+                      </a:pPr>
+                      <a:r>
+                        <a:rPr/>
+                        <a:t>relative</a:t>
+                      </a:r>
+                    </a:p>
+                  </a:txBody>
+                </a:tc>
+                <a:tc>
+                  <a:txBody>
+                    <a:bodyPr/>
+                    <a:lstStyle/>
+                    <a:p>
+                      <a:pPr lvl="0" indent="0" marL="0" algn="l">
+                        <a:buNone/>
+                      </a:pPr>
+                      <a:r>
+                        <a:rPr/>
+                        <a:t>Inactive care</a:t>
+                      </a:r>
+                    </a:p>
+                  </a:txBody>
+                </a:tc>
+                <a:tc>
+                  <a:txBody>
+                    <a:bodyPr/>
+                    <a:lstStyle/>
+                    <a:p>
+                      <a:pPr lvl="0" indent="0" marL="0" algn="r">
+                        <a:buNone/>
+                      </a:pPr>
+                      <a:r>
+                        <a:rPr/>
+                        <a:t>98.6</a:t>
+                      </a:r>
+                    </a:p>
+                  </a:txBody>
+                </a:tc>
+                <a:tc>
+                  <a:txBody>
+                    <a:bodyPr/>
+                    <a:lstStyle/>
+                    <a:p>
+                      <a:pPr lvl="0" indent="0" marL="0" algn="r">
+                        <a:buNone/>
+                      </a:pPr>
+                      <a:r>
+                        <a:rPr/>
+                        <a:t>88.5</a:t>
+                      </a:r>
+                    </a:p>
+                  </a:txBody>
+                </a:tc>
+                <a:tc>
+                  <a:txBody>
+                    <a:bodyPr/>
+                    <a:lstStyle/>
+                    <a:p>
+                      <a:pPr lvl="0" indent="0" marL="0" algn="r">
+                        <a:buNone/>
+                      </a:pPr>
+                      <a:r>
+                        <a:rPr/>
+                        <a:t>86.3</a:t>
+                      </a:r>
+                    </a:p>
+                  </a:txBody>
+                </a:tc>
+              </a:tr>
+              <a:tr h="0">
+                <a:tc>
+                  <a:txBody>
+                    <a:bodyPr/>
+                    <a:lstStyle/>
+                    <a:p>
+                      <a:pPr lvl="0" indent="0" marL="0" algn="l">
+                        <a:buNone/>
+                      </a:pPr>
+                      <a:r>
+                        <a:rPr/>
+                        <a:t>relative</a:t>
+                      </a:r>
+                    </a:p>
+                  </a:txBody>
+                </a:tc>
+                <a:tc>
+                  <a:txBody>
+                    <a:bodyPr/>
+                    <a:lstStyle/>
+                    <a:p>
+                      <a:pPr lvl="0" indent="0" marL="0" algn="l">
+                        <a:buNone/>
+                      </a:pPr>
+                      <a:r>
+                        <a:rPr/>
+                        <a:t>Inactive long term sick</a:t>
+                      </a:r>
+                    </a:p>
+                  </a:txBody>
+                </a:tc>
+                <a:tc>
+                  <a:txBody>
+                    <a:bodyPr/>
+                    <a:lstStyle/>
+                    <a:p>
+                      <a:pPr lvl="0" indent="0" marL="0" algn="r">
+                        <a:buNone/>
+                      </a:pPr>
+                      <a:r>
+                        <a:rPr/>
+                        <a:t>69.6</a:t>
+                      </a:r>
+                    </a:p>
+                  </a:txBody>
+                </a:tc>
+                <a:tc>
+                  <a:txBody>
+                    <a:bodyPr/>
+                    <a:lstStyle/>
+                    <a:p>
+                      <a:pPr lvl="0" indent="0" marL="0" algn="r">
+                        <a:buNone/>
+                      </a:pPr>
+                      <a:r>
+                        <a:rPr/>
+                        <a:t>93.8</a:t>
+                      </a:r>
+                    </a:p>
+                  </a:txBody>
+                </a:tc>
+                <a:tc>
+                  <a:txBody>
+                    <a:bodyPr/>
+                    <a:lstStyle/>
+                    <a:p>
+                      <a:pPr lvl="0" indent="0" marL="0" algn="r">
+                        <a:buNone/>
+                      </a:pPr>
+                      <a:r>
+                        <a:rPr/>
+                        <a:t>64.2</a:t>
+                      </a:r>
+                    </a:p>
+                  </a:txBody>
+                </a:tc>
+              </a:tr>
+              <a:tr h="0">
+                <a:tc>
+                  <a:txBody>
+                    <a:bodyPr/>
+                    <a:lstStyle/>
+                    <a:p>
+                      <a:pPr lvl="0" indent="0" marL="0" algn="l">
+                        <a:buNone/>
+                      </a:pPr>
+                      <a:r>
+                        <a:rPr/>
+                        <a:t>relative</a:t>
+                      </a:r>
+                    </a:p>
+                  </a:txBody>
+                </a:tc>
+                <a:tc>
+                  <a:txBody>
+                    <a:bodyPr/>
+                    <a:lstStyle/>
+                    <a:p>
+                      <a:pPr lvl="0" indent="0" marL="0" algn="l">
+                        <a:buNone/>
+                      </a:pPr>
+                      <a:r>
+                        <a:rPr/>
+                        <a:t>Inactive retired</a:t>
+                      </a:r>
+                    </a:p>
+                  </a:txBody>
+                </a:tc>
+                <a:tc>
+                  <a:txBody>
+                    <a:bodyPr/>
+                    <a:lstStyle/>
+                    <a:p>
+                      <a:pPr lvl="0" indent="0" marL="0" algn="r">
+                        <a:buNone/>
+                      </a:pPr>
+                      <a:r>
+                        <a:rPr/>
+                        <a:t>98.8</a:t>
+                      </a:r>
+                    </a:p>
+                  </a:txBody>
+                </a:tc>
+                <a:tc>
+                  <a:txBody>
+                    <a:bodyPr/>
+                    <a:lstStyle/>
+                    <a:p>
+                      <a:pPr lvl="0" indent="0" marL="0" algn="r">
+                        <a:buNone/>
+                      </a:pPr>
+                      <a:r>
+                        <a:rPr/>
+                        <a:t>112.6</a:t>
+                      </a:r>
+                    </a:p>
+                  </a:txBody>
+                </a:tc>
+                <a:tc>
+                  <a:txBody>
+                    <a:bodyPr/>
+                    <a:lstStyle/>
+                    <a:p>
+                      <a:pPr lvl="0" indent="0" marL="0" algn="r">
+                        <a:buNone/>
+                      </a:pPr>
+                      <a:r>
+                        <a:rPr/>
+                        <a:t>111.8</a:t>
+                      </a:r>
+                    </a:p>
+                  </a:txBody>
+                </a:tc>
+              </a:tr>
+              <a:tr h="0">
+                <a:tc>
+                  <a:txBody>
+                    <a:bodyPr/>
+                    <a:lstStyle/>
+                    <a:p>
+                      <a:pPr lvl="0" indent="0" marL="0" algn="l">
+                        <a:buNone/>
+                      </a:pPr>
+                      <a:r>
+                        <a:rPr/>
+                        <a:t>relative</a:t>
+                      </a:r>
+                    </a:p>
+                  </a:txBody>
+                </a:tc>
+                <a:tc>
+                  <a:txBody>
+                    <a:bodyPr/>
+                    <a:lstStyle/>
+                    <a:p>
+                      <a:pPr lvl="0" indent="0" marL="0" algn="l">
+                        <a:buNone/>
+                      </a:pPr>
+                      <a:r>
+                        <a:rPr/>
+                        <a:t>Inactive other</a:t>
+                      </a:r>
+                    </a:p>
+                  </a:txBody>
+                </a:tc>
+                <a:tc>
+                  <a:txBody>
+                    <a:bodyPr/>
+                    <a:lstStyle/>
+                    <a:p>
+                      <a:pPr lvl="0" indent="0" marL="0" algn="r">
+                        <a:buNone/>
+                      </a:pPr>
+                      <a:r>
+                        <a:rPr/>
+                        <a:t>86.9</a:t>
+                      </a:r>
+                    </a:p>
+                  </a:txBody>
+                </a:tc>
+                <a:tc>
+                  <a:txBody>
+                    <a:bodyPr/>
+                    <a:lstStyle/>
+                    <a:p>
+                      <a:pPr lvl="0" indent="0" marL="0" algn="r">
+                        <a:buNone/>
+                      </a:pPr>
+                      <a:r>
+                        <a:rPr/>
+                        <a:t>119.2</a:t>
+                      </a:r>
+                    </a:p>
+                  </a:txBody>
+                </a:tc>
+                <a:tc>
+                  <a:txBody>
+                    <a:bodyPr/>
+                    <a:lstStyle/>
+                    <a:p>
+                      <a:pPr lvl="0" indent="0" marL="0" algn="r">
+                        <a:buNone/>
+                      </a:pPr>
+                      <a:r>
+                        <a:rPr/>
+                        <a:t>103.4</a:t>
+                      </a:r>
+                    </a:p>
+                  </a:txBody>
+                </a:tc>
+              </a:tr>
+            </a:tbl>
+          </a:graphicData>
+        </a:graphic>
+      </p:graphicFrame>
     </p:spTree>
   </p:cSld>
 </p:sld>
@@ -3484,6 +4520,963 @@
             <a:r>
               <a:rPr/>
               <a:t>Relative differences: how many % higher/lower are the numbers (say) unemployed in the counterfactual scenario than the baseline scenario?</a:t>
+            </a:r>
+          </a:p>
+        </p:txBody>
+      </p:sp>
+    </p:spTree>
+  </p:cSld>
+</p:sld>
+</file>
+
+<file path=ppt/slides/slide4.xml><?xml version="1.0" encoding="utf-8"?>
+<p:sld xmlns:a="http://schemas.openxmlformats.org/drawingml/2006/main" xmlns:r="http://schemas.openxmlformats.org/officeDocument/2006/relationships" xmlns:p="http://schemas.openxmlformats.org/presentationml/2006/main">
+  <p:cSld>
+    <p:spTree>
+      <p:nvGrpSpPr>
+        <p:cNvPr id="1" name=""/>
+        <p:cNvGrpSpPr/>
+        <p:nvPr/>
+      </p:nvGrpSpPr>
+      <p:grpSpPr>
+        <a:xfrm>
+          <a:off x="0" y="0"/>
+          <a:ext cx="0" cy="0"/>
+          <a:chOff x="0" y="0"/>
+          <a:chExt cx="0" cy="0"/>
+        </a:xfrm>
+      </p:grpSpPr>
+      <p:sp>
+        <p:nvSpPr>
+          <p:cNvPr id="2" name="Title 1"/>
+          <p:cNvSpPr>
+            <a:spLocks noGrp="1"/>
+          </p:cNvSpPr>
+          <p:nvPr>
+            <p:ph type="title"/>
+          </p:nvPr>
+        </p:nvSpPr>
+        <p:spPr/>
+        <p:txBody>
+          <a:bodyPr/>
+          <a:lstStyle/>
+          <a:p>
+            <a:pPr lvl="0" indent="0" marL="0">
+              <a:buNone/>
+            </a:pPr>
+            <a:r>
+              <a:rPr/>
+              <a:t>Modelling based on reported long-term illness</a:t>
+            </a:r>
+          </a:p>
+        </p:txBody>
+      </p:sp>
+      <p:sp>
+        <p:nvSpPr>
+          <p:cNvPr id="3" name="Content Placeholder 2"/>
+          <p:cNvSpPr>
+            <a:spLocks noGrp="1"/>
+          </p:cNvSpPr>
+          <p:nvPr>
+            <p:ph idx="1"/>
+          </p:nvPr>
+        </p:nvSpPr>
+        <p:spPr/>
+        <p:txBody>
+          <a:bodyPr/>
+          <a:lstStyle/>
+          <a:p>
+            <a:pPr lvl="0" indent="0" marL="0">
+              <a:buNone/>
+            </a:pPr>
+            <a:r>
+              <a:rPr/>
+              <a:t>Long-term illness is a binary variable: present/absent</a:t>
+            </a:r>
+          </a:p>
+        </p:txBody>
+      </p:sp>
+    </p:spTree>
+  </p:cSld>
+</p:sld>
+</file>
+
+<file path=ppt/slides/slide5.xml><?xml version="1.0" encoding="utf-8"?>
+<p:sld xmlns:a="http://schemas.openxmlformats.org/drawingml/2006/main" xmlns:r="http://schemas.openxmlformats.org/officeDocument/2006/relationships" xmlns:p="http://schemas.openxmlformats.org/presentationml/2006/main">
+  <p:cSld>
+    <p:spTree>
+      <p:nvGrpSpPr>
+        <p:cNvPr id="1" name=""/>
+        <p:cNvGrpSpPr/>
+        <p:nvPr/>
+      </p:nvGrpSpPr>
+      <p:grpSpPr>
+        <a:xfrm>
+          <a:off x="0" y="0"/>
+          <a:ext cx="0" cy="0"/>
+          <a:chOff x="0" y="0"/>
+          <a:chExt cx="0" cy="0"/>
+        </a:xfrm>
+      </p:grpSpPr>
+      <p:sp>
+        <p:nvSpPr>
+          <p:cNvPr id="2" name="Title 1"/>
+          <p:cNvSpPr>
+            <a:spLocks noGrp="1"/>
+          </p:cNvSpPr>
+          <p:nvPr>
+            <p:ph type="title"/>
+          </p:nvPr>
+        </p:nvSpPr>
+        <p:spPr/>
+        <p:txBody>
+          <a:bodyPr/>
+          <a:lstStyle/>
+          <a:p>
+            <a:pPr lvl="0" indent="0" marL="0">
+              <a:buNone/>
+            </a:pPr>
+            <a:r>
+              <a:rPr/>
+              <a:t>Jointly modelling education changes and health changes</a:t>
+            </a:r>
+          </a:p>
+        </p:txBody>
+      </p:sp>
+      <p:sp>
+        <p:nvSpPr>
+          <p:cNvPr id="3" name="Content Placeholder 2"/>
+          <p:cNvSpPr>
+            <a:spLocks noGrp="1"/>
+          </p:cNvSpPr>
+          <p:nvPr>
+            <p:ph idx="1"/>
+          </p:nvPr>
+        </p:nvSpPr>
+        <p:spPr/>
+        <p:txBody>
+          <a:bodyPr/>
+          <a:lstStyle/>
+          <a:p>
+            <a:pPr lvl="0" indent="0" marL="0">
+              <a:buNone/>
+            </a:pPr>
+            <a:r>
+              <a:rPr/>
+              <a:t>Let’s define this in PICO structure:</a:t>
+            </a:r>
+          </a:p>
+          <a:p>
+            <a:pPr lvl="0"/>
+            <a:r>
+              <a:rPr b="1"/>
+              <a:t>Population</a:t>
+            </a:r>
+            <a:r>
+              <a:rPr/>
+              <a:t> Representative adults aged 25-60 years</a:t>
+            </a:r>
+          </a:p>
+          <a:p>
+            <a:pPr lvl="0"/>
+            <a:r>
+              <a:rPr b="1"/>
+              <a:t>Intervention:</a:t>
+            </a:r>
+          </a:p>
+          <a:p>
+            <a:pPr lvl="1"/>
+            <a:r>
+              <a:rPr/>
+              <a:t>Education: Everyone up one level (up to degree)</a:t>
+            </a:r>
+          </a:p>
+          <a:p>
+            <a:pPr lvl="1"/>
+            <a:r>
+              <a:rPr/>
+              <a:t>Health: 1 SD unit change, equal through MH and PH path</a:t>
+            </a:r>
+          </a:p>
+          <a:p>
+            <a:pPr lvl="0"/>
+            <a:r>
+              <a:rPr b="1"/>
+              <a:t>Comparator:</a:t>
+            </a:r>
+            <a:r>
+              <a:rPr/>
+              <a:t> No change in health or qualifications</a:t>
+            </a:r>
+          </a:p>
+          <a:p>
+            <a:pPr lvl="0"/>
+            <a:r>
+              <a:rPr b="1"/>
+              <a:t>Outcome:</a:t>
+            </a:r>
+            <a:r>
+              <a:rPr/>
+              <a:t> Change in absolute and relative distribution of persons in EI/EA states, focusing on change in EI: LT sick</a:t>
+            </a:r>
+          </a:p>
+        </p:txBody>
+      </p:sp>
+    </p:spTree>
+  </p:cSld>
+</p:sld>
+</file>
+
+<file path=ppt/slides/slide6.xml><?xml version="1.0" encoding="utf-8"?>
+<p:sld xmlns:a="http://schemas.openxmlformats.org/drawingml/2006/main" xmlns:r="http://schemas.openxmlformats.org/officeDocument/2006/relationships" xmlns:p="http://schemas.openxmlformats.org/presentationml/2006/main">
+  <p:cSld>
+    <p:spTree>
+      <p:nvGrpSpPr>
+        <p:cNvPr id="1" name=""/>
+        <p:cNvGrpSpPr/>
+        <p:nvPr/>
+      </p:nvGrpSpPr>
+      <p:grpSpPr>
+        <a:xfrm>
+          <a:off x="0" y="0"/>
+          <a:ext cx="0" cy="0"/>
+          <a:chOff x="0" y="0"/>
+          <a:chExt cx="0" cy="0"/>
+        </a:xfrm>
+      </p:grpSpPr>
+      <p:sp>
+        <p:nvSpPr>
+          <p:cNvPr id="2" name="Title 1"/>
+          <p:cNvSpPr>
+            <a:spLocks noGrp="1"/>
+          </p:cNvSpPr>
+          <p:nvPr>
+            <p:ph type="title"/>
+          </p:nvPr>
+        </p:nvSpPr>
+        <p:spPr/>
+        <p:txBody>
+          <a:bodyPr/>
+          <a:lstStyle/>
+          <a:p>
+            <a:pPr lvl="0" indent="0" marL="0">
+              <a:buNone/>
+            </a:pPr>
+            <a:r>
+              <a:rPr/>
+              <a:t>Step 1: Get data</a:t>
+            </a:r>
+          </a:p>
+        </p:txBody>
+      </p:sp>
+    </p:spTree>
+  </p:cSld>
+</p:sld>
+</file>
+
+<file path=ppt/slides/slide7.xml><?xml version="1.0" encoding="utf-8"?>
+<p:sld xmlns:a="http://schemas.openxmlformats.org/drawingml/2006/main" xmlns:r="http://schemas.openxmlformats.org/officeDocument/2006/relationships" xmlns:p="http://schemas.openxmlformats.org/presentationml/2006/main">
+  <p:cSld>
+    <p:spTree>
+      <p:nvGrpSpPr>
+        <p:cNvPr id="1" name=""/>
+        <p:cNvGrpSpPr/>
+        <p:nvPr/>
+      </p:nvGrpSpPr>
+      <p:grpSpPr>
+        <a:xfrm>
+          <a:off x="0" y="0"/>
+          <a:ext cx="0" cy="0"/>
+          <a:chOff x="0" y="0"/>
+          <a:chExt cx="0" cy="0"/>
+        </a:xfrm>
+      </p:grpSpPr>
+      <p:sp>
+        <p:nvSpPr>
+          <p:cNvPr id="2" name="Title 1"/>
+          <p:cNvSpPr>
+            <a:spLocks noGrp="1"/>
+          </p:cNvSpPr>
+          <p:nvPr>
+            <p:ph type="title"/>
+          </p:nvPr>
+        </p:nvSpPr>
+        <p:spPr/>
+        <p:txBody>
+          <a:bodyPr/>
+          <a:lstStyle/>
+          <a:p>
+            <a:pPr lvl="0" indent="0" marL="0">
+              <a:buNone/>
+            </a:pPr>
+            <a:r>
+              <a:rPr/>
+              <a:t>Modelling</a:t>
+            </a:r>
+          </a:p>
+        </p:txBody>
+      </p:sp>
+      <p:sp>
+        <p:nvSpPr>
+          <p:cNvPr id="3" name="Content Placeholder 2"/>
+          <p:cNvSpPr>
+            <a:spLocks noGrp="1"/>
+          </p:cNvSpPr>
+          <p:nvPr>
+            <p:ph idx="1"/>
+          </p:nvPr>
+        </p:nvSpPr>
+        <p:spPr/>
+        <p:txBody>
+          <a:bodyPr/>
+          <a:lstStyle/>
+          <a:p>
+            <a:pPr lvl="0" indent="0">
+              <a:buNone/>
+            </a:pPr>
+            <a:r>
+              <a:rPr>
+                <a:latin typeface="Courier"/>
+              </a:rPr>
+              <a:t># weights:  238 (198 variable)
+initial  value 399791.131945 
+iter  10 value 126639.517682
+iter  20 value 103779.451831
+iter  30 value 97088.637936
+iter  40 value 91956.345766
+iter  50 value 87944.976491
+iter  60 value 85762.997646
+iter  70 value 83126.138557
+iter  80 value 81571.885958
+iter  90 value 81262.495695
+iter 100 value 81212.030099
+final  value 81212.030099 
+stopped after 100 iterations</a:t>
+            </a:r>
+          </a:p>
+          <a:p>
+            <a:pPr lvl="0" indent="0">
+              <a:buNone/>
+            </a:pPr>
+            <a:r>
+              <a:rPr>
+                <a:latin typeface="Courier"/>
+              </a:rPr>
+              <a:t># weights:  259 (216 variable)
+initial  value 399791.131945 
+iter  10 value 215001.009243
+iter  20 value 177848.963491
+iter  30 value 156796.609415
+iter  40 value 142652.781894
+iter  50 value 123418.798186
+iter  60 value 108871.149235
+iter  70 value 96731.000821
+iter  80 value 88936.643276
+iter  90 value 84020.780544
+iter 100 value 80793.162794
+final  value 80793.162794 
+stopped after 100 iterations</a:t>
+            </a:r>
+          </a:p>
+          <a:p>
+            <a:pPr lvl="0" indent="0">
+              <a:buNone/>
+            </a:pPr>
+            <a:r>
+              <a:rPr>
+                <a:latin typeface="Courier"/>
+              </a:rPr>
+              <a:t># weights:  252 (210 variable)
+initial  value 399791.131945 
+iter  10 value 144032.727280
+iter  20 value 124919.751476
+iter  30 value 111976.041567
+iter  40 value 101875.629993
+iter  50 value 95450.092194
+iter  60 value 89460.648702
+iter  70 value 85223.775743
+iter  80 value 82788.860638
+iter  90 value 81265.601333
+iter 100 value 80668.974336
+final  value 80668.974336 
+stopped after 100 iterations</a:t>
+            </a:r>
+          </a:p>
+          <a:p>
+            <a:pPr lvl="0" indent="0">
+              <a:buNone/>
+            </a:pPr>
+            <a:r>
+              <a:rPr>
+                <a:latin typeface="Courier"/>
+              </a:rPr>
+              <a:t># weights:  273 (228 variable)
+initial  value 399791.131945 
+iter  10 value 212049.576681
+iter  20 value 178239.604541
+iter  30 value 160609.074880
+iter  40 value 143240.736144
+iter  50 value 124882.672065
+iter  60 value 114415.699568
+iter  70 value 103729.936738
+iter  80 value 92907.844453
+iter  90 value 86511.227083
+iter 100 value 82471.169387
+final  value 82471.169387 
+stopped after 100 iterations</a:t>
+            </a:r>
+          </a:p>
+        </p:txBody>
+      </p:sp>
+    </p:spTree>
+  </p:cSld>
+</p:sld>
+</file>
+
+<file path=ppt/slides/slide8.xml><?xml version="1.0" encoding="utf-8"?>
+<p:sld xmlns:a="http://schemas.openxmlformats.org/drawingml/2006/main" xmlns:r="http://schemas.openxmlformats.org/officeDocument/2006/relationships" xmlns:p="http://schemas.openxmlformats.org/presentationml/2006/main">
+  <p:cSld>
+    <p:spTree>
+      <p:nvGrpSpPr>
+        <p:cNvPr id="1" name=""/>
+        <p:cNvGrpSpPr/>
+        <p:nvPr/>
+      </p:nvGrpSpPr>
+      <p:grpSpPr>
+        <a:xfrm>
+          <a:off x="0" y="0"/>
+          <a:ext cx="0" cy="0"/>
+          <a:chOff x="0" y="0"/>
+          <a:chExt cx="0" cy="0"/>
+        </a:xfrm>
+      </p:grpSpPr>
+      <p:sp>
+        <p:nvSpPr>
+          <p:cNvPr id="2" name="Title 1"/>
+          <p:cNvSpPr>
+            <a:spLocks noGrp="1"/>
+          </p:cNvSpPr>
+          <p:nvPr>
+            <p:ph type="title"/>
+          </p:nvPr>
+        </p:nvSpPr>
+        <p:spPr/>
+        <p:txBody>
+          <a:bodyPr/>
+          <a:lstStyle/>
+          <a:p>
+            <a:pPr lvl="0" indent="0" marL="0">
+              <a:buNone/>
+            </a:pPr>
+            <a:r>
+              <a:rPr/>
+              <a:t>Model comparison</a:t>
+            </a:r>
+          </a:p>
+        </p:txBody>
+      </p:sp>
+      <p:graphicFrame>
+        <p:nvGraphicFramePr>
+          <p:cNvPr id="6" name="Content Placeholder 5"/>
+          <p:cNvGraphicFramePr>
+            <a:graphicFrameLocks noGrp="1"/>
+          </p:cNvGraphicFramePr>
+          <p:nvPr>
+            <p:ph idx="1"/>
+          </p:nvPr>
+        </p:nvGraphicFramePr>
+        <p:xfrm>
+          <a:off x="457200" y="1193800"/>
+          <a:ext cx="8229600" cy="3390900"/>
+        </p:xfrm>
+        <a:graphic>
+          <a:graphicData uri="http://schemas.openxmlformats.org/drawingml/2006/table">
+            <a:tbl>
+              <a:tblPr firstRow="1" bandRow="1">
+                <a:tableStyleId>{5C22544A-7EE6-4342-B048-85BDC9FD1C3A}</a:tableStyleId>
+              </a:tblPr>
+              <a:tblGrid>
+                <a:gridCol w="1638300"/>
+                <a:gridCol w="1638300"/>
+                <a:gridCol w="1638300"/>
+                <a:gridCol w="1638300"/>
+                <a:gridCol w="1638300"/>
+              </a:tblGrid>
+              <a:tr h="0">
+                <a:tc>
+                  <a:txBody>
+                    <a:bodyPr/>
+                    <a:lstStyle/>
+                    <a:p>
+                      <a:pPr lvl="0" indent="0" marL="0" algn="l">
+                        <a:buNone/>
+                      </a:pPr>
+                      <a:r>
+                        <a:rPr/>
+                        <a:t>model_name</a:t>
+                      </a:r>
+                    </a:p>
+                  </a:txBody>
+                  <a:tcPr/>
+                </a:tc>
+                <a:tc>
+                  <a:txBody>
+                    <a:bodyPr/>
+                    <a:lstStyle/>
+                    <a:p>
+                      <a:pPr lvl="0" indent="0" marL="0" algn="r">
+                        <a:buNone/>
+                      </a:pPr>
+                      <a:r>
+                        <a:rPr/>
+                        <a:t>aic</a:t>
+                      </a:r>
+                    </a:p>
+                  </a:txBody>
+                  <a:tcPr/>
+                </a:tc>
+                <a:tc>
+                  <a:txBody>
+                    <a:bodyPr/>
+                    <a:lstStyle/>
+                    <a:p>
+                      <a:pPr lvl="0" indent="0" marL="0" algn="r">
+                        <a:buNone/>
+                      </a:pPr>
+                      <a:r>
+                        <a:rPr/>
+                        <a:t>bic</a:t>
+                      </a:r>
+                    </a:p>
+                  </a:txBody>
+                  <a:tcPr/>
+                </a:tc>
+                <a:tc>
+                  <a:txBody>
+                    <a:bodyPr/>
+                    <a:lstStyle/>
+                    <a:p>
+                      <a:pPr lvl="0" indent="0" marL="0" algn="r">
+                        <a:buNone/>
+                      </a:pPr>
+                      <a:r>
+                        <a:rPr/>
+                        <a:t>aic_rank</a:t>
+                      </a:r>
+                    </a:p>
+                  </a:txBody>
+                  <a:tcPr/>
+                </a:tc>
+                <a:tc>
+                  <a:txBody>
+                    <a:bodyPr/>
+                    <a:lstStyle/>
+                    <a:p>
+                      <a:pPr lvl="0" indent="0" marL="0" algn="r">
+                        <a:buNone/>
+                      </a:pPr>
+                      <a:r>
+                        <a:rPr/>
+                        <a:t>bic_rank</a:t>
+                      </a:r>
+                    </a:p>
+                  </a:txBody>
+                  <a:tcPr/>
+                </a:tc>
+              </a:tr>
+              <a:tr h="0">
+                <a:tc>
+                  <a:txBody>
+                    <a:bodyPr/>
+                    <a:lstStyle/>
+                    <a:p>
+                      <a:pPr lvl="0" indent="0" marL="0" algn="l">
+                        <a:buNone/>
+                      </a:pPr>
+                      <a:r>
+                        <a:rPr/>
+                        <a:t>Qualifications</a:t>
+                      </a:r>
+                    </a:p>
+                  </a:txBody>
+                </a:tc>
+                <a:tc>
+                  <a:txBody>
+                    <a:bodyPr/>
+                    <a:lstStyle/>
+                    <a:p>
+                      <a:pPr lvl="0" indent="0" marL="0" algn="r">
+                        <a:buNone/>
+                      </a:pPr>
+                      <a:r>
+                        <a:rPr/>
+                        <a:t>161613.9</a:t>
+                      </a:r>
+                    </a:p>
+                  </a:txBody>
+                </a:tc>
+                <a:tc>
+                  <a:txBody>
+                    <a:bodyPr/>
+                    <a:lstStyle/>
+                    <a:p>
+                      <a:pPr lvl="0" indent="0" marL="0" algn="r">
+                        <a:buNone/>
+                      </a:pPr>
+                      <a:r>
+                        <a:rPr/>
+                        <a:t>163026.1</a:t>
+                      </a:r>
+                    </a:p>
+                  </a:txBody>
+                </a:tc>
+                <a:tc>
+                  <a:txBody>
+                    <a:bodyPr/>
+                    <a:lstStyle/>
+                    <a:p>
+                      <a:pPr lvl="0" indent="0" marL="0" algn="r">
+                        <a:buNone/>
+                      </a:pPr>
+                      <a:r>
+                        <a:rPr/>
+                        <a:t>1</a:t>
+                      </a:r>
+                    </a:p>
+                  </a:txBody>
+                </a:tc>
+                <a:tc>
+                  <a:txBody>
+                    <a:bodyPr/>
+                    <a:lstStyle/>
+                    <a:p>
+                      <a:pPr lvl="0" indent="0" marL="0" algn="r">
+                        <a:buNone/>
+                      </a:pPr>
+                      <a:r>
+                        <a:rPr/>
+                        <a:t>1</a:t>
+                      </a:r>
+                    </a:p>
+                  </a:txBody>
+                </a:tc>
+              </a:tr>
+              <a:tr h="0">
+                <a:tc>
+                  <a:txBody>
+                    <a:bodyPr/>
+                    <a:lstStyle/>
+                    <a:p>
+                      <a:pPr lvl="0" indent="0" marL="0" algn="l">
+                        <a:buNone/>
+                      </a:pPr>
+                      <a:r>
+                        <a:rPr/>
+                        <a:t>Health</a:t>
+                      </a:r>
+                    </a:p>
+                  </a:txBody>
+                </a:tc>
+                <a:tc>
+                  <a:txBody>
+                    <a:bodyPr/>
+                    <a:lstStyle/>
+                    <a:p>
+                      <a:pPr lvl="0" indent="0" marL="0" algn="r">
+                        <a:buNone/>
+                      </a:pPr>
+                      <a:r>
+                        <a:rPr/>
+                        <a:t>161874.3</a:t>
+                      </a:r>
+                    </a:p>
+                  </a:txBody>
+                </a:tc>
+                <a:tc>
+                  <a:txBody>
+                    <a:bodyPr/>
+                    <a:lstStyle/>
+                    <a:p>
+                      <a:pPr lvl="0" indent="0" marL="0" algn="r">
+                        <a:buNone/>
+                      </a:pPr>
+                      <a:r>
+                        <a:rPr/>
+                        <a:t>163347.9</a:t>
+                      </a:r>
+                    </a:p>
+                  </a:txBody>
+                </a:tc>
+                <a:tc>
+                  <a:txBody>
+                    <a:bodyPr/>
+                    <a:lstStyle/>
+                    <a:p>
+                      <a:pPr lvl="0" indent="0" marL="0" algn="r">
+                        <a:buNone/>
+                      </a:pPr>
+                      <a:r>
+                        <a:rPr/>
+                        <a:t>2</a:t>
+                      </a:r>
+                    </a:p>
+                  </a:txBody>
+                </a:tc>
+                <a:tc>
+                  <a:txBody>
+                    <a:bodyPr/>
+                    <a:lstStyle/>
+                    <a:p>
+                      <a:pPr lvl="0" indent="0" marL="0" algn="r">
+                        <a:buNone/>
+                      </a:pPr>
+                      <a:r>
+                        <a:rPr/>
+                        <a:t>2</a:t>
+                      </a:r>
+                    </a:p>
+                  </a:txBody>
+                </a:tc>
+              </a:tr>
+              <a:tr h="0">
+                <a:tc>
+                  <a:txBody>
+                    <a:bodyPr/>
+                    <a:lstStyle/>
+                    <a:p>
+                      <a:pPr lvl="0" indent="0" marL="0" algn="l">
+                        <a:buNone/>
+                      </a:pPr>
+                      <a:r>
+                        <a:rPr/>
+                        <a:t>Foundational</a:t>
+                      </a:r>
+                    </a:p>
+                  </a:txBody>
+                </a:tc>
+                <a:tc>
+                  <a:txBody>
+                    <a:bodyPr/>
+                    <a:lstStyle/>
+                    <a:p>
+                      <a:pPr lvl="0" indent="0" marL="0" algn="r">
+                        <a:buNone/>
+                      </a:pPr>
+                      <a:r>
+                        <a:rPr/>
+                        <a:t>162676.1</a:t>
+                      </a:r>
+                    </a:p>
+                  </a:txBody>
+                </a:tc>
+                <a:tc>
+                  <a:txBody>
+                    <a:bodyPr/>
+                    <a:lstStyle/>
+                    <a:p>
+                      <a:pPr lvl="0" indent="0" marL="0" algn="r">
+                        <a:buNone/>
+                      </a:pPr>
+                      <a:r>
+                        <a:rPr/>
+                        <a:t>163965.4</a:t>
+                      </a:r>
+                    </a:p>
+                  </a:txBody>
+                </a:tc>
+                <a:tc>
+                  <a:txBody>
+                    <a:bodyPr/>
+                    <a:lstStyle/>
+                    <a:p>
+                      <a:pPr lvl="0" indent="0" marL="0" algn="r">
+                        <a:buNone/>
+                      </a:pPr>
+                      <a:r>
+                        <a:rPr/>
+                        <a:t>3</a:t>
+                      </a:r>
+                    </a:p>
+                  </a:txBody>
+                </a:tc>
+                <a:tc>
+                  <a:txBody>
+                    <a:bodyPr/>
+                    <a:lstStyle/>
+                    <a:p>
+                      <a:pPr lvl="0" indent="0" marL="0" algn="r">
+                        <a:buNone/>
+                      </a:pPr>
+                      <a:r>
+                        <a:rPr/>
+                        <a:t>3</a:t>
+                      </a:r>
+                    </a:p>
+                  </a:txBody>
+                </a:tc>
+              </a:tr>
+              <a:tr h="0">
+                <a:tc>
+                  <a:txBody>
+                    <a:bodyPr/>
+                    <a:lstStyle/>
+                    <a:p>
+                      <a:pPr lvl="0" indent="0" marL="0" algn="l">
+                        <a:buNone/>
+                      </a:pPr>
+                      <a:r>
+                        <a:rPr/>
+                        <a:t>Both</a:t>
+                      </a:r>
+                    </a:p>
+                  </a:txBody>
+                </a:tc>
+                <a:tc>
+                  <a:txBody>
+                    <a:bodyPr/>
+                    <a:lstStyle/>
+                    <a:p>
+                      <a:pPr lvl="0" indent="0" marL="0" algn="r">
+                        <a:buNone/>
+                      </a:pPr>
+                      <a:r>
+                        <a:rPr/>
+                        <a:t>165254.3</a:t>
+                      </a:r>
+                    </a:p>
+                  </a:txBody>
+                </a:tc>
+                <a:tc>
+                  <a:txBody>
+                    <a:bodyPr/>
+                    <a:lstStyle/>
+                    <a:p>
+                      <a:pPr lvl="0" indent="0" marL="0" algn="r">
+                        <a:buNone/>
+                      </a:pPr>
+                      <a:r>
+                        <a:rPr/>
+                        <a:t>166850.7</a:t>
+                      </a:r>
+                    </a:p>
+                  </a:txBody>
+                </a:tc>
+                <a:tc>
+                  <a:txBody>
+                    <a:bodyPr/>
+                    <a:lstStyle/>
+                    <a:p>
+                      <a:pPr lvl="0" indent="0" marL="0" algn="r">
+                        <a:buNone/>
+                      </a:pPr>
+                      <a:r>
+                        <a:rPr/>
+                        <a:t>4</a:t>
+                      </a:r>
+                    </a:p>
+                  </a:txBody>
+                </a:tc>
+                <a:tc>
+                  <a:txBody>
+                    <a:bodyPr/>
+                    <a:lstStyle/>
+                    <a:p>
+                      <a:pPr lvl="0" indent="0" marL="0" algn="r">
+                        <a:buNone/>
+                      </a:pPr>
+                      <a:r>
+                        <a:rPr/>
+                        <a:t>4</a:t>
+                      </a:r>
+                    </a:p>
+                  </a:txBody>
+                </a:tc>
+              </a:tr>
+            </a:tbl>
+          </a:graphicData>
+        </a:graphic>
+      </p:graphicFrame>
+    </p:spTree>
+  </p:cSld>
+</p:sld>
+</file>
+
+<file path=ppt/slides/slide9.xml><?xml version="1.0" encoding="utf-8"?>
+<p:sld xmlns:a="http://schemas.openxmlformats.org/drawingml/2006/main" xmlns:r="http://schemas.openxmlformats.org/officeDocument/2006/relationships" xmlns:p="http://schemas.openxmlformats.org/presentationml/2006/main">
+  <p:cSld>
+    <p:spTree>
+      <p:nvGrpSpPr>
+        <p:cNvPr id="1" name=""/>
+        <p:cNvGrpSpPr/>
+        <p:nvPr/>
+      </p:nvGrpSpPr>
+      <p:grpSpPr>
+        <a:xfrm>
+          <a:off x="0" y="0"/>
+          <a:ext cx="0" cy="0"/>
+          <a:chOff x="0" y="0"/>
+          <a:chExt cx="0" cy="0"/>
+        </a:xfrm>
+      </p:grpSpPr>
+      <p:sp>
+        <p:nvSpPr>
+          <p:cNvPr id="3" name="Content Placeholder 2"/>
+          <p:cNvSpPr>
+            <a:spLocks noGrp="1"/>
+          </p:cNvSpPr>
+          <p:nvPr>
+            <p:ph idx="1"/>
+          </p:nvPr>
+        </p:nvSpPr>
+        <p:spPr/>
+        <p:txBody>
+          <a:bodyPr/>
+          <a:lstStyle/>
+          <a:p>
+            <a:pPr lvl="0" indent="0" marL="0">
+              <a:buNone/>
+            </a:pPr>
+            <a:r>
+              <a:rPr/>
+              <a:t>Lower BIC and AIC scores are better. The models are arranged from lowest to highest, and ranks shown as </a:t>
+            </a:r>
+            <a:r>
+              <a:rPr>
+                <a:latin typeface="Courier"/>
+              </a:rPr>
+              <a:t>aic_rank</a:t>
+            </a:r>
+            <a:r>
+              <a:rPr/>
+              <a:t> and </a:t>
+            </a:r>
+            <a:r>
+              <a:rPr>
+                <a:latin typeface="Courier"/>
+              </a:rPr>
+              <a:t>bic_rank</a:t>
+            </a:r>
+            <a:r>
+              <a:rPr/>
+              <a:t>.</a:t>
+            </a:r>
+          </a:p>
+          <a:p>
+            <a:pPr lvl="0" indent="0" marL="0">
+              <a:buNone/>
+            </a:pPr>
+            <a:r>
+              <a:rPr/>
+              <a:t>This shows that the Qualifications model is preferred to the other three model specifications, then the Health model. The Foundation model is third, and the model with both appears too complex and is not preferred to the Foundational model.</a:t>
+            </a:r>
+          </a:p>
+          <a:p>
+            <a:pPr lvl="0" indent="0" marL="0">
+              <a:buNone/>
+            </a:pPr>
+            <a:r>
+              <a:rPr/>
+              <a:t>There is no difference in the rank ordering of models preferred by the AIC and BIC metrics.</a:t>
             </a:r>
           </a:p>
         </p:txBody>

</xml_diff>

<commit_message>
update main presentation with change in composition slides
</commit_message>
<xml_diff>
--- a/notebooks/21_summary_presentation.pptx
+++ b/notebooks/21_summary_presentation.pptx
@@ -18,6 +18,10 @@
     <p:sldId id="266" r:id="rId12"/>
     <p:sldId id="267" r:id="rId13"/>
     <p:sldId id="268" r:id="rId14"/>
+    <p:sldId id="269" r:id="rId15"/>
+    <p:sldId id="270" r:id="rId16"/>
+    <p:sldId id="271" r:id="rId17"/>
+    <p:sldId id="272" r:id="rId18"/>
   </p:sldIdLst>
   <p:sldSz cx="9144000" cy="5143500" type="screen16x9"/>
   <p:notesSz cx="6858000" cy="9144000"/>
@@ -3559,6 +3563,583 @@
                 <a:tableStyleId>{5C22544A-7EE6-4342-B048-85BDC9FD1C3A}</a:tableStyleId>
               </a:tblPr>
               <a:tblGrid>
+                <a:gridCol w="2057400"/>
+                <a:gridCol w="2057400"/>
+                <a:gridCol w="2057400"/>
+                <a:gridCol w="2057400"/>
+              </a:tblGrid>
+              <a:tr h="0">
+                <a:tc>
+                  <a:txBody>
+                    <a:bodyPr/>
+                    <a:lstStyle/>
+                    <a:p>
+                      <a:pPr lvl="0" indent="0" marL="0" algn="l">
+                        <a:buNone/>
+                      </a:pPr>
+                      <a:r>
+                        <a:rPr/>
+                        <a:t>state</a:t>
+                      </a:r>
+                    </a:p>
+                  </a:txBody>
+                  <a:tcPr/>
+                </a:tc>
+                <a:tc>
+                  <a:txBody>
+                    <a:bodyPr/>
+                    <a:lstStyle/>
+                    <a:p>
+                      <a:pPr lvl="0" indent="0" marL="0" algn="r">
+                        <a:buNone/>
+                      </a:pPr>
+                      <a:r>
+                        <a:rPr/>
+                        <a:t>counter_health</a:t>
+                      </a:r>
+                    </a:p>
+                  </a:txBody>
+                  <a:tcPr/>
+                </a:tc>
+                <a:tc>
+                  <a:txBody>
+                    <a:bodyPr/>
+                    <a:lstStyle/>
+                    <a:p>
+                      <a:pPr lvl="0" indent="0" marL="0" algn="r">
+                        <a:buNone/>
+                      </a:pPr>
+                      <a:r>
+                        <a:rPr/>
+                        <a:t>counter_quals</a:t>
+                      </a:r>
+                    </a:p>
+                  </a:txBody>
+                  <a:tcPr/>
+                </a:tc>
+                <a:tc>
+                  <a:txBody>
+                    <a:bodyPr/>
+                    <a:lstStyle/>
+                    <a:p>
+                      <a:pPr lvl="0" indent="0" marL="0" algn="r">
+                        <a:buNone/>
+                      </a:pPr>
+                      <a:r>
+                        <a:rPr/>
+                        <a:t>counter_both</a:t>
+                      </a:r>
+                    </a:p>
+                  </a:txBody>
+                  <a:tcPr/>
+                </a:tc>
+              </a:tr>
+              <a:tr h="0">
+                <a:tc>
+                  <a:txBody>
+                    <a:bodyPr/>
+                    <a:lstStyle/>
+                    <a:p>
+                      <a:pPr lvl="0" indent="0" marL="0" algn="l">
+                        <a:buNone/>
+                      </a:pPr>
+                      <a:r>
+                        <a:rPr/>
+                        <a:t>Employed</a:t>
+                      </a:r>
+                    </a:p>
+                  </a:txBody>
+                </a:tc>
+                <a:tc>
+                  <a:txBody>
+                    <a:bodyPr/>
+                    <a:lstStyle/>
+                    <a:p>
+                      <a:pPr lvl="0" indent="0" marL="0" algn="r">
+                        <a:buNone/>
+                      </a:pPr>
+                      <a:r>
+                        <a:rPr/>
+                        <a:t>102.4</a:t>
+                      </a:r>
+                    </a:p>
+                  </a:txBody>
+                </a:tc>
+                <a:tc>
+                  <a:txBody>
+                    <a:bodyPr/>
+                    <a:lstStyle/>
+                    <a:p>
+                      <a:pPr lvl="0" indent="0" marL="0" algn="r">
+                        <a:buNone/>
+                      </a:pPr>
+                      <a:r>
+                        <a:rPr/>
+                        <a:t>100.7</a:t>
+                      </a:r>
+                    </a:p>
+                  </a:txBody>
+                </a:tc>
+                <a:tc>
+                  <a:txBody>
+                    <a:bodyPr/>
+                    <a:lstStyle/>
+                    <a:p>
+                      <a:pPr lvl="0" indent="0" marL="0" algn="r">
+                        <a:buNone/>
+                      </a:pPr>
+                      <a:r>
+                        <a:rPr/>
+                        <a:t>103.1</a:t>
+                      </a:r>
+                    </a:p>
+                  </a:txBody>
+                </a:tc>
+              </a:tr>
+              <a:tr h="0">
+                <a:tc>
+                  <a:txBody>
+                    <a:bodyPr/>
+                    <a:lstStyle/>
+                    <a:p>
+                      <a:pPr lvl="0" indent="0" marL="0" algn="l">
+                        <a:buNone/>
+                      </a:pPr>
+                      <a:r>
+                        <a:rPr/>
+                        <a:t>Unemployed</a:t>
+                      </a:r>
+                    </a:p>
+                  </a:txBody>
+                </a:tc>
+                <a:tc>
+                  <a:txBody>
+                    <a:bodyPr/>
+                    <a:lstStyle/>
+                    <a:p>
+                      <a:pPr lvl="0" indent="0" marL="0" algn="r">
+                        <a:buNone/>
+                      </a:pPr>
+                      <a:r>
+                        <a:rPr/>
+                        <a:t>87.7</a:t>
+                      </a:r>
+                    </a:p>
+                  </a:txBody>
+                </a:tc>
+                <a:tc>
+                  <a:txBody>
+                    <a:bodyPr/>
+                    <a:lstStyle/>
+                    <a:p>
+                      <a:pPr lvl="0" indent="0" marL="0" algn="r">
+                        <a:buNone/>
+                      </a:pPr>
+                      <a:r>
+                        <a:rPr/>
+                        <a:t>90.0</a:t>
+                      </a:r>
+                    </a:p>
+                  </a:txBody>
+                </a:tc>
+                <a:tc>
+                  <a:txBody>
+                    <a:bodyPr/>
+                    <a:lstStyle/>
+                    <a:p>
+                      <a:pPr lvl="0" indent="0" marL="0" algn="r">
+                        <a:buNone/>
+                      </a:pPr>
+                      <a:r>
+                        <a:rPr/>
+                        <a:t>78.1</a:t>
+                      </a:r>
+                    </a:p>
+                  </a:txBody>
+                </a:tc>
+              </a:tr>
+              <a:tr h="0">
+                <a:tc>
+                  <a:txBody>
+                    <a:bodyPr/>
+                    <a:lstStyle/>
+                    <a:p>
+                      <a:pPr lvl="0" indent="0" marL="0" algn="l">
+                        <a:buNone/>
+                      </a:pPr>
+                      <a:r>
+                        <a:rPr/>
+                        <a:t>Inactive student</a:t>
+                      </a:r>
+                    </a:p>
+                  </a:txBody>
+                </a:tc>
+                <a:tc>
+                  <a:txBody>
+                    <a:bodyPr/>
+                    <a:lstStyle/>
+                    <a:p>
+                      <a:pPr lvl="0" indent="0" marL="0" algn="r">
+                        <a:buNone/>
+                      </a:pPr>
+                      <a:r>
+                        <a:rPr/>
+                        <a:t>106.7</a:t>
+                      </a:r>
+                    </a:p>
+                  </a:txBody>
+                </a:tc>
+                <a:tc>
+                  <a:txBody>
+                    <a:bodyPr/>
+                    <a:lstStyle/>
+                    <a:p>
+                      <a:pPr lvl="0" indent="0" marL="0" algn="r">
+                        <a:buNone/>
+                      </a:pPr>
+                      <a:r>
+                        <a:rPr/>
+                        <a:t>121.1</a:t>
+                      </a:r>
+                    </a:p>
+                  </a:txBody>
+                </a:tc>
+                <a:tc>
+                  <a:txBody>
+                    <a:bodyPr/>
+                    <a:lstStyle/>
+                    <a:p>
+                      <a:pPr lvl="0" indent="0" marL="0" algn="r">
+                        <a:buNone/>
+                      </a:pPr>
+                      <a:r>
+                        <a:rPr/>
+                        <a:t>130.0</a:t>
+                      </a:r>
+                    </a:p>
+                  </a:txBody>
+                </a:tc>
+              </a:tr>
+              <a:tr h="0">
+                <a:tc>
+                  <a:txBody>
+                    <a:bodyPr/>
+                    <a:lstStyle/>
+                    <a:p>
+                      <a:pPr lvl="0" indent="0" marL="0" algn="l">
+                        <a:buNone/>
+                      </a:pPr>
+                      <a:r>
+                        <a:rPr/>
+                        <a:t>Inactive care</a:t>
+                      </a:r>
+                    </a:p>
+                  </a:txBody>
+                </a:tc>
+                <a:tc>
+                  <a:txBody>
+                    <a:bodyPr/>
+                    <a:lstStyle/>
+                    <a:p>
+                      <a:pPr lvl="0" indent="0" marL="0" algn="r">
+                        <a:buNone/>
+                      </a:pPr>
+                      <a:r>
+                        <a:rPr/>
+                        <a:t>98.6</a:t>
+                      </a:r>
+                    </a:p>
+                  </a:txBody>
+                </a:tc>
+                <a:tc>
+                  <a:txBody>
+                    <a:bodyPr/>
+                    <a:lstStyle/>
+                    <a:p>
+                      <a:pPr lvl="0" indent="0" marL="0" algn="r">
+                        <a:buNone/>
+                      </a:pPr>
+                      <a:r>
+                        <a:rPr/>
+                        <a:t>88.5</a:t>
+                      </a:r>
+                    </a:p>
+                  </a:txBody>
+                </a:tc>
+                <a:tc>
+                  <a:txBody>
+                    <a:bodyPr/>
+                    <a:lstStyle/>
+                    <a:p>
+                      <a:pPr lvl="0" indent="0" marL="0" algn="r">
+                        <a:buNone/>
+                      </a:pPr>
+                      <a:r>
+                        <a:rPr/>
+                        <a:t>86.3</a:t>
+                      </a:r>
+                    </a:p>
+                  </a:txBody>
+                </a:tc>
+              </a:tr>
+              <a:tr h="0">
+                <a:tc>
+                  <a:txBody>
+                    <a:bodyPr/>
+                    <a:lstStyle/>
+                    <a:p>
+                      <a:pPr lvl="0" indent="0" marL="0" algn="l">
+                        <a:buNone/>
+                      </a:pPr>
+                      <a:r>
+                        <a:rPr/>
+                        <a:t>Inactive long term sick</a:t>
+                      </a:r>
+                    </a:p>
+                  </a:txBody>
+                </a:tc>
+                <a:tc>
+                  <a:txBody>
+                    <a:bodyPr/>
+                    <a:lstStyle/>
+                    <a:p>
+                      <a:pPr lvl="0" indent="0" marL="0" algn="r">
+                        <a:buNone/>
+                      </a:pPr>
+                      <a:r>
+                        <a:rPr/>
+                        <a:t>69.6</a:t>
+                      </a:r>
+                    </a:p>
+                  </a:txBody>
+                </a:tc>
+                <a:tc>
+                  <a:txBody>
+                    <a:bodyPr/>
+                    <a:lstStyle/>
+                    <a:p>
+                      <a:pPr lvl="0" indent="0" marL="0" algn="r">
+                        <a:buNone/>
+                      </a:pPr>
+                      <a:r>
+                        <a:rPr/>
+                        <a:t>93.8</a:t>
+                      </a:r>
+                    </a:p>
+                  </a:txBody>
+                </a:tc>
+                <a:tc>
+                  <a:txBody>
+                    <a:bodyPr/>
+                    <a:lstStyle/>
+                    <a:p>
+                      <a:pPr lvl="0" indent="0" marL="0" algn="r">
+                        <a:buNone/>
+                      </a:pPr>
+                      <a:r>
+                        <a:rPr/>
+                        <a:t>64.2</a:t>
+                      </a:r>
+                    </a:p>
+                  </a:txBody>
+                </a:tc>
+              </a:tr>
+              <a:tr h="0">
+                <a:tc>
+                  <a:txBody>
+                    <a:bodyPr/>
+                    <a:lstStyle/>
+                    <a:p>
+                      <a:pPr lvl="0" indent="0" marL="0" algn="l">
+                        <a:buNone/>
+                      </a:pPr>
+                      <a:r>
+                        <a:rPr/>
+                        <a:t>Inactive retired</a:t>
+                      </a:r>
+                    </a:p>
+                  </a:txBody>
+                </a:tc>
+                <a:tc>
+                  <a:txBody>
+                    <a:bodyPr/>
+                    <a:lstStyle/>
+                    <a:p>
+                      <a:pPr lvl="0" indent="0" marL="0" algn="r">
+                        <a:buNone/>
+                      </a:pPr>
+                      <a:r>
+                        <a:rPr/>
+                        <a:t>98.8</a:t>
+                      </a:r>
+                    </a:p>
+                  </a:txBody>
+                </a:tc>
+                <a:tc>
+                  <a:txBody>
+                    <a:bodyPr/>
+                    <a:lstStyle/>
+                    <a:p>
+                      <a:pPr lvl="0" indent="0" marL="0" algn="r">
+                        <a:buNone/>
+                      </a:pPr>
+                      <a:r>
+                        <a:rPr/>
+                        <a:t>112.6</a:t>
+                      </a:r>
+                    </a:p>
+                  </a:txBody>
+                </a:tc>
+                <a:tc>
+                  <a:txBody>
+                    <a:bodyPr/>
+                    <a:lstStyle/>
+                    <a:p>
+                      <a:pPr lvl="0" indent="0" marL="0" algn="r">
+                        <a:buNone/>
+                      </a:pPr>
+                      <a:r>
+                        <a:rPr/>
+                        <a:t>111.8</a:t>
+                      </a:r>
+                    </a:p>
+                  </a:txBody>
+                </a:tc>
+              </a:tr>
+              <a:tr h="0">
+                <a:tc>
+                  <a:txBody>
+                    <a:bodyPr/>
+                    <a:lstStyle/>
+                    <a:p>
+                      <a:pPr lvl="0" indent="0" marL="0" algn="l">
+                        <a:buNone/>
+                      </a:pPr>
+                      <a:r>
+                        <a:rPr/>
+                        <a:t>Inactive other</a:t>
+                      </a:r>
+                    </a:p>
+                  </a:txBody>
+                </a:tc>
+                <a:tc>
+                  <a:txBody>
+                    <a:bodyPr/>
+                    <a:lstStyle/>
+                    <a:p>
+                      <a:pPr lvl="0" indent="0" marL="0" algn="r">
+                        <a:buNone/>
+                      </a:pPr>
+                      <a:r>
+                        <a:rPr/>
+                        <a:t>86.9</a:t>
+                      </a:r>
+                    </a:p>
+                  </a:txBody>
+                </a:tc>
+                <a:tc>
+                  <a:txBody>
+                    <a:bodyPr/>
+                    <a:lstStyle/>
+                    <a:p>
+                      <a:pPr lvl="0" indent="0" marL="0" algn="r">
+                        <a:buNone/>
+                      </a:pPr>
+                      <a:r>
+                        <a:rPr/>
+                        <a:t>119.2</a:t>
+                      </a:r>
+                    </a:p>
+                  </a:txBody>
+                </a:tc>
+                <a:tc>
+                  <a:txBody>
+                    <a:bodyPr/>
+                    <a:lstStyle/>
+                    <a:p>
+                      <a:pPr lvl="0" indent="0" marL="0" algn="r">
+                        <a:buNone/>
+                      </a:pPr>
+                      <a:r>
+                        <a:rPr/>
+                        <a:t>103.4</a:t>
+                      </a:r>
+                    </a:p>
+                  </a:txBody>
+                </a:tc>
+              </a:tr>
+            </a:tbl>
+          </a:graphicData>
+        </a:graphic>
+      </p:graphicFrame>
+    </p:spTree>
+  </p:cSld>
+</p:sld>
+</file>
+
+<file path=ppt/slides/slide14.xml><?xml version="1.0" encoding="utf-8"?>
+<p:sld xmlns:a="http://schemas.openxmlformats.org/drawingml/2006/main" xmlns:r="http://schemas.openxmlformats.org/officeDocument/2006/relationships" xmlns:p="http://schemas.openxmlformats.org/presentationml/2006/main">
+  <p:cSld>
+    <p:spTree>
+      <p:nvGrpSpPr>
+        <p:cNvPr id="1" name=""/>
+        <p:cNvGrpSpPr/>
+        <p:nvPr/>
+      </p:nvGrpSpPr>
+      <p:grpSpPr>
+        <a:xfrm>
+          <a:off x="0" y="0"/>
+          <a:ext cx="0" cy="0"/>
+          <a:chOff x="0" y="0"/>
+          <a:chExt cx="0" cy="0"/>
+        </a:xfrm>
+      </p:grpSpPr>
+      <p:sp>
+        <p:nvSpPr>
+          <p:cNvPr id="2" name="Title 1"/>
+          <p:cNvSpPr>
+            <a:spLocks noGrp="1"/>
+          </p:cNvSpPr>
+          <p:nvPr>
+            <p:ph type="title"/>
+          </p:nvPr>
+        </p:nvSpPr>
+        <p:spPr/>
+        <p:txBody>
+          <a:bodyPr/>
+          <a:lstStyle/>
+          <a:p>
+            <a:pPr lvl="0" indent="0" marL="0">
+              <a:buNone/>
+            </a:pPr>
+            <a:r>
+              <a:rPr/>
+              <a:t>Absolute changes, as a table</a:t>
+            </a:r>
+          </a:p>
+        </p:txBody>
+      </p:sp>
+      <p:graphicFrame>
+        <p:nvGraphicFramePr>
+          <p:cNvPr id="6" name="Content Placeholder 5"/>
+          <p:cNvGraphicFramePr>
+            <a:graphicFrameLocks noGrp="1"/>
+          </p:cNvGraphicFramePr>
+          <p:nvPr>
+            <p:ph idx="1"/>
+          </p:nvPr>
+        </p:nvGraphicFramePr>
+        <p:xfrm>
+          <a:off x="457200" y="1193800"/>
+          <a:ext cx="8229600" cy="3390900"/>
+        </p:xfrm>
+        <a:graphic>
+          <a:graphicData uri="http://schemas.openxmlformats.org/drawingml/2006/table">
+            <a:tbl>
+              <a:tblPr firstRow="1" bandRow="1">
+                <a:tableStyleId>{5C22544A-7EE6-4342-B048-85BDC9FD1C3A}</a:tableStyleId>
+              </a:tblPr>
+              <a:tblGrid>
                 <a:gridCol w="1638300"/>
                 <a:gridCol w="1638300"/>
                 <a:gridCol w="1638300"/>
@@ -3576,7 +4157,7 @@
                       </a:pPr>
                       <a:r>
                         <a:rPr/>
-                        <a:t>output</a:t>
+                        <a:t>state</a:t>
                       </a:r>
                     </a:p>
                   </a:txBody>
@@ -3587,12 +4168,12 @@
                     <a:bodyPr/>
                     <a:lstStyle/>
                     <a:p>
-                      <a:pPr lvl="0" indent="0" marL="0" algn="l">
-                        <a:buNone/>
-                      </a:pPr>
-                      <a:r>
-                        <a:rPr/>
-                        <a:t>state</a:t>
+                      <a:pPr lvl="0" indent="0" marL="0" algn="r">
+                        <a:buNone/>
+                      </a:pPr>
+                      <a:r>
+                        <a:rPr/>
+                        <a:t>baseline</a:t>
                       </a:r>
                     </a:p>
                   </a:txBody>
@@ -3658,21 +4239,6 @@
                       </a:pPr>
                       <a:r>
                         <a:rPr/>
-                        <a:t>relative</a:t>
-                      </a:r>
-                    </a:p>
-                  </a:txBody>
-                </a:tc>
-                <a:tc>
-                  <a:txBody>
-                    <a:bodyPr/>
-                    <a:lstStyle/>
-                    <a:p>
-                      <a:pPr lvl="0" indent="0" marL="0" algn="l">
-                        <a:buNone/>
-                      </a:pPr>
-                      <a:r>
-                        <a:rPr/>
                         <a:t>Employed</a:t>
                       </a:r>
                     </a:p>
@@ -3688,37 +4254,52 @@
                       </a:pPr>
                       <a:r>
                         <a:rPr/>
-                        <a:t>102.4</a:t>
-                      </a:r>
-                    </a:p>
-                  </a:txBody>
-                </a:tc>
-                <a:tc>
-                  <a:txBody>
-                    <a:bodyPr/>
-                    <a:lstStyle/>
-                    <a:p>
-                      <a:pPr lvl="0" indent="0" marL="0" algn="r">
-                        <a:buNone/>
-                      </a:pPr>
-                      <a:r>
-                        <a:rPr/>
-                        <a:t>100.7</a:t>
-                      </a:r>
-                    </a:p>
-                  </a:txBody>
-                </a:tc>
-                <a:tc>
-                  <a:txBody>
-                    <a:bodyPr/>
-                    <a:lstStyle/>
-                    <a:p>
-                      <a:pPr lvl="0" indent="0" marL="0" algn="r">
-                        <a:buNone/>
-                      </a:pPr>
-                      <a:r>
-                        <a:rPr/>
-                        <a:t>103.1</a:t>
+                        <a:t>12572.39686</a:t>
+                      </a:r>
+                    </a:p>
+                  </a:txBody>
+                </a:tc>
+                <a:tc>
+                  <a:txBody>
+                    <a:bodyPr/>
+                    <a:lstStyle/>
+                    <a:p>
+                      <a:pPr lvl="0" indent="0" marL="0" algn="r">
+                        <a:buNone/>
+                      </a:pPr>
+                      <a:r>
+                        <a:rPr/>
+                        <a:t>12878.38916</a:t>
+                      </a:r>
+                    </a:p>
+                  </a:txBody>
+                </a:tc>
+                <a:tc>
+                  <a:txBody>
+                    <a:bodyPr/>
+                    <a:lstStyle/>
+                    <a:p>
+                      <a:pPr lvl="0" indent="0" marL="0" algn="r">
+                        <a:buNone/>
+                      </a:pPr>
+                      <a:r>
+                        <a:rPr/>
+                        <a:t>12665.04858</a:t>
+                      </a:r>
+                    </a:p>
+                  </a:txBody>
+                </a:tc>
+                <a:tc>
+                  <a:txBody>
+                    <a:bodyPr/>
+                    <a:lstStyle/>
+                    <a:p>
+                      <a:pPr lvl="0" indent="0" marL="0" algn="r">
+                        <a:buNone/>
+                      </a:pPr>
+                      <a:r>
+                        <a:rPr/>
+                        <a:t>12967.62307</a:t>
                       </a:r>
                     </a:p>
                   </a:txBody>
@@ -3735,67 +4316,67 @@
                       </a:pPr>
                       <a:r>
                         <a:rPr/>
-                        <a:t>relative</a:t>
-                      </a:r>
-                    </a:p>
-                  </a:txBody>
-                </a:tc>
-                <a:tc>
-                  <a:txBody>
-                    <a:bodyPr/>
-                    <a:lstStyle/>
-                    <a:p>
-                      <a:pPr lvl="0" indent="0" marL="0" algn="l">
-                        <a:buNone/>
-                      </a:pPr>
-                      <a:r>
-                        <a:rPr/>
-                        <a:t>Unemployed</a:t>
-                      </a:r>
-                    </a:p>
-                  </a:txBody>
-                </a:tc>
-                <a:tc>
-                  <a:txBody>
-                    <a:bodyPr/>
-                    <a:lstStyle/>
-                    <a:p>
-                      <a:pPr lvl="0" indent="0" marL="0" algn="r">
-                        <a:buNone/>
-                      </a:pPr>
-                      <a:r>
-                        <a:rPr/>
-                        <a:t>87.7</a:t>
-                      </a:r>
-                    </a:p>
-                  </a:txBody>
-                </a:tc>
-                <a:tc>
-                  <a:txBody>
-                    <a:bodyPr/>
-                    <a:lstStyle/>
-                    <a:p>
-                      <a:pPr lvl="0" indent="0" marL="0" algn="r">
-                        <a:buNone/>
-                      </a:pPr>
-                      <a:r>
-                        <a:rPr/>
-                        <a:t>90.0</a:t>
-                      </a:r>
-                    </a:p>
-                  </a:txBody>
-                </a:tc>
-                <a:tc>
-                  <a:txBody>
-                    <a:bodyPr/>
-                    <a:lstStyle/>
-                    <a:p>
-                      <a:pPr lvl="0" indent="0" marL="0" algn="r">
-                        <a:buNone/>
-                      </a:pPr>
-                      <a:r>
-                        <a:rPr/>
-                        <a:t>78.1</a:t>
+                        <a:t>Inactive care</a:t>
+                      </a:r>
+                    </a:p>
+                  </a:txBody>
+                </a:tc>
+                <a:tc>
+                  <a:txBody>
+                    <a:bodyPr/>
+                    <a:lstStyle/>
+                    <a:p>
+                      <a:pPr lvl="0" indent="0" marL="0" algn="r">
+                        <a:buNone/>
+                      </a:pPr>
+                      <a:r>
+                        <a:rPr/>
+                        <a:t>799.75053</a:t>
+                      </a:r>
+                    </a:p>
+                  </a:txBody>
+                </a:tc>
+                <a:tc>
+                  <a:txBody>
+                    <a:bodyPr/>
+                    <a:lstStyle/>
+                    <a:p>
+                      <a:pPr lvl="0" indent="0" marL="0" algn="r">
+                        <a:buNone/>
+                      </a:pPr>
+                      <a:r>
+                        <a:rPr/>
+                        <a:t>788.84507</a:t>
+                      </a:r>
+                    </a:p>
+                  </a:txBody>
+                </a:tc>
+                <a:tc>
+                  <a:txBody>
+                    <a:bodyPr/>
+                    <a:lstStyle/>
+                    <a:p>
+                      <a:pPr lvl="0" indent="0" marL="0" algn="r">
+                        <a:buNone/>
+                      </a:pPr>
+                      <a:r>
+                        <a:rPr/>
+                        <a:t>707.97660</a:t>
+                      </a:r>
+                    </a:p>
+                  </a:txBody>
+                </a:tc>
+                <a:tc>
+                  <a:txBody>
+                    <a:bodyPr/>
+                    <a:lstStyle/>
+                    <a:p>
+                      <a:pPr lvl="0" indent="0" marL="0" algn="r">
+                        <a:buNone/>
+                      </a:pPr>
+                      <a:r>
+                        <a:rPr/>
+                        <a:t>690.47038</a:t>
                       </a:r>
                     </a:p>
                   </a:txBody>
@@ -3812,67 +4393,67 @@
                       </a:pPr>
                       <a:r>
                         <a:rPr/>
-                        <a:t>relative</a:t>
-                      </a:r>
-                    </a:p>
-                  </a:txBody>
-                </a:tc>
-                <a:tc>
-                  <a:txBody>
-                    <a:bodyPr/>
-                    <a:lstStyle/>
-                    <a:p>
-                      <a:pPr lvl="0" indent="0" marL="0" algn="l">
-                        <a:buNone/>
-                      </a:pPr>
-                      <a:r>
-                        <a:rPr/>
-                        <a:t>Inactive student</a:t>
-                      </a:r>
-                    </a:p>
-                  </a:txBody>
-                </a:tc>
-                <a:tc>
-                  <a:txBody>
-                    <a:bodyPr/>
-                    <a:lstStyle/>
-                    <a:p>
-                      <a:pPr lvl="0" indent="0" marL="0" algn="r">
-                        <a:buNone/>
-                      </a:pPr>
-                      <a:r>
-                        <a:rPr/>
-                        <a:t>106.7</a:t>
-                      </a:r>
-                    </a:p>
-                  </a:txBody>
-                </a:tc>
-                <a:tc>
-                  <a:txBody>
-                    <a:bodyPr/>
-                    <a:lstStyle/>
-                    <a:p>
-                      <a:pPr lvl="0" indent="0" marL="0" algn="r">
-                        <a:buNone/>
-                      </a:pPr>
-                      <a:r>
-                        <a:rPr/>
-                        <a:t>121.1</a:t>
-                      </a:r>
-                    </a:p>
-                  </a:txBody>
-                </a:tc>
-                <a:tc>
-                  <a:txBody>
-                    <a:bodyPr/>
-                    <a:lstStyle/>
-                    <a:p>
-                      <a:pPr lvl="0" indent="0" marL="0" algn="r">
-                        <a:buNone/>
-                      </a:pPr>
-                      <a:r>
-                        <a:rPr/>
-                        <a:t>130.0</a:t>
+                        <a:t>Inactive long term sick</a:t>
+                      </a:r>
+                    </a:p>
+                  </a:txBody>
+                </a:tc>
+                <a:tc>
+                  <a:txBody>
+                    <a:bodyPr/>
+                    <a:lstStyle/>
+                    <a:p>
+                      <a:pPr lvl="0" indent="0" marL="0" algn="r">
+                        <a:buNone/>
+                      </a:pPr>
+                      <a:r>
+                        <a:rPr/>
+                        <a:t>708.17263</a:t>
+                      </a:r>
+                    </a:p>
+                  </a:txBody>
+                </a:tc>
+                <a:tc>
+                  <a:txBody>
+                    <a:bodyPr/>
+                    <a:lstStyle/>
+                    <a:p>
+                      <a:pPr lvl="0" indent="0" marL="0" algn="r">
+                        <a:buNone/>
+                      </a:pPr>
+                      <a:r>
+                        <a:rPr/>
+                        <a:t>493.19533</a:t>
+                      </a:r>
+                    </a:p>
+                  </a:txBody>
+                </a:tc>
+                <a:tc>
+                  <a:txBody>
+                    <a:bodyPr/>
+                    <a:lstStyle/>
+                    <a:p>
+                      <a:pPr lvl="0" indent="0" marL="0" algn="r">
+                        <a:buNone/>
+                      </a:pPr>
+                      <a:r>
+                        <a:rPr/>
+                        <a:t>664.52715</a:t>
+                      </a:r>
+                    </a:p>
+                  </a:txBody>
+                </a:tc>
+                <a:tc>
+                  <a:txBody>
+                    <a:bodyPr/>
+                    <a:lstStyle/>
+                    <a:p>
+                      <a:pPr lvl="0" indent="0" marL="0" algn="r">
+                        <a:buNone/>
+                      </a:pPr>
+                      <a:r>
+                        <a:rPr/>
+                        <a:t>454.79876</a:t>
                       </a:r>
                     </a:p>
                   </a:txBody>
@@ -3889,67 +4470,67 @@
                       </a:pPr>
                       <a:r>
                         <a:rPr/>
-                        <a:t>relative</a:t>
-                      </a:r>
-                    </a:p>
-                  </a:txBody>
-                </a:tc>
-                <a:tc>
-                  <a:txBody>
-                    <a:bodyPr/>
-                    <a:lstStyle/>
-                    <a:p>
-                      <a:pPr lvl="0" indent="0" marL="0" algn="l">
-                        <a:buNone/>
-                      </a:pPr>
-                      <a:r>
-                        <a:rPr/>
-                        <a:t>Inactive care</a:t>
-                      </a:r>
-                    </a:p>
-                  </a:txBody>
-                </a:tc>
-                <a:tc>
-                  <a:txBody>
-                    <a:bodyPr/>
-                    <a:lstStyle/>
-                    <a:p>
-                      <a:pPr lvl="0" indent="0" marL="0" algn="r">
-                        <a:buNone/>
-                      </a:pPr>
-                      <a:r>
-                        <a:rPr/>
-                        <a:t>98.6</a:t>
-                      </a:r>
-                    </a:p>
-                  </a:txBody>
-                </a:tc>
-                <a:tc>
-                  <a:txBody>
-                    <a:bodyPr/>
-                    <a:lstStyle/>
-                    <a:p>
-                      <a:pPr lvl="0" indent="0" marL="0" algn="r">
-                        <a:buNone/>
-                      </a:pPr>
-                      <a:r>
-                        <a:rPr/>
-                        <a:t>88.5</a:t>
-                      </a:r>
-                    </a:p>
-                  </a:txBody>
-                </a:tc>
-                <a:tc>
-                  <a:txBody>
-                    <a:bodyPr/>
-                    <a:lstStyle/>
-                    <a:p>
-                      <a:pPr lvl="0" indent="0" marL="0" algn="r">
-                        <a:buNone/>
-                      </a:pPr>
-                      <a:r>
-                        <a:rPr/>
-                        <a:t>86.3</a:t>
+                        <a:t>Inactive other</a:t>
+                      </a:r>
+                    </a:p>
+                  </a:txBody>
+                </a:tc>
+                <a:tc>
+                  <a:txBody>
+                    <a:bodyPr/>
+                    <a:lstStyle/>
+                    <a:p>
+                      <a:pPr lvl="0" indent="0" marL="0" algn="r">
+                        <a:buNone/>
+                      </a:pPr>
+                      <a:r>
+                        <a:rPr/>
+                        <a:t>66.90592</a:t>
+                      </a:r>
+                    </a:p>
+                  </a:txBody>
+                </a:tc>
+                <a:tc>
+                  <a:txBody>
+                    <a:bodyPr/>
+                    <a:lstStyle/>
+                    <a:p>
+                      <a:pPr lvl="0" indent="0" marL="0" algn="r">
+                        <a:buNone/>
+                      </a:pPr>
+                      <a:r>
+                        <a:rPr/>
+                        <a:t>58.14845</a:t>
+                      </a:r>
+                    </a:p>
+                  </a:txBody>
+                </a:tc>
+                <a:tc>
+                  <a:txBody>
+                    <a:bodyPr/>
+                    <a:lstStyle/>
+                    <a:p>
+                      <a:pPr lvl="0" indent="0" marL="0" algn="r">
+                        <a:buNone/>
+                      </a:pPr>
+                      <a:r>
+                        <a:rPr/>
+                        <a:t>79.72435</a:t>
+                      </a:r>
+                    </a:p>
+                  </a:txBody>
+                </a:tc>
+                <a:tc>
+                  <a:txBody>
+                    <a:bodyPr/>
+                    <a:lstStyle/>
+                    <a:p>
+                      <a:pPr lvl="0" indent="0" marL="0" algn="r">
+                        <a:buNone/>
+                      </a:pPr>
+                      <a:r>
+                        <a:rPr/>
+                        <a:t>69.16837</a:t>
                       </a:r>
                     </a:p>
                   </a:txBody>
@@ -3966,67 +4547,67 @@
                       </a:pPr>
                       <a:r>
                         <a:rPr/>
-                        <a:t>relative</a:t>
-                      </a:r>
-                    </a:p>
-                  </a:txBody>
-                </a:tc>
-                <a:tc>
-                  <a:txBody>
-                    <a:bodyPr/>
-                    <a:lstStyle/>
-                    <a:p>
-                      <a:pPr lvl="0" indent="0" marL="0" algn="l">
-                        <a:buNone/>
-                      </a:pPr>
-                      <a:r>
-                        <a:rPr/>
-                        <a:t>Inactive long term sick</a:t>
-                      </a:r>
-                    </a:p>
-                  </a:txBody>
-                </a:tc>
-                <a:tc>
-                  <a:txBody>
-                    <a:bodyPr/>
-                    <a:lstStyle/>
-                    <a:p>
-                      <a:pPr lvl="0" indent="0" marL="0" algn="r">
-                        <a:buNone/>
-                      </a:pPr>
-                      <a:r>
-                        <a:rPr/>
-                        <a:t>69.6</a:t>
-                      </a:r>
-                    </a:p>
-                  </a:txBody>
-                </a:tc>
-                <a:tc>
-                  <a:txBody>
-                    <a:bodyPr/>
-                    <a:lstStyle/>
-                    <a:p>
-                      <a:pPr lvl="0" indent="0" marL="0" algn="r">
-                        <a:buNone/>
-                      </a:pPr>
-                      <a:r>
-                        <a:rPr/>
-                        <a:t>93.8</a:t>
-                      </a:r>
-                    </a:p>
-                  </a:txBody>
-                </a:tc>
-                <a:tc>
-                  <a:txBody>
-                    <a:bodyPr/>
-                    <a:lstStyle/>
-                    <a:p>
-                      <a:pPr lvl="0" indent="0" marL="0" algn="r">
-                        <a:buNone/>
-                      </a:pPr>
-                      <a:r>
-                        <a:rPr/>
-                        <a:t>64.2</a:t>
+                        <a:t>Inactive retired</a:t>
+                      </a:r>
+                    </a:p>
+                  </a:txBody>
+                </a:tc>
+                <a:tc>
+                  <a:txBody>
+                    <a:bodyPr/>
+                    <a:lstStyle/>
+                    <a:p>
+                      <a:pPr lvl="0" indent="0" marL="0" algn="r">
+                        <a:buNone/>
+                      </a:pPr>
+                      <a:r>
+                        <a:rPr/>
+                        <a:t>527.51858</a:t>
+                      </a:r>
+                    </a:p>
+                  </a:txBody>
+                </a:tc>
+                <a:tc>
+                  <a:txBody>
+                    <a:bodyPr/>
+                    <a:lstStyle/>
+                    <a:p>
+                      <a:pPr lvl="0" indent="0" marL="0" algn="r">
+                        <a:buNone/>
+                      </a:pPr>
+                      <a:r>
+                        <a:rPr/>
+                        <a:t>521.25689</a:t>
+                      </a:r>
+                    </a:p>
+                  </a:txBody>
+                </a:tc>
+                <a:tc>
+                  <a:txBody>
+                    <a:bodyPr/>
+                    <a:lstStyle/>
+                    <a:p>
+                      <a:pPr lvl="0" indent="0" marL="0" algn="r">
+                        <a:buNone/>
+                      </a:pPr>
+                      <a:r>
+                        <a:rPr/>
+                        <a:t>594.04442</a:t>
+                      </a:r>
+                    </a:p>
+                  </a:txBody>
+                </a:tc>
+                <a:tc>
+                  <a:txBody>
+                    <a:bodyPr/>
+                    <a:lstStyle/>
+                    <a:p>
+                      <a:pPr lvl="0" indent="0" marL="0" algn="r">
+                        <a:buNone/>
+                      </a:pPr>
+                      <a:r>
+                        <a:rPr/>
+                        <a:t>589.75623</a:t>
                       </a:r>
                     </a:p>
                   </a:txBody>
@@ -4043,67 +4624,67 @@
                       </a:pPr>
                       <a:r>
                         <a:rPr/>
-                        <a:t>relative</a:t>
-                      </a:r>
-                    </a:p>
-                  </a:txBody>
-                </a:tc>
-                <a:tc>
-                  <a:txBody>
-                    <a:bodyPr/>
-                    <a:lstStyle/>
-                    <a:p>
-                      <a:pPr lvl="0" indent="0" marL="0" algn="l">
-                        <a:buNone/>
-                      </a:pPr>
-                      <a:r>
-                        <a:rPr/>
-                        <a:t>Inactive retired</a:t>
-                      </a:r>
-                    </a:p>
-                  </a:txBody>
-                </a:tc>
-                <a:tc>
-                  <a:txBody>
-                    <a:bodyPr/>
-                    <a:lstStyle/>
-                    <a:p>
-                      <a:pPr lvl="0" indent="0" marL="0" algn="r">
-                        <a:buNone/>
-                      </a:pPr>
-                      <a:r>
-                        <a:rPr/>
-                        <a:t>98.8</a:t>
-                      </a:r>
-                    </a:p>
-                  </a:txBody>
-                </a:tc>
-                <a:tc>
-                  <a:txBody>
-                    <a:bodyPr/>
-                    <a:lstStyle/>
-                    <a:p>
-                      <a:pPr lvl="0" indent="0" marL="0" algn="r">
-                        <a:buNone/>
-                      </a:pPr>
-                      <a:r>
-                        <a:rPr/>
-                        <a:t>112.6</a:t>
-                      </a:r>
-                    </a:p>
-                  </a:txBody>
-                </a:tc>
-                <a:tc>
-                  <a:txBody>
-                    <a:bodyPr/>
-                    <a:lstStyle/>
-                    <a:p>
-                      <a:pPr lvl="0" indent="0" marL="0" algn="r">
-                        <a:buNone/>
-                      </a:pPr>
-                      <a:r>
-                        <a:rPr/>
-                        <a:t>111.8</a:t>
+                        <a:t>Inactive student</a:t>
+                      </a:r>
+                    </a:p>
+                  </a:txBody>
+                </a:tc>
+                <a:tc>
+                  <a:txBody>
+                    <a:bodyPr/>
+                    <a:lstStyle/>
+                    <a:p>
+                      <a:pPr lvl="0" indent="0" marL="0" algn="r">
+                        <a:buNone/>
+                      </a:pPr>
+                      <a:r>
+                        <a:rPr/>
+                        <a:t>102.51298</a:t>
+                      </a:r>
+                    </a:p>
+                  </a:txBody>
+                </a:tc>
+                <a:tc>
+                  <a:txBody>
+                    <a:bodyPr/>
+                    <a:lstStyle/>
+                    <a:p>
+                      <a:pPr lvl="0" indent="0" marL="0" algn="r">
+                        <a:buNone/>
+                      </a:pPr>
+                      <a:r>
+                        <a:rPr/>
+                        <a:t>109.35547</a:t>
+                      </a:r>
+                    </a:p>
+                  </a:txBody>
+                </a:tc>
+                <a:tc>
+                  <a:txBody>
+                    <a:bodyPr/>
+                    <a:lstStyle/>
+                    <a:p>
+                      <a:pPr lvl="0" indent="0" marL="0" algn="r">
+                        <a:buNone/>
+                      </a:pPr>
+                      <a:r>
+                        <a:rPr/>
+                        <a:t>124.13801</a:t>
+                      </a:r>
+                    </a:p>
+                  </a:txBody>
+                </a:tc>
+                <a:tc>
+                  <a:txBody>
+                    <a:bodyPr/>
+                    <a:lstStyle/>
+                    <a:p>
+                      <a:pPr lvl="0" indent="0" marL="0" algn="r">
+                        <a:buNone/>
+                      </a:pPr>
+                      <a:r>
+                        <a:rPr/>
+                        <a:t>133.27551</a:t>
                       </a:r>
                     </a:p>
                   </a:txBody>
@@ -4120,67 +4701,67 @@
                       </a:pPr>
                       <a:r>
                         <a:rPr/>
-                        <a:t>relative</a:t>
-                      </a:r>
-                    </a:p>
-                  </a:txBody>
-                </a:tc>
-                <a:tc>
-                  <a:txBody>
-                    <a:bodyPr/>
-                    <a:lstStyle/>
-                    <a:p>
-                      <a:pPr lvl="0" indent="0" marL="0" algn="l">
-                        <a:buNone/>
-                      </a:pPr>
-                      <a:r>
-                        <a:rPr/>
-                        <a:t>Inactive other</a:t>
-                      </a:r>
-                    </a:p>
-                  </a:txBody>
-                </a:tc>
-                <a:tc>
-                  <a:txBody>
-                    <a:bodyPr/>
-                    <a:lstStyle/>
-                    <a:p>
-                      <a:pPr lvl="0" indent="0" marL="0" algn="r">
-                        <a:buNone/>
-                      </a:pPr>
-                      <a:r>
-                        <a:rPr/>
-                        <a:t>86.9</a:t>
-                      </a:r>
-                    </a:p>
-                  </a:txBody>
-                </a:tc>
-                <a:tc>
-                  <a:txBody>
-                    <a:bodyPr/>
-                    <a:lstStyle/>
-                    <a:p>
-                      <a:pPr lvl="0" indent="0" marL="0" algn="r">
-                        <a:buNone/>
-                      </a:pPr>
-                      <a:r>
-                        <a:rPr/>
-                        <a:t>119.2</a:t>
-                      </a:r>
-                    </a:p>
-                  </a:txBody>
-                </a:tc>
-                <a:tc>
-                  <a:txBody>
-                    <a:bodyPr/>
-                    <a:lstStyle/>
-                    <a:p>
-                      <a:pPr lvl="0" indent="0" marL="0" algn="r">
-                        <a:buNone/>
-                      </a:pPr>
-                      <a:r>
-                        <a:rPr/>
-                        <a:t>103.4</a:t>
+                        <a:t>Unemployed</a:t>
+                      </a:r>
+                    </a:p>
+                  </a:txBody>
+                </a:tc>
+                <a:tc>
+                  <a:txBody>
+                    <a:bodyPr/>
+                    <a:lstStyle/>
+                    <a:p>
+                      <a:pPr lvl="0" indent="0" marL="0" algn="r">
+                        <a:buNone/>
+                      </a:pPr>
+                      <a:r>
+                        <a:rPr/>
+                        <a:t>582.74250</a:t>
+                      </a:r>
+                    </a:p>
+                  </a:txBody>
+                </a:tc>
+                <a:tc>
+                  <a:txBody>
+                    <a:bodyPr/>
+                    <a:lstStyle/>
+                    <a:p>
+                      <a:pPr lvl="0" indent="0" marL="0" algn="r">
+                        <a:buNone/>
+                      </a:pPr>
+                      <a:r>
+                        <a:rPr/>
+                        <a:t>510.80963</a:t>
+                      </a:r>
+                    </a:p>
+                  </a:txBody>
+                </a:tc>
+                <a:tc>
+                  <a:txBody>
+                    <a:bodyPr/>
+                    <a:lstStyle/>
+                    <a:p>
+                      <a:pPr lvl="0" indent="0" marL="0" algn="r">
+                        <a:buNone/>
+                      </a:pPr>
+                      <a:r>
+                        <a:rPr/>
+                        <a:t>524.54089</a:t>
+                      </a:r>
+                    </a:p>
+                  </a:txBody>
+                </a:tc>
+                <a:tc>
+                  <a:txBody>
+                    <a:bodyPr/>
+                    <a:lstStyle/>
+                    <a:p>
+                      <a:pPr lvl="0" indent="0" marL="0" algn="r">
+                        <a:buNone/>
+                      </a:pPr>
+                      <a:r>
+                        <a:rPr/>
+                        <a:t>454.90767</a:t>
                       </a:r>
                     </a:p>
                   </a:txBody>
@@ -4190,6 +4771,903 @@
           </a:graphicData>
         </a:graphic>
       </p:graphicFrame>
+    </p:spTree>
+  </p:cSld>
+</p:sld>
+</file>
+
+<file path=ppt/slides/slide15.xml><?xml version="1.0" encoding="utf-8"?>
+<p:sld xmlns:a="http://schemas.openxmlformats.org/drawingml/2006/main" xmlns:r="http://schemas.openxmlformats.org/officeDocument/2006/relationships" xmlns:p="http://schemas.openxmlformats.org/presentationml/2006/main">
+  <p:cSld>
+    <p:spTree>
+      <p:nvGrpSpPr>
+        <p:cNvPr id="1" name=""/>
+        <p:cNvGrpSpPr/>
+        <p:nvPr/>
+      </p:nvGrpSpPr>
+      <p:grpSpPr>
+        <a:xfrm>
+          <a:off x="0" y="0"/>
+          <a:ext cx="0" cy="0"/>
+          <a:chOff x="0" y="0"/>
+          <a:chExt cx="0" cy="0"/>
+        </a:xfrm>
+      </p:grpSpPr>
+      <p:sp>
+        <p:nvSpPr>
+          <p:cNvPr id="2" name="Title 1"/>
+          <p:cNvSpPr>
+            <a:spLocks noGrp="1"/>
+          </p:cNvSpPr>
+          <p:nvPr>
+            <p:ph type="title"/>
+          </p:nvPr>
+        </p:nvSpPr>
+        <p:spPr/>
+        <p:txBody>
+          <a:bodyPr/>
+          <a:lstStyle/>
+          <a:p>
+            <a:pPr lvl="0" indent="0" marL="0">
+              <a:buNone/>
+            </a:pPr>
+            <a:r>
+              <a:rPr/>
+              <a:t>Absolute, as a graph</a:t>
+            </a:r>
+          </a:p>
+        </p:txBody>
+      </p:sp>
+      <p:pic>
+        <p:nvPicPr>
+          <p:cNvPr descr="21_summary_presentation_files/figure-pptx/unnamed-chunk-9-1.png" id="0" name="Picture 1"/>
+          <p:cNvPicPr>
+            <a:picLocks noGrp="1" noChangeAspect="1"/>
+          </p:cNvPicPr>
+          <p:nvPr/>
+        </p:nvPicPr>
+        <p:blipFill>
+          <a:blip r:embed="rId2"/>
+          <a:stretch>
+            <a:fillRect/>
+          </a:stretch>
+        </p:blipFill>
+        <p:spPr bwMode="auto">
+          <a:xfrm>
+            <a:off x="1181100" y="1193800"/>
+            <a:ext cx="6781800" cy="3390900"/>
+          </a:xfrm>
+          <a:prstGeom prst="rect">
+            <a:avLst/>
+          </a:prstGeom>
+          <a:noFill/>
+          <a:ln w="9525">
+            <a:noFill/>
+            <a:headEnd/>
+            <a:tailEnd/>
+          </a:ln>
+        </p:spPr>
+      </p:pic>
+    </p:spTree>
+  </p:cSld>
+</p:sld>
+</file>
+
+<file path=ppt/slides/slide16.xml><?xml version="1.0" encoding="utf-8"?>
+<p:sld xmlns:a="http://schemas.openxmlformats.org/drawingml/2006/main" xmlns:r="http://schemas.openxmlformats.org/officeDocument/2006/relationships" xmlns:p="http://schemas.openxmlformats.org/presentationml/2006/main">
+  <p:cSld>
+    <p:spTree>
+      <p:nvGrpSpPr>
+        <p:cNvPr id="1" name=""/>
+        <p:cNvGrpSpPr/>
+        <p:nvPr/>
+      </p:nvGrpSpPr>
+      <p:grpSpPr>
+        <a:xfrm>
+          <a:off x="0" y="0"/>
+          <a:ext cx="0" cy="0"/>
+          <a:chOff x="0" y="0"/>
+          <a:chExt cx="0" cy="0"/>
+        </a:xfrm>
+      </p:grpSpPr>
+      <p:sp>
+        <p:nvSpPr>
+          <p:cNvPr id="2" name="Title 1"/>
+          <p:cNvSpPr>
+            <a:spLocks noGrp="1"/>
+          </p:cNvSpPr>
+          <p:nvPr>
+            <p:ph type="title"/>
+          </p:nvPr>
+        </p:nvSpPr>
+        <p:spPr>
+          <a:xfrm>
+            <a:off x="457201" y="204787"/>
+            <a:ext cx="3008313" cy="871538"/>
+          </a:xfrm>
+        </p:spPr>
+        <p:txBody>
+          <a:bodyPr/>
+          <a:lstStyle/>
+          <a:p>
+            <a:pPr lvl="0" indent="0" marL="0">
+              <a:buNone/>
+            </a:pPr>
+            <a:r>
+              <a:rPr/>
+              <a:t>Table of changes in proportions under each scenario</a:t>
+            </a:r>
+          </a:p>
+        </p:txBody>
+      </p:sp>
+      <p:sp>
+        <p:nvSpPr>
+          <p:cNvPr id="4" name="Text Placeholder 3"/>
+          <p:cNvSpPr>
+            <a:spLocks noGrp="1"/>
+          </p:cNvSpPr>
+          <p:nvPr>
+            <p:ph idx="2" sz="half" type="body"/>
+          </p:nvPr>
+        </p:nvSpPr>
+        <p:spPr/>
+        <p:txBody>
+          <a:bodyPr/>
+          <a:lstStyle/>
+          <a:p>
+            <a:pPr lvl="0" indent="0" marL="0">
+              <a:buNone/>
+            </a:pPr>
+            <a:r>
+              <a:rPr/>
+              <a:t>Let’s see how the distribution of persons in each state is estimated to change</a:t>
+            </a:r>
+          </a:p>
+        </p:txBody>
+      </p:sp>
+      <p:graphicFrame>
+        <p:nvGraphicFramePr>
+          <p:cNvPr id="6" name="Content Placeholder 5"/>
+          <p:cNvGraphicFramePr>
+            <a:graphicFrameLocks noGrp="1"/>
+          </p:cNvGraphicFramePr>
+          <p:nvPr>
+            <p:ph idx="1"/>
+          </p:nvPr>
+        </p:nvGraphicFramePr>
+        <p:xfrm>
+          <a:off x="3568700" y="203200"/>
+          <a:ext cx="5105400" cy="4381500"/>
+        </p:xfrm>
+        <a:graphic>
+          <a:graphicData uri="http://schemas.openxmlformats.org/drawingml/2006/table">
+            <a:tbl>
+              <a:tblPr firstRow="1" bandRow="1">
+                <a:tableStyleId>{5C22544A-7EE6-4342-B048-85BDC9FD1C3A}</a:tableStyleId>
+              </a:tblPr>
+              <a:tblGrid>
+                <a:gridCol w="1016000"/>
+                <a:gridCol w="1016000"/>
+                <a:gridCol w="1016000"/>
+                <a:gridCol w="1016000"/>
+                <a:gridCol w="1016000"/>
+              </a:tblGrid>
+              <a:tr h="0">
+                <a:tc>
+                  <a:txBody>
+                    <a:bodyPr/>
+                    <a:lstStyle/>
+                    <a:p>
+                      <a:pPr lvl="0" indent="0" marL="0" algn="l">
+                        <a:buNone/>
+                      </a:pPr>
+                      <a:r>
+                        <a:rPr/>
+                        <a:t>state</a:t>
+                      </a:r>
+                    </a:p>
+                  </a:txBody>
+                  <a:tcPr/>
+                </a:tc>
+                <a:tc>
+                  <a:txBody>
+                    <a:bodyPr/>
+                    <a:lstStyle/>
+                    <a:p>
+                      <a:pPr lvl="0" indent="0" marL="0" algn="r">
+                        <a:buNone/>
+                      </a:pPr>
+                      <a:r>
+                        <a:rPr/>
+                        <a:t>baseline</a:t>
+                      </a:r>
+                    </a:p>
+                  </a:txBody>
+                  <a:tcPr/>
+                </a:tc>
+                <a:tc>
+                  <a:txBody>
+                    <a:bodyPr/>
+                    <a:lstStyle/>
+                    <a:p>
+                      <a:pPr lvl="0" indent="0" marL="0" algn="r">
+                        <a:buNone/>
+                      </a:pPr>
+                      <a:r>
+                        <a:rPr/>
+                        <a:t>counter_health</a:t>
+                      </a:r>
+                    </a:p>
+                  </a:txBody>
+                  <a:tcPr/>
+                </a:tc>
+                <a:tc>
+                  <a:txBody>
+                    <a:bodyPr/>
+                    <a:lstStyle/>
+                    <a:p>
+                      <a:pPr lvl="0" indent="0" marL="0" algn="r">
+                        <a:buNone/>
+                      </a:pPr>
+                      <a:r>
+                        <a:rPr/>
+                        <a:t>counter_quals</a:t>
+                      </a:r>
+                    </a:p>
+                  </a:txBody>
+                  <a:tcPr/>
+                </a:tc>
+                <a:tc>
+                  <a:txBody>
+                    <a:bodyPr/>
+                    <a:lstStyle/>
+                    <a:p>
+                      <a:pPr lvl="0" indent="0" marL="0" algn="r">
+                        <a:buNone/>
+                      </a:pPr>
+                      <a:r>
+                        <a:rPr/>
+                        <a:t>counter_both</a:t>
+                      </a:r>
+                    </a:p>
+                  </a:txBody>
+                  <a:tcPr/>
+                </a:tc>
+              </a:tr>
+              <a:tr h="0">
+                <a:tc>
+                  <a:txBody>
+                    <a:bodyPr/>
+                    <a:lstStyle/>
+                    <a:p>
+                      <a:pPr lvl="0" indent="0" marL="0" algn="l">
+                        <a:buNone/>
+                      </a:pPr>
+                      <a:r>
+                        <a:rPr/>
+                        <a:t>Employed</a:t>
+                      </a:r>
+                    </a:p>
+                  </a:txBody>
+                </a:tc>
+                <a:tc>
+                  <a:txBody>
+                    <a:bodyPr/>
+                    <a:lstStyle/>
+                    <a:p>
+                      <a:pPr lvl="0" indent="0" marL="0" algn="r">
+                        <a:buNone/>
+                      </a:pPr>
+                      <a:r>
+                        <a:rPr/>
+                        <a:t>81.85</a:t>
+                      </a:r>
+                    </a:p>
+                  </a:txBody>
+                </a:tc>
+                <a:tc>
+                  <a:txBody>
+                    <a:bodyPr/>
+                    <a:lstStyle/>
+                    <a:p>
+                      <a:pPr lvl="0" indent="0" marL="0" algn="r">
+                        <a:buNone/>
+                      </a:pPr>
+                      <a:r>
+                        <a:rPr/>
+                        <a:t>83.84</a:t>
+                      </a:r>
+                    </a:p>
+                  </a:txBody>
+                </a:tc>
+                <a:tc>
+                  <a:txBody>
+                    <a:bodyPr/>
+                    <a:lstStyle/>
+                    <a:p>
+                      <a:pPr lvl="0" indent="0" marL="0" algn="r">
+                        <a:buNone/>
+                      </a:pPr>
+                      <a:r>
+                        <a:rPr/>
+                        <a:t>82.45</a:t>
+                      </a:r>
+                    </a:p>
+                  </a:txBody>
+                </a:tc>
+                <a:tc>
+                  <a:txBody>
+                    <a:bodyPr/>
+                    <a:lstStyle/>
+                    <a:p>
+                      <a:pPr lvl="0" indent="0" marL="0" algn="r">
+                        <a:buNone/>
+                      </a:pPr>
+                      <a:r>
+                        <a:rPr/>
+                        <a:t>84.42</a:t>
+                      </a:r>
+                    </a:p>
+                  </a:txBody>
+                </a:tc>
+              </a:tr>
+              <a:tr h="0">
+                <a:tc>
+                  <a:txBody>
+                    <a:bodyPr/>
+                    <a:lstStyle/>
+                    <a:p>
+                      <a:pPr lvl="0" indent="0" marL="0" algn="l">
+                        <a:buNone/>
+                      </a:pPr>
+                      <a:r>
+                        <a:rPr/>
+                        <a:t>Inactive care</a:t>
+                      </a:r>
+                    </a:p>
+                  </a:txBody>
+                </a:tc>
+                <a:tc>
+                  <a:txBody>
+                    <a:bodyPr/>
+                    <a:lstStyle/>
+                    <a:p>
+                      <a:pPr lvl="0" indent="0" marL="0" algn="r">
+                        <a:buNone/>
+                      </a:pPr>
+                      <a:r>
+                        <a:rPr/>
+                        <a:t>5.21</a:t>
+                      </a:r>
+                    </a:p>
+                  </a:txBody>
+                </a:tc>
+                <a:tc>
+                  <a:txBody>
+                    <a:bodyPr/>
+                    <a:lstStyle/>
+                    <a:p>
+                      <a:pPr lvl="0" indent="0" marL="0" algn="r">
+                        <a:buNone/>
+                      </a:pPr>
+                      <a:r>
+                        <a:rPr/>
+                        <a:t>5.14</a:t>
+                      </a:r>
+                    </a:p>
+                  </a:txBody>
+                </a:tc>
+                <a:tc>
+                  <a:txBody>
+                    <a:bodyPr/>
+                    <a:lstStyle/>
+                    <a:p>
+                      <a:pPr lvl="0" indent="0" marL="0" algn="r">
+                        <a:buNone/>
+                      </a:pPr>
+                      <a:r>
+                        <a:rPr/>
+                        <a:t>4.61</a:t>
+                      </a:r>
+                    </a:p>
+                  </a:txBody>
+                </a:tc>
+                <a:tc>
+                  <a:txBody>
+                    <a:bodyPr/>
+                    <a:lstStyle/>
+                    <a:p>
+                      <a:pPr lvl="0" indent="0" marL="0" algn="r">
+                        <a:buNone/>
+                      </a:pPr>
+                      <a:r>
+                        <a:rPr/>
+                        <a:t>4.50</a:t>
+                      </a:r>
+                    </a:p>
+                  </a:txBody>
+                </a:tc>
+              </a:tr>
+              <a:tr h="0">
+                <a:tc>
+                  <a:txBody>
+                    <a:bodyPr/>
+                    <a:lstStyle/>
+                    <a:p>
+                      <a:pPr lvl="0" indent="0" marL="0" algn="l">
+                        <a:buNone/>
+                      </a:pPr>
+                      <a:r>
+                        <a:rPr/>
+                        <a:t>Inactive long term sick</a:t>
+                      </a:r>
+                    </a:p>
+                  </a:txBody>
+                </a:tc>
+                <a:tc>
+                  <a:txBody>
+                    <a:bodyPr/>
+                    <a:lstStyle/>
+                    <a:p>
+                      <a:pPr lvl="0" indent="0" marL="0" algn="r">
+                        <a:buNone/>
+                      </a:pPr>
+                      <a:r>
+                        <a:rPr/>
+                        <a:t>4.61</a:t>
+                      </a:r>
+                    </a:p>
+                  </a:txBody>
+                </a:tc>
+                <a:tc>
+                  <a:txBody>
+                    <a:bodyPr/>
+                    <a:lstStyle/>
+                    <a:p>
+                      <a:pPr lvl="0" indent="0" marL="0" algn="r">
+                        <a:buNone/>
+                      </a:pPr>
+                      <a:r>
+                        <a:rPr/>
+                        <a:t>3.21</a:t>
+                      </a:r>
+                    </a:p>
+                  </a:txBody>
+                </a:tc>
+                <a:tc>
+                  <a:txBody>
+                    <a:bodyPr/>
+                    <a:lstStyle/>
+                    <a:p>
+                      <a:pPr lvl="0" indent="0" marL="0" algn="r">
+                        <a:buNone/>
+                      </a:pPr>
+                      <a:r>
+                        <a:rPr/>
+                        <a:t>4.33</a:t>
+                      </a:r>
+                    </a:p>
+                  </a:txBody>
+                </a:tc>
+                <a:tc>
+                  <a:txBody>
+                    <a:bodyPr/>
+                    <a:lstStyle/>
+                    <a:p>
+                      <a:pPr lvl="0" indent="0" marL="0" algn="r">
+                        <a:buNone/>
+                      </a:pPr>
+                      <a:r>
+                        <a:rPr/>
+                        <a:t>2.96</a:t>
+                      </a:r>
+                    </a:p>
+                  </a:txBody>
+                </a:tc>
+              </a:tr>
+              <a:tr h="0">
+                <a:tc>
+                  <a:txBody>
+                    <a:bodyPr/>
+                    <a:lstStyle/>
+                    <a:p>
+                      <a:pPr lvl="0" indent="0" marL="0" algn="l">
+                        <a:buNone/>
+                      </a:pPr>
+                      <a:r>
+                        <a:rPr/>
+                        <a:t>Inactive other</a:t>
+                      </a:r>
+                    </a:p>
+                  </a:txBody>
+                </a:tc>
+                <a:tc>
+                  <a:txBody>
+                    <a:bodyPr/>
+                    <a:lstStyle/>
+                    <a:p>
+                      <a:pPr lvl="0" indent="0" marL="0" algn="r">
+                        <a:buNone/>
+                      </a:pPr>
+                      <a:r>
+                        <a:rPr/>
+                        <a:t>0.44</a:t>
+                      </a:r>
+                    </a:p>
+                  </a:txBody>
+                </a:tc>
+                <a:tc>
+                  <a:txBody>
+                    <a:bodyPr/>
+                    <a:lstStyle/>
+                    <a:p>
+                      <a:pPr lvl="0" indent="0" marL="0" algn="r">
+                        <a:buNone/>
+                      </a:pPr>
+                      <a:r>
+                        <a:rPr/>
+                        <a:t>0.38</a:t>
+                      </a:r>
+                    </a:p>
+                  </a:txBody>
+                </a:tc>
+                <a:tc>
+                  <a:txBody>
+                    <a:bodyPr/>
+                    <a:lstStyle/>
+                    <a:p>
+                      <a:pPr lvl="0" indent="0" marL="0" algn="r">
+                        <a:buNone/>
+                      </a:pPr>
+                      <a:r>
+                        <a:rPr/>
+                        <a:t>0.52</a:t>
+                      </a:r>
+                    </a:p>
+                  </a:txBody>
+                </a:tc>
+                <a:tc>
+                  <a:txBody>
+                    <a:bodyPr/>
+                    <a:lstStyle/>
+                    <a:p>
+                      <a:pPr lvl="0" indent="0" marL="0" algn="r">
+                        <a:buNone/>
+                      </a:pPr>
+                      <a:r>
+                        <a:rPr/>
+                        <a:t>0.45</a:t>
+                      </a:r>
+                    </a:p>
+                  </a:txBody>
+                </a:tc>
+              </a:tr>
+              <a:tr h="0">
+                <a:tc>
+                  <a:txBody>
+                    <a:bodyPr/>
+                    <a:lstStyle/>
+                    <a:p>
+                      <a:pPr lvl="0" indent="0" marL="0" algn="l">
+                        <a:buNone/>
+                      </a:pPr>
+                      <a:r>
+                        <a:rPr/>
+                        <a:t>Inactive retired</a:t>
+                      </a:r>
+                    </a:p>
+                  </a:txBody>
+                </a:tc>
+                <a:tc>
+                  <a:txBody>
+                    <a:bodyPr/>
+                    <a:lstStyle/>
+                    <a:p>
+                      <a:pPr lvl="0" indent="0" marL="0" algn="r">
+                        <a:buNone/>
+                      </a:pPr>
+                      <a:r>
+                        <a:rPr/>
+                        <a:t>3.43</a:t>
+                      </a:r>
+                    </a:p>
+                  </a:txBody>
+                </a:tc>
+                <a:tc>
+                  <a:txBody>
+                    <a:bodyPr/>
+                    <a:lstStyle/>
+                    <a:p>
+                      <a:pPr lvl="0" indent="0" marL="0" algn="r">
+                        <a:buNone/>
+                      </a:pPr>
+                      <a:r>
+                        <a:rPr/>
+                        <a:t>3.39</a:t>
+                      </a:r>
+                    </a:p>
+                  </a:txBody>
+                </a:tc>
+                <a:tc>
+                  <a:txBody>
+                    <a:bodyPr/>
+                    <a:lstStyle/>
+                    <a:p>
+                      <a:pPr lvl="0" indent="0" marL="0" algn="r">
+                        <a:buNone/>
+                      </a:pPr>
+                      <a:r>
+                        <a:rPr/>
+                        <a:t>3.87</a:t>
+                      </a:r>
+                    </a:p>
+                  </a:txBody>
+                </a:tc>
+                <a:tc>
+                  <a:txBody>
+                    <a:bodyPr/>
+                    <a:lstStyle/>
+                    <a:p>
+                      <a:pPr lvl="0" indent="0" marL="0" algn="r">
+                        <a:buNone/>
+                      </a:pPr>
+                      <a:r>
+                        <a:rPr/>
+                        <a:t>3.84</a:t>
+                      </a:r>
+                    </a:p>
+                  </a:txBody>
+                </a:tc>
+              </a:tr>
+              <a:tr h="0">
+                <a:tc>
+                  <a:txBody>
+                    <a:bodyPr/>
+                    <a:lstStyle/>
+                    <a:p>
+                      <a:pPr lvl="0" indent="0" marL="0" algn="l">
+                        <a:buNone/>
+                      </a:pPr>
+                      <a:r>
+                        <a:rPr/>
+                        <a:t>Inactive student</a:t>
+                      </a:r>
+                    </a:p>
+                  </a:txBody>
+                </a:tc>
+                <a:tc>
+                  <a:txBody>
+                    <a:bodyPr/>
+                    <a:lstStyle/>
+                    <a:p>
+                      <a:pPr lvl="0" indent="0" marL="0" algn="r">
+                        <a:buNone/>
+                      </a:pPr>
+                      <a:r>
+                        <a:rPr/>
+                        <a:t>0.67</a:t>
+                      </a:r>
+                    </a:p>
+                  </a:txBody>
+                </a:tc>
+                <a:tc>
+                  <a:txBody>
+                    <a:bodyPr/>
+                    <a:lstStyle/>
+                    <a:p>
+                      <a:pPr lvl="0" indent="0" marL="0" algn="r">
+                        <a:buNone/>
+                      </a:pPr>
+                      <a:r>
+                        <a:rPr/>
+                        <a:t>0.71</a:t>
+                      </a:r>
+                    </a:p>
+                  </a:txBody>
+                </a:tc>
+                <a:tc>
+                  <a:txBody>
+                    <a:bodyPr/>
+                    <a:lstStyle/>
+                    <a:p>
+                      <a:pPr lvl="0" indent="0" marL="0" algn="r">
+                        <a:buNone/>
+                      </a:pPr>
+                      <a:r>
+                        <a:rPr/>
+                        <a:t>0.81</a:t>
+                      </a:r>
+                    </a:p>
+                  </a:txBody>
+                </a:tc>
+                <a:tc>
+                  <a:txBody>
+                    <a:bodyPr/>
+                    <a:lstStyle/>
+                    <a:p>
+                      <a:pPr lvl="0" indent="0" marL="0" algn="r">
+                        <a:buNone/>
+                      </a:pPr>
+                      <a:r>
+                        <a:rPr/>
+                        <a:t>0.87</a:t>
+                      </a:r>
+                    </a:p>
+                  </a:txBody>
+                </a:tc>
+              </a:tr>
+              <a:tr h="0">
+                <a:tc>
+                  <a:txBody>
+                    <a:bodyPr/>
+                    <a:lstStyle/>
+                    <a:p>
+                      <a:pPr lvl="0" indent="0" marL="0" algn="l">
+                        <a:buNone/>
+                      </a:pPr>
+                      <a:r>
+                        <a:rPr/>
+                        <a:t>Unemployed</a:t>
+                      </a:r>
+                    </a:p>
+                  </a:txBody>
+                </a:tc>
+                <a:tc>
+                  <a:txBody>
+                    <a:bodyPr/>
+                    <a:lstStyle/>
+                    <a:p>
+                      <a:pPr lvl="0" indent="0" marL="0" algn="r">
+                        <a:buNone/>
+                      </a:pPr>
+                      <a:r>
+                        <a:rPr/>
+                        <a:t>3.79</a:t>
+                      </a:r>
+                    </a:p>
+                  </a:txBody>
+                </a:tc>
+                <a:tc>
+                  <a:txBody>
+                    <a:bodyPr/>
+                    <a:lstStyle/>
+                    <a:p>
+                      <a:pPr lvl="0" indent="0" marL="0" algn="r">
+                        <a:buNone/>
+                      </a:pPr>
+                      <a:r>
+                        <a:rPr/>
+                        <a:t>3.33</a:t>
+                      </a:r>
+                    </a:p>
+                  </a:txBody>
+                </a:tc>
+                <a:tc>
+                  <a:txBody>
+                    <a:bodyPr/>
+                    <a:lstStyle/>
+                    <a:p>
+                      <a:pPr lvl="0" indent="0" marL="0" algn="r">
+                        <a:buNone/>
+                      </a:pPr>
+                      <a:r>
+                        <a:rPr/>
+                        <a:t>3.41</a:t>
+                      </a:r>
+                    </a:p>
+                  </a:txBody>
+                </a:tc>
+                <a:tc>
+                  <a:txBody>
+                    <a:bodyPr/>
+                    <a:lstStyle/>
+                    <a:p>
+                      <a:pPr lvl="0" indent="0" marL="0" algn="r">
+                        <a:buNone/>
+                      </a:pPr>
+                      <a:r>
+                        <a:rPr/>
+                        <a:t>2.96</a:t>
+                      </a:r>
+                    </a:p>
+                  </a:txBody>
+                </a:tc>
+              </a:tr>
+            </a:tbl>
+          </a:graphicData>
+        </a:graphic>
+      </p:graphicFrame>
+    </p:spTree>
+  </p:cSld>
+</p:sld>
+</file>
+
+<file path=ppt/slides/slide17.xml><?xml version="1.0" encoding="utf-8"?>
+<p:sld xmlns:a="http://schemas.openxmlformats.org/drawingml/2006/main" xmlns:r="http://schemas.openxmlformats.org/officeDocument/2006/relationships" xmlns:p="http://schemas.openxmlformats.org/presentationml/2006/main">
+  <p:cSld>
+    <p:spTree>
+      <p:nvGrpSpPr>
+        <p:cNvPr id="1" name=""/>
+        <p:cNvGrpSpPr/>
+        <p:nvPr/>
+      </p:nvGrpSpPr>
+      <p:grpSpPr>
+        <a:xfrm>
+          <a:off x="0" y="0"/>
+          <a:ext cx="0" cy="0"/>
+          <a:chOff x="0" y="0"/>
+          <a:chExt cx="0" cy="0"/>
+        </a:xfrm>
+      </p:grpSpPr>
+      <p:sp>
+        <p:nvSpPr>
+          <p:cNvPr id="2" name="Title 1"/>
+          <p:cNvSpPr>
+            <a:spLocks noGrp="1"/>
+          </p:cNvSpPr>
+          <p:nvPr>
+            <p:ph type="title"/>
+          </p:nvPr>
+        </p:nvSpPr>
+        <p:spPr/>
+        <p:txBody>
+          <a:bodyPr/>
+          <a:lstStyle/>
+          <a:p>
+            <a:pPr lvl="0" indent="0" marL="0">
+              <a:buNone/>
+            </a:pPr>
+            <a:r>
+              <a:rPr/>
+              <a:t>Summary of tables</a:t>
+            </a:r>
+          </a:p>
+        </p:txBody>
+      </p:sp>
+      <p:sp>
+        <p:nvSpPr>
+          <p:cNvPr id="3" name="Content Placeholder 2"/>
+          <p:cNvSpPr>
+            <a:spLocks noGrp="1"/>
+          </p:cNvSpPr>
+          <p:nvPr>
+            <p:ph idx="1"/>
+          </p:nvPr>
+        </p:nvSpPr>
+        <p:spPr/>
+        <p:txBody>
+          <a:bodyPr/>
+          <a:lstStyle/>
+          <a:p>
+            <a:pPr lvl="0"/>
+            <a:r>
+              <a:rPr/>
+              <a:t>Improving general health estimated to reduce size of inactive long-term sick population by more than increasing qualifications</a:t>
+            </a:r>
+          </a:p>
+          <a:p>
+            <a:pPr lvl="0"/>
+            <a:r>
+              <a:rPr/>
+              <a:t>After health, the additional qualifications effect on inactive LT sick are estimated to be somewhat marginal</a:t>
+            </a:r>
+          </a:p>
+          <a:p>
+            <a:pPr lvl="0"/>
+            <a:r>
+              <a:rPr/>
+              <a:t>Both improved health and improved qualifications are associated with higher proportions of the population who are students, and thus economically inactive for this reason.</a:t>
+            </a:r>
+          </a:p>
+          <a:p>
+            <a:pPr lvl="0"/>
+            <a:r>
+              <a:rPr/>
+              <a:t>Improved health is expected to increase the size of the employed population by around 2.4%</a:t>
+            </a:r>
+          </a:p>
+        </p:txBody>
+      </p:sp>
     </p:spTree>
   </p:cSld>
 </p:sld>

</xml_diff>

<commit_message>
add three way comparison"
</commit_message>
<xml_diff>
--- a/notebooks/21_summary_presentation.pptx
+++ b/notebooks/21_summary_presentation.pptx
@@ -22,6 +22,15 @@
     <p:sldId id="270" r:id="rId16"/>
     <p:sldId id="271" r:id="rId17"/>
     <p:sldId id="272" r:id="rId18"/>
+    <p:sldId id="273" r:id="rId19"/>
+    <p:sldId id="274" r:id="rId20"/>
+    <p:sldId id="275" r:id="rId21"/>
+    <p:sldId id="276" r:id="rId22"/>
+    <p:sldId id="277" r:id="rId23"/>
+    <p:sldId id="278" r:id="rId24"/>
+    <p:sldId id="279" r:id="rId25"/>
+    <p:sldId id="280" r:id="rId26"/>
+    <p:sldId id="281" r:id="rId27"/>
   </p:sldIdLst>
   <p:sldSz cx="9144000" cy="5143500" type="screen16x9"/>
   <p:notesSz cx="6858000" cy="9144000"/>
@@ -5673,6 +5682,197 @@
 </p:sld>
 </file>
 
+<file path=ppt/slides/slide18.xml><?xml version="1.0" encoding="utf-8"?>
+<p:sld xmlns:a="http://schemas.openxmlformats.org/drawingml/2006/main" xmlns:r="http://schemas.openxmlformats.org/officeDocument/2006/relationships" xmlns:p="http://schemas.openxmlformats.org/presentationml/2006/main">
+  <p:cSld>
+    <p:spTree>
+      <p:nvGrpSpPr>
+        <p:cNvPr id="1" name=""/>
+        <p:cNvGrpSpPr/>
+        <p:nvPr/>
+      </p:nvGrpSpPr>
+      <p:grpSpPr>
+        <a:xfrm>
+          <a:off x="0" y="0"/>
+          <a:ext cx="0" cy="0"/>
+          <a:chOff x="0" y="0"/>
+          <a:chExt cx="0" cy="0"/>
+        </a:xfrm>
+      </p:grpSpPr>
+      <p:sp>
+        <p:nvSpPr>
+          <p:cNvPr id="2" name="Title 1"/>
+          <p:cNvSpPr>
+            <a:spLocks noGrp="1"/>
+          </p:cNvSpPr>
+          <p:nvPr>
+            <p:ph type="title"/>
+          </p:nvPr>
+        </p:nvSpPr>
+        <p:spPr/>
+        <p:txBody>
+          <a:bodyPr/>
+          <a:lstStyle/>
+          <a:p>
+            <a:pPr lvl="0" indent="0" marL="0">
+              <a:buNone/>
+            </a:pPr>
+            <a:r>
+              <a:rPr/>
+              <a:t>Job quality</a:t>
+            </a:r>
+          </a:p>
+        </p:txBody>
+      </p:sp>
+      <p:sp>
+        <p:nvSpPr>
+          <p:cNvPr id="3" name="Content Placeholder 2"/>
+          <p:cNvSpPr>
+            <a:spLocks noGrp="1"/>
+          </p:cNvSpPr>
+          <p:nvPr>
+            <p:ph idx="1"/>
+          </p:nvPr>
+        </p:nvSpPr>
+        <p:spPr/>
+        <p:txBody>
+          <a:bodyPr/>
+          <a:lstStyle/>
+          <a:p>
+            <a:pPr lvl="0" indent="0" marL="0">
+              <a:buNone/>
+            </a:pPr>
+            <a:r>
+              <a:rPr/>
+              <a:t>We will also look at including measures of job quality in the above. We need to note that as the job quality measure only applies to persons in employment, the PICO frame will need to be adjusted accordingly; i.e this will look only at those who start off in employment, rather than the whole dataset.</a:t>
+            </a:r>
+          </a:p>
+        </p:txBody>
+      </p:sp>
+    </p:spTree>
+  </p:cSld>
+</p:sld>
+</file>
+
+<file path=ppt/slides/slide19.xml><?xml version="1.0" encoding="utf-8"?>
+<p:sld xmlns:a="http://schemas.openxmlformats.org/drawingml/2006/main" xmlns:r="http://schemas.openxmlformats.org/officeDocument/2006/relationships" xmlns:p="http://schemas.openxmlformats.org/presentationml/2006/main">
+  <p:cSld>
+    <p:spTree>
+      <p:nvGrpSpPr>
+        <p:cNvPr id="1" name=""/>
+        <p:cNvGrpSpPr/>
+        <p:nvPr/>
+      </p:nvGrpSpPr>
+      <p:grpSpPr>
+        <a:xfrm>
+          <a:off x="0" y="0"/>
+          <a:ext cx="0" cy="0"/>
+          <a:chOff x="0" y="0"/>
+          <a:chExt cx="0" cy="0"/>
+        </a:xfrm>
+      </p:grpSpPr>
+      <p:sp>
+        <p:nvSpPr>
+          <p:cNvPr id="2" name="Title 1"/>
+          <p:cNvSpPr>
+            <a:spLocks noGrp="1"/>
+          </p:cNvSpPr>
+          <p:nvPr>
+            <p:ph type="title"/>
+          </p:nvPr>
+        </p:nvSpPr>
+        <p:spPr/>
+        <p:txBody>
+          <a:bodyPr/>
+          <a:lstStyle/>
+          <a:p>
+            <a:pPr lvl="0" indent="0" marL="0">
+              <a:buNone/>
+            </a:pPr>
+            <a:r>
+              <a:rPr/>
+              <a:t>PICO of above</a:t>
+            </a:r>
+          </a:p>
+        </p:txBody>
+      </p:sp>
+      <p:sp>
+        <p:nvSpPr>
+          <p:cNvPr id="3" name="Content Placeholder 2"/>
+          <p:cNvSpPr>
+            <a:spLocks noGrp="1"/>
+          </p:cNvSpPr>
+          <p:nvPr>
+            <p:ph idx="1"/>
+          </p:nvPr>
+        </p:nvSpPr>
+        <p:spPr/>
+        <p:txBody>
+          <a:bodyPr/>
+          <a:lstStyle/>
+          <a:p>
+            <a:pPr lvl="0"/>
+            <a:r>
+              <a:rPr/>
+              <a:t>Population: Persons in employment at time T</a:t>
+            </a:r>
+          </a:p>
+          <a:p>
+            <a:pPr lvl="1"/>
+            <a:r>
+              <a:rPr/>
+              <a:t>Aged 25-60 years of age</a:t>
+            </a:r>
+          </a:p>
+          <a:p>
+            <a:pPr lvl="0"/>
+            <a:r>
+              <a:rPr/>
+              <a:t>Intervention:</a:t>
+            </a:r>
+          </a:p>
+          <a:p>
+            <a:pPr lvl="1"/>
+            <a:r>
+              <a:rPr/>
+              <a:t>Qualifications: up one level</a:t>
+            </a:r>
+          </a:p>
+          <a:p>
+            <a:pPr lvl="1"/>
+            <a:r>
+              <a:rPr/>
+              <a:t>Health: up one SD</a:t>
+            </a:r>
+          </a:p>
+          <a:p>
+            <a:pPr lvl="1"/>
+            <a:r>
+              <a:rPr/>
+              <a:t>Job quality:</a:t>
+            </a:r>
+          </a:p>
+          <a:p>
+            <a:pPr lvl="2"/>
+            <a:r>
+              <a:rPr/>
+              <a:t>Initially just the job satisfaction item</a:t>
+            </a:r>
+          </a:p>
+          <a:p>
+            <a:pPr lvl="1"/>
+            <a:r>
+              <a:rPr/>
+              <a:t>Both individually and in combination</a:t>
+            </a:r>
+          </a:p>
+        </p:txBody>
+      </p:sp>
+    </p:spTree>
+  </p:cSld>
+</p:sld>
+</file>
+
 <file path=ppt/slides/slide2.xml><?xml version="1.0" encoding="utf-8"?>
 <p:sld xmlns:a="http://schemas.openxmlformats.org/drawingml/2006/main" xmlns:r="http://schemas.openxmlformats.org/officeDocument/2006/relationships" xmlns:p="http://schemas.openxmlformats.org/presentationml/2006/main">
   <p:cSld>
@@ -5800,6 +6000,2709 @@
           </a:p>
         </p:txBody>
       </p:sp>
+    </p:spTree>
+  </p:cSld>
+</p:sld>
+</file>
+
+<file path=ppt/slides/slide20.xml><?xml version="1.0" encoding="utf-8"?>
+<p:sld xmlns:a="http://schemas.openxmlformats.org/drawingml/2006/main" xmlns:r="http://schemas.openxmlformats.org/officeDocument/2006/relationships" xmlns:p="http://schemas.openxmlformats.org/presentationml/2006/main">
+  <p:cSld>
+    <p:spTree>
+      <p:nvGrpSpPr>
+        <p:cNvPr id="1" name=""/>
+        <p:cNvGrpSpPr/>
+        <p:nvPr/>
+      </p:nvGrpSpPr>
+      <p:grpSpPr>
+        <a:xfrm>
+          <a:off x="0" y="0"/>
+          <a:ext cx="0" cy="0"/>
+          <a:chOff x="0" y="0"/>
+          <a:chExt cx="0" cy="0"/>
+        </a:xfrm>
+      </p:grpSpPr>
+      <p:sp>
+        <p:nvSpPr>
+          <p:cNvPr id="2" name="Title 1"/>
+          <p:cNvSpPr>
+            <a:spLocks noGrp="1"/>
+          </p:cNvSpPr>
+          <p:nvPr>
+            <p:ph type="title"/>
+          </p:nvPr>
+        </p:nvSpPr>
+        <p:spPr/>
+        <p:txBody>
+          <a:bodyPr/>
+          <a:lstStyle/>
+          <a:p>
+            <a:pPr lvl="0" indent="0" marL="0">
+              <a:buNone/>
+            </a:pPr>
+            <a:r>
+              <a:rPr/>
+              <a:t>Extracting the data</a:t>
+            </a:r>
+          </a:p>
+        </p:txBody>
+      </p:sp>
+      <p:sp>
+        <p:nvSpPr>
+          <p:cNvPr id="3" name="Content Placeholder 2"/>
+          <p:cNvSpPr>
+            <a:spLocks noGrp="1"/>
+          </p:cNvSpPr>
+          <p:nvPr>
+            <p:ph idx="1"/>
+          </p:nvPr>
+        </p:nvSpPr>
+        <p:spPr/>
+        <p:txBody>
+          <a:bodyPr/>
+          <a:lstStyle/>
+          <a:p>
+            <a:pPr lvl="0" indent="0" marL="0">
+              <a:buNone/>
+            </a:pPr>
+            <a:r>
+              <a:rPr/>
+              <a:t>Now to model</a:t>
+            </a:r>
+          </a:p>
+          <a:p>
+            <a:pPr lvl="0" indent="0">
+              <a:buNone/>
+            </a:pPr>
+            <a:r>
+              <a:rPr>
+                <a:latin typeface="Courier"/>
+              </a:rPr>
+              <a:t># weights:  238 (198 variable)
+initial  value 315040.907222 
+iter  10 value 45115.336913
+iter  20 value 40198.173796
+iter  30 value 37856.887750
+iter  40 value 37298.333019
+iter  50 value 36991.806405
+iter  60 value 36651.119338
+iter  70 value 36634.901503
+iter  80 value 36530.982520
+iter  90 value 36350.693139
+iter 100 value 36345.604315
+final  value 36345.604315 
+stopped after 100 iterations</a:t>
+            </a:r>
+          </a:p>
+          <a:p>
+            <a:pPr lvl="0" indent="0">
+              <a:buNone/>
+            </a:pPr>
+            <a:r>
+              <a:rPr>
+                <a:latin typeface="Courier"/>
+              </a:rPr>
+              <a:t># weights:  259 (216 variable)
+initial  value 315040.907222 
+iter  10 value 48532.315429
+iter  20 value 44172.444734
+iter  30 value 40911.457040
+iter  40 value 38366.001802
+iter  50 value 36953.077939
+iter  60 value 36583.422297
+iter  70 value 36071.038845
+iter  80 value 35918.191376
+iter  90 value 35905.281156
+iter 100 value 35612.664050
+final  value 35612.664050 
+stopped after 100 iterations</a:t>
+            </a:r>
+          </a:p>
+          <a:p>
+            <a:pPr lvl="0" indent="0">
+              <a:buNone/>
+            </a:pPr>
+            <a:r>
+              <a:rPr>
+                <a:latin typeface="Courier"/>
+              </a:rPr>
+              <a:t># weights:  252 (210 variable)
+initial  value 315040.907222 
+iter  10 value 46448.457469
+iter  20 value 41647.238031
+iter  30 value 39092.395254
+iter  40 value 37561.262115
+iter  50 value 37219.912693
+iter  60 value 36772.305050
+iter  70 value 36525.340770
+iter  80 value 36514.588870
+iter  90 value 36233.405516
+iter 100 value 36165.793616
+final  value 36165.793616 
+stopped after 100 iterations</a:t>
+            </a:r>
+          </a:p>
+          <a:p>
+            <a:pPr lvl="0" indent="0">
+              <a:buNone/>
+            </a:pPr>
+            <a:r>
+              <a:rPr>
+                <a:latin typeface="Courier"/>
+              </a:rPr>
+              <a:t># weights:  280 (234 variable)
+initial  value 315040.907222 
+iter  10 value 46003.357316
+iter  20 value 42032.511103
+iter  30 value 38922.620442
+iter  40 value 37881.394941
+iter  50 value 37219.518544
+iter  60 value 36924.210083
+iter  70 value 36717.076100
+iter  80 value 36376.356505
+iter  90 value 36303.088572
+iter 100 value 36288.824344
+final  value 36288.824344 
+stopped after 100 iterations</a:t>
+            </a:r>
+          </a:p>
+          <a:p>
+            <a:pPr lvl="0" indent="0">
+              <a:buNone/>
+            </a:pPr>
+            <a:r>
+              <a:rPr>
+                <a:latin typeface="Courier"/>
+              </a:rPr>
+              <a:t># weights:  315 (264 variable)
+initial  value 315040.907222 
+iter  10 value 56268.651396
+iter  20 value 50312.065073
+iter  30 value 45095.225293
+iter  40 value 41702.346848
+iter  50 value 38757.758106
+iter  60 value 37588.225541
+iter  70 value 37074.333685
+iter  80 value 36697.395568
+iter  90 value 36449.038730
+iter 100 value 36137.385306
+final  value 36137.385306 
+stopped after 100 iterations</a:t>
+            </a:r>
+          </a:p>
+        </p:txBody>
+      </p:sp>
+    </p:spTree>
+  </p:cSld>
+</p:sld>
+</file>
+
+<file path=ppt/slides/slide21.xml><?xml version="1.0" encoding="utf-8"?>
+<p:sld xmlns:a="http://schemas.openxmlformats.org/drawingml/2006/main" xmlns:r="http://schemas.openxmlformats.org/officeDocument/2006/relationships" xmlns:p="http://schemas.openxmlformats.org/presentationml/2006/main">
+  <p:cSld>
+    <p:spTree>
+      <p:nvGrpSpPr>
+        <p:cNvPr id="1" name=""/>
+        <p:cNvGrpSpPr/>
+        <p:nvPr/>
+      </p:nvGrpSpPr>
+      <p:grpSpPr>
+        <a:xfrm>
+          <a:off x="0" y="0"/>
+          <a:ext cx="0" cy="0"/>
+          <a:chOff x="0" y="0"/>
+          <a:chExt cx="0" cy="0"/>
+        </a:xfrm>
+      </p:grpSpPr>
+      <p:sp>
+        <p:nvSpPr>
+          <p:cNvPr id="2" name="Title 1"/>
+          <p:cNvSpPr>
+            <a:spLocks noGrp="1"/>
+          </p:cNvSpPr>
+          <p:nvPr>
+            <p:ph type="title"/>
+          </p:nvPr>
+        </p:nvSpPr>
+        <p:spPr/>
+        <p:txBody>
+          <a:bodyPr/>
+          <a:lstStyle/>
+          <a:p>
+            <a:pPr lvl="0" indent="0" marL="0">
+              <a:buNone/>
+            </a:pPr>
+            <a:r>
+              <a:rPr/>
+              <a:t>Model comparison with three exposure variables</a:t>
+            </a:r>
+          </a:p>
+        </p:txBody>
+      </p:sp>
+      <p:graphicFrame>
+        <p:nvGraphicFramePr>
+          <p:cNvPr id="6" name="Content Placeholder 5"/>
+          <p:cNvGraphicFramePr>
+            <a:graphicFrameLocks noGrp="1"/>
+          </p:cNvGraphicFramePr>
+          <p:nvPr>
+            <p:ph idx="1"/>
+          </p:nvPr>
+        </p:nvGraphicFramePr>
+        <p:xfrm>
+          <a:off x="457200" y="1193800"/>
+          <a:ext cx="8229600" cy="3390900"/>
+        </p:xfrm>
+        <a:graphic>
+          <a:graphicData uri="http://schemas.openxmlformats.org/drawingml/2006/table">
+            <a:tbl>
+              <a:tblPr firstRow="1" bandRow="1">
+                <a:tableStyleId>{5C22544A-7EE6-4342-B048-85BDC9FD1C3A}</a:tableStyleId>
+              </a:tblPr>
+              <a:tblGrid>
+                <a:gridCol w="2743200"/>
+                <a:gridCol w="2743200"/>
+                <a:gridCol w="2743200"/>
+              </a:tblGrid>
+              <a:tr h="0">
+                <a:tc>
+                  <a:txBody>
+                    <a:bodyPr/>
+                    <a:lstStyle/>
+                    <a:p>
+                      <a:endParaRPr/>
+                    </a:p>
+                  </a:txBody>
+                  <a:tcPr/>
+                </a:tc>
+                <a:tc>
+                  <a:txBody>
+                    <a:bodyPr/>
+                    <a:lstStyle/>
+                    <a:p>
+                      <a:pPr lvl="0" indent="0" marL="0" algn="r">
+                        <a:buNone/>
+                      </a:pPr>
+                      <a:r>
+                        <a:rPr/>
+                        <a:t>df</a:t>
+                      </a:r>
+                    </a:p>
+                  </a:txBody>
+                  <a:tcPr/>
+                </a:tc>
+                <a:tc>
+                  <a:txBody>
+                    <a:bodyPr/>
+                    <a:lstStyle/>
+                    <a:p>
+                      <a:pPr lvl="0" indent="0" marL="0" algn="r">
+                        <a:buNone/>
+                      </a:pPr>
+                      <a:r>
+                        <a:rPr/>
+                        <a:t>AIC</a:t>
+                      </a:r>
+                    </a:p>
+                  </a:txBody>
+                  <a:tcPr/>
+                </a:tc>
+              </a:tr>
+              <a:tr h="0">
+                <a:tc>
+                  <a:txBody>
+                    <a:bodyPr/>
+                    <a:lstStyle/>
+                    <a:p>
+                      <a:pPr lvl="0" indent="0" marL="0" algn="l">
+                        <a:buNone/>
+                      </a:pPr>
+                      <a:r>
+                        <a:rPr/>
+                        <a:t>mod_00</a:t>
+                      </a:r>
+                    </a:p>
+                  </a:txBody>
+                </a:tc>
+                <a:tc>
+                  <a:txBody>
+                    <a:bodyPr/>
+                    <a:lstStyle/>
+                    <a:p>
+                      <a:pPr lvl="0" indent="0" marL="0" algn="r">
+                        <a:buNone/>
+                      </a:pPr>
+                      <a:r>
+                        <a:rPr/>
+                        <a:t>126</a:t>
+                      </a:r>
+                    </a:p>
+                  </a:txBody>
+                </a:tc>
+                <a:tc>
+                  <a:txBody>
+                    <a:bodyPr/>
+                    <a:lstStyle/>
+                    <a:p>
+                      <a:pPr lvl="0" indent="0" marL="0" algn="r">
+                        <a:buNone/>
+                      </a:pPr>
+                      <a:r>
+                        <a:rPr/>
+                        <a:t>72943.21</a:t>
+                      </a:r>
+                    </a:p>
+                  </a:txBody>
+                </a:tc>
+              </a:tr>
+              <a:tr h="0">
+                <a:tc>
+                  <a:txBody>
+                    <a:bodyPr/>
+                    <a:lstStyle/>
+                    <a:p>
+                      <a:pPr lvl="0" indent="0" marL="0" algn="l">
+                        <a:buNone/>
+                      </a:pPr>
+                      <a:r>
+                        <a:rPr/>
+                        <a:t>mod_hlth</a:t>
+                      </a:r>
+                    </a:p>
+                  </a:txBody>
+                </a:tc>
+                <a:tc>
+                  <a:txBody>
+                    <a:bodyPr/>
+                    <a:lstStyle/>
+                    <a:p>
+                      <a:pPr lvl="0" indent="0" marL="0" algn="r">
+                        <a:buNone/>
+                      </a:pPr>
+                      <a:r>
+                        <a:rPr/>
+                        <a:t>144</a:t>
+                      </a:r>
+                    </a:p>
+                  </a:txBody>
+                </a:tc>
+                <a:tc>
+                  <a:txBody>
+                    <a:bodyPr/>
+                    <a:lstStyle/>
+                    <a:p>
+                      <a:pPr lvl="0" indent="0" marL="0" algn="r">
+                        <a:buNone/>
+                      </a:pPr>
+                      <a:r>
+                        <a:rPr/>
+                        <a:t>71513.33</a:t>
+                      </a:r>
+                    </a:p>
+                  </a:txBody>
+                </a:tc>
+              </a:tr>
+              <a:tr h="0">
+                <a:tc>
+                  <a:txBody>
+                    <a:bodyPr/>
+                    <a:lstStyle/>
+                    <a:p>
+                      <a:pPr lvl="0" indent="0" marL="0" algn="l">
+                        <a:buNone/>
+                      </a:pPr>
+                      <a:r>
+                        <a:rPr/>
+                        <a:t>mod_qual</a:t>
+                      </a:r>
+                    </a:p>
+                  </a:txBody>
+                </a:tc>
+                <a:tc>
+                  <a:txBody>
+                    <a:bodyPr/>
+                    <a:lstStyle/>
+                    <a:p>
+                      <a:pPr lvl="0" indent="0" marL="0" algn="r">
+                        <a:buNone/>
+                      </a:pPr>
+                      <a:r>
+                        <a:rPr/>
+                        <a:t>138</a:t>
+                      </a:r>
+                    </a:p>
+                  </a:txBody>
+                </a:tc>
+                <a:tc>
+                  <a:txBody>
+                    <a:bodyPr/>
+                    <a:lstStyle/>
+                    <a:p>
+                      <a:pPr lvl="0" indent="0" marL="0" algn="r">
+                        <a:buNone/>
+                      </a:pPr>
+                      <a:r>
+                        <a:rPr/>
+                        <a:t>72607.59</a:t>
+                      </a:r>
+                    </a:p>
+                  </a:txBody>
+                </a:tc>
+              </a:tr>
+              <a:tr h="0">
+                <a:tc>
+                  <a:txBody>
+                    <a:bodyPr/>
+                    <a:lstStyle/>
+                    <a:p>
+                      <a:pPr lvl="0" indent="0" marL="0" algn="l">
+                        <a:buNone/>
+                      </a:pPr>
+                      <a:r>
+                        <a:rPr/>
+                        <a:t>mod_jobsat</a:t>
+                      </a:r>
+                    </a:p>
+                  </a:txBody>
+                </a:tc>
+                <a:tc>
+                  <a:txBody>
+                    <a:bodyPr/>
+                    <a:lstStyle/>
+                    <a:p>
+                      <a:pPr lvl="0" indent="0" marL="0" algn="r">
+                        <a:buNone/>
+                      </a:pPr>
+                      <a:r>
+                        <a:rPr/>
+                        <a:t>162</a:t>
+                      </a:r>
+                    </a:p>
+                  </a:txBody>
+                </a:tc>
+                <a:tc>
+                  <a:txBody>
+                    <a:bodyPr/>
+                    <a:lstStyle/>
+                    <a:p>
+                      <a:pPr lvl="0" indent="0" marL="0" algn="r">
+                        <a:buNone/>
+                      </a:pPr>
+                      <a:r>
+                        <a:rPr/>
+                        <a:t>72901.65</a:t>
+                      </a:r>
+                    </a:p>
+                  </a:txBody>
+                </a:tc>
+              </a:tr>
+              <a:tr h="0">
+                <a:tc>
+                  <a:txBody>
+                    <a:bodyPr/>
+                    <a:lstStyle/>
+                    <a:p>
+                      <a:pPr lvl="0" indent="0" marL="0" algn="l">
+                        <a:buNone/>
+                      </a:pPr>
+                      <a:r>
+                        <a:rPr/>
+                        <a:t>mod_full</a:t>
+                      </a:r>
+                    </a:p>
+                  </a:txBody>
+                </a:tc>
+                <a:tc>
+                  <a:txBody>
+                    <a:bodyPr/>
+                    <a:lstStyle/>
+                    <a:p>
+                      <a:pPr lvl="0" indent="0" marL="0" algn="r">
+                        <a:buNone/>
+                      </a:pPr>
+                      <a:r>
+                        <a:rPr/>
+                        <a:t>192</a:t>
+                      </a:r>
+                    </a:p>
+                  </a:txBody>
+                </a:tc>
+                <a:tc>
+                  <a:txBody>
+                    <a:bodyPr/>
+                    <a:lstStyle/>
+                    <a:p>
+                      <a:pPr lvl="0" indent="0" marL="0" algn="r">
+                        <a:buNone/>
+                      </a:pPr>
+                      <a:r>
+                        <a:rPr/>
+                        <a:t>72658.77</a:t>
+                      </a:r>
+                    </a:p>
+                  </a:txBody>
+                </a:tc>
+              </a:tr>
+            </a:tbl>
+          </a:graphicData>
+        </a:graphic>
+      </p:graphicFrame>
+    </p:spTree>
+  </p:cSld>
+</p:sld>
+</file>
+
+<file path=ppt/slides/slide22.xml><?xml version="1.0" encoding="utf-8"?>
+<p:sld xmlns:a="http://schemas.openxmlformats.org/drawingml/2006/main" xmlns:r="http://schemas.openxmlformats.org/officeDocument/2006/relationships" xmlns:p="http://schemas.openxmlformats.org/presentationml/2006/main">
+  <p:cSld>
+    <p:spTree>
+      <p:nvGrpSpPr>
+        <p:cNvPr id="1" name=""/>
+        <p:cNvGrpSpPr/>
+        <p:nvPr/>
+      </p:nvGrpSpPr>
+      <p:grpSpPr>
+        <a:xfrm>
+          <a:off x="0" y="0"/>
+          <a:ext cx="0" cy="0"/>
+          <a:chOff x="0" y="0"/>
+          <a:chExt cx="0" cy="0"/>
+        </a:xfrm>
+      </p:grpSpPr>
+      <p:graphicFrame>
+        <p:nvGraphicFramePr>
+          <p:cNvPr id="6" name="Content Placeholder 5"/>
+          <p:cNvGraphicFramePr>
+            <a:graphicFrameLocks noGrp="1"/>
+          </p:cNvGraphicFramePr>
+          <p:nvPr>
+            <p:ph idx="1"/>
+          </p:nvPr>
+        </p:nvGraphicFramePr>
+        <p:xfrm>
+          <a:off x="457200" y="1193800"/>
+          <a:ext cx="8229600" cy="3390900"/>
+        </p:xfrm>
+        <a:graphic>
+          <a:graphicData uri="http://schemas.openxmlformats.org/drawingml/2006/table">
+            <a:tbl>
+              <a:tblPr firstRow="1" bandRow="1">
+                <a:tableStyleId>{5C22544A-7EE6-4342-B048-85BDC9FD1C3A}</a:tableStyleId>
+              </a:tblPr>
+              <a:tblGrid>
+                <a:gridCol w="2743200"/>
+                <a:gridCol w="2743200"/>
+                <a:gridCol w="2743200"/>
+              </a:tblGrid>
+              <a:tr h="0">
+                <a:tc>
+                  <a:txBody>
+                    <a:bodyPr/>
+                    <a:lstStyle/>
+                    <a:p>
+                      <a:endParaRPr/>
+                    </a:p>
+                  </a:txBody>
+                  <a:tcPr/>
+                </a:tc>
+                <a:tc>
+                  <a:txBody>
+                    <a:bodyPr/>
+                    <a:lstStyle/>
+                    <a:p>
+                      <a:pPr lvl="0" indent="0" marL="0" algn="r">
+                        <a:buNone/>
+                      </a:pPr>
+                      <a:r>
+                        <a:rPr/>
+                        <a:t>df</a:t>
+                      </a:r>
+                    </a:p>
+                  </a:txBody>
+                  <a:tcPr/>
+                </a:tc>
+                <a:tc>
+                  <a:txBody>
+                    <a:bodyPr/>
+                    <a:lstStyle/>
+                    <a:p>
+                      <a:pPr lvl="0" indent="0" marL="0" algn="r">
+                        <a:buNone/>
+                      </a:pPr>
+                      <a:r>
+                        <a:rPr/>
+                        <a:t>BIC</a:t>
+                      </a:r>
+                    </a:p>
+                  </a:txBody>
+                  <a:tcPr/>
+                </a:tc>
+              </a:tr>
+              <a:tr h="0">
+                <a:tc>
+                  <a:txBody>
+                    <a:bodyPr/>
+                    <a:lstStyle/>
+                    <a:p>
+                      <a:pPr lvl="0" indent="0" marL="0" algn="l">
+                        <a:buNone/>
+                      </a:pPr>
+                      <a:r>
+                        <a:rPr/>
+                        <a:t>mod_00</a:t>
+                      </a:r>
+                    </a:p>
+                  </a:txBody>
+                </a:tc>
+                <a:tc>
+                  <a:txBody>
+                    <a:bodyPr/>
+                    <a:lstStyle/>
+                    <a:p>
+                      <a:pPr lvl="0" indent="0" marL="0" algn="r">
+                        <a:buNone/>
+                      </a:pPr>
+                      <a:r>
+                        <a:rPr/>
+                        <a:t>126</a:t>
+                      </a:r>
+                    </a:p>
+                  </a:txBody>
+                </a:tc>
+                <a:tc>
+                  <a:txBody>
+                    <a:bodyPr/>
+                    <a:lstStyle/>
+                    <a:p>
+                      <a:pPr lvl="0" indent="0" marL="0" algn="r">
+                        <a:buNone/>
+                      </a:pPr>
+                      <a:r>
+                        <a:rPr/>
+                        <a:t>74202.54</a:t>
+                      </a:r>
+                    </a:p>
+                  </a:txBody>
+                </a:tc>
+              </a:tr>
+              <a:tr h="0">
+                <a:tc>
+                  <a:txBody>
+                    <a:bodyPr/>
+                    <a:lstStyle/>
+                    <a:p>
+                      <a:pPr lvl="0" indent="0" marL="0" algn="l">
+                        <a:buNone/>
+                      </a:pPr>
+                      <a:r>
+                        <a:rPr/>
+                        <a:t>mod_hlth</a:t>
+                      </a:r>
+                    </a:p>
+                  </a:txBody>
+                </a:tc>
+                <a:tc>
+                  <a:txBody>
+                    <a:bodyPr/>
+                    <a:lstStyle/>
+                    <a:p>
+                      <a:pPr lvl="0" indent="0" marL="0" algn="r">
+                        <a:buNone/>
+                      </a:pPr>
+                      <a:r>
+                        <a:rPr/>
+                        <a:t>144</a:t>
+                      </a:r>
+                    </a:p>
+                  </a:txBody>
+                </a:tc>
+                <a:tc>
+                  <a:txBody>
+                    <a:bodyPr/>
+                    <a:lstStyle/>
+                    <a:p>
+                      <a:pPr lvl="0" indent="0" marL="0" algn="r">
+                        <a:buNone/>
+                      </a:pPr>
+                      <a:r>
+                        <a:rPr/>
+                        <a:t>72952.57</a:t>
+                      </a:r>
+                    </a:p>
+                  </a:txBody>
+                </a:tc>
+              </a:tr>
+              <a:tr h="0">
+                <a:tc>
+                  <a:txBody>
+                    <a:bodyPr/>
+                    <a:lstStyle/>
+                    <a:p>
+                      <a:pPr lvl="0" indent="0" marL="0" algn="l">
+                        <a:buNone/>
+                      </a:pPr>
+                      <a:r>
+                        <a:rPr/>
+                        <a:t>mod_qual</a:t>
+                      </a:r>
+                    </a:p>
+                  </a:txBody>
+                </a:tc>
+                <a:tc>
+                  <a:txBody>
+                    <a:bodyPr/>
+                    <a:lstStyle/>
+                    <a:p>
+                      <a:pPr lvl="0" indent="0" marL="0" algn="r">
+                        <a:buNone/>
+                      </a:pPr>
+                      <a:r>
+                        <a:rPr/>
+                        <a:t>138</a:t>
+                      </a:r>
+                    </a:p>
+                  </a:txBody>
+                </a:tc>
+                <a:tc>
+                  <a:txBody>
+                    <a:bodyPr/>
+                    <a:lstStyle/>
+                    <a:p>
+                      <a:pPr lvl="0" indent="0" marL="0" algn="r">
+                        <a:buNone/>
+                      </a:pPr>
+                      <a:r>
+                        <a:rPr/>
+                        <a:t>73986.86</a:t>
+                      </a:r>
+                    </a:p>
+                  </a:txBody>
+                </a:tc>
+              </a:tr>
+              <a:tr h="0">
+                <a:tc>
+                  <a:txBody>
+                    <a:bodyPr/>
+                    <a:lstStyle/>
+                    <a:p>
+                      <a:pPr lvl="0" indent="0" marL="0" algn="l">
+                        <a:buNone/>
+                      </a:pPr>
+                      <a:r>
+                        <a:rPr/>
+                        <a:t>mod_jobsat</a:t>
+                      </a:r>
+                    </a:p>
+                  </a:txBody>
+                </a:tc>
+                <a:tc>
+                  <a:txBody>
+                    <a:bodyPr/>
+                    <a:lstStyle/>
+                    <a:p>
+                      <a:pPr lvl="0" indent="0" marL="0" algn="r">
+                        <a:buNone/>
+                      </a:pPr>
+                      <a:r>
+                        <a:rPr/>
+                        <a:t>162</a:t>
+                      </a:r>
+                    </a:p>
+                  </a:txBody>
+                </a:tc>
+                <a:tc>
+                  <a:txBody>
+                    <a:bodyPr/>
+                    <a:lstStyle/>
+                    <a:p>
+                      <a:pPr lvl="0" indent="0" marL="0" algn="r">
+                        <a:buNone/>
+                      </a:pPr>
+                      <a:r>
+                        <a:rPr/>
+                        <a:t>74520.79</a:t>
+                      </a:r>
+                    </a:p>
+                  </a:txBody>
+                </a:tc>
+              </a:tr>
+              <a:tr h="0">
+                <a:tc>
+                  <a:txBody>
+                    <a:bodyPr/>
+                    <a:lstStyle/>
+                    <a:p>
+                      <a:pPr lvl="0" indent="0" marL="0" algn="l">
+                        <a:buNone/>
+                      </a:pPr>
+                      <a:r>
+                        <a:rPr/>
+                        <a:t>mod_full</a:t>
+                      </a:r>
+                    </a:p>
+                  </a:txBody>
+                </a:tc>
+                <a:tc>
+                  <a:txBody>
+                    <a:bodyPr/>
+                    <a:lstStyle/>
+                    <a:p>
+                      <a:pPr lvl="0" indent="0" marL="0" algn="r">
+                        <a:buNone/>
+                      </a:pPr>
+                      <a:r>
+                        <a:rPr/>
+                        <a:t>192</a:t>
+                      </a:r>
+                    </a:p>
+                  </a:txBody>
+                </a:tc>
+                <a:tc>
+                  <a:txBody>
+                    <a:bodyPr/>
+                    <a:lstStyle/>
+                    <a:p>
+                      <a:pPr lvl="0" indent="0" marL="0" algn="r">
+                        <a:buNone/>
+                      </a:pPr>
+                      <a:r>
+                        <a:rPr/>
+                        <a:t>74577.76</a:t>
+                      </a:r>
+                    </a:p>
+                  </a:txBody>
+                </a:tc>
+              </a:tr>
+            </a:tbl>
+          </a:graphicData>
+        </a:graphic>
+      </p:graphicFrame>
+    </p:spTree>
+  </p:cSld>
+</p:sld>
+</file>
+
+<file path=ppt/slides/slide23.xml><?xml version="1.0" encoding="utf-8"?>
+<p:sld xmlns:a="http://schemas.openxmlformats.org/drawingml/2006/main" xmlns:r="http://schemas.openxmlformats.org/officeDocument/2006/relationships" xmlns:p="http://schemas.openxmlformats.org/presentationml/2006/main">
+  <p:cSld>
+    <p:spTree>
+      <p:nvGrpSpPr>
+        <p:cNvPr id="1" name=""/>
+        <p:cNvGrpSpPr/>
+        <p:nvPr/>
+      </p:nvGrpSpPr>
+      <p:grpSpPr>
+        <a:xfrm>
+          <a:off x="0" y="0"/>
+          <a:ext cx="0" cy="0"/>
+          <a:chOff x="0" y="0"/>
+          <a:chExt cx="0" cy="0"/>
+        </a:xfrm>
+      </p:grpSpPr>
+      <p:graphicFrame>
+        <p:nvGraphicFramePr>
+          <p:cNvPr id="6" name="Content Placeholder 5"/>
+          <p:cNvGraphicFramePr>
+            <a:graphicFrameLocks noGrp="1"/>
+          </p:cNvGraphicFramePr>
+          <p:nvPr>
+            <p:ph idx="1"/>
+          </p:nvPr>
+        </p:nvGraphicFramePr>
+        <p:xfrm>
+          <a:off x="457200" y="1193800"/>
+          <a:ext cx="8229600" cy="3390900"/>
+        </p:xfrm>
+        <a:graphic>
+          <a:graphicData uri="http://schemas.openxmlformats.org/drawingml/2006/table">
+            <a:tbl>
+              <a:tblPr firstRow="1" bandRow="1">
+                <a:tableStyleId>{5C22544A-7EE6-4342-B048-85BDC9FD1C3A}</a:tableStyleId>
+              </a:tblPr>
+              <a:tblGrid>
+                <a:gridCol w="1638300"/>
+                <a:gridCol w="1638300"/>
+                <a:gridCol w="1638300"/>
+                <a:gridCol w="1638300"/>
+                <a:gridCol w="1638300"/>
+              </a:tblGrid>
+              <a:tr h="0">
+                <a:tc>
+                  <a:txBody>
+                    <a:bodyPr/>
+                    <a:lstStyle/>
+                    <a:p>
+                      <a:pPr lvl="0" indent="0" marL="0" algn="l">
+                        <a:buNone/>
+                      </a:pPr>
+                      <a:r>
+                        <a:rPr/>
+                        <a:t>model_name</a:t>
+                      </a:r>
+                    </a:p>
+                  </a:txBody>
+                  <a:tcPr/>
+                </a:tc>
+                <a:tc>
+                  <a:txBody>
+                    <a:bodyPr/>
+                    <a:lstStyle/>
+                    <a:p>
+                      <a:pPr lvl="0" indent="0" marL="0" algn="r">
+                        <a:buNone/>
+                      </a:pPr>
+                      <a:r>
+                        <a:rPr/>
+                        <a:t>aic</a:t>
+                      </a:r>
+                    </a:p>
+                  </a:txBody>
+                  <a:tcPr/>
+                </a:tc>
+                <a:tc>
+                  <a:txBody>
+                    <a:bodyPr/>
+                    <a:lstStyle/>
+                    <a:p>
+                      <a:pPr lvl="0" indent="0" marL="0" algn="r">
+                        <a:buNone/>
+                      </a:pPr>
+                      <a:r>
+                        <a:rPr/>
+                        <a:t>bic</a:t>
+                      </a:r>
+                    </a:p>
+                  </a:txBody>
+                  <a:tcPr/>
+                </a:tc>
+                <a:tc>
+                  <a:txBody>
+                    <a:bodyPr/>
+                    <a:lstStyle/>
+                    <a:p>
+                      <a:pPr lvl="0" indent="0" marL="0" algn="r">
+                        <a:buNone/>
+                      </a:pPr>
+                      <a:r>
+                        <a:rPr/>
+                        <a:t>aic_rank</a:t>
+                      </a:r>
+                    </a:p>
+                  </a:txBody>
+                  <a:tcPr/>
+                </a:tc>
+                <a:tc>
+                  <a:txBody>
+                    <a:bodyPr/>
+                    <a:lstStyle/>
+                    <a:p>
+                      <a:pPr lvl="0" indent="0" marL="0" algn="r">
+                        <a:buNone/>
+                      </a:pPr>
+                      <a:r>
+                        <a:rPr/>
+                        <a:t>bic_rank</a:t>
+                      </a:r>
+                    </a:p>
+                  </a:txBody>
+                  <a:tcPr/>
+                </a:tc>
+              </a:tr>
+              <a:tr h="0">
+                <a:tc>
+                  <a:txBody>
+                    <a:bodyPr/>
+                    <a:lstStyle/>
+                    <a:p>
+                      <a:pPr lvl="0" indent="0" marL="0" algn="l">
+                        <a:buNone/>
+                      </a:pPr>
+                      <a:r>
+                        <a:rPr/>
+                        <a:t>Health</a:t>
+                      </a:r>
+                    </a:p>
+                  </a:txBody>
+                </a:tc>
+                <a:tc>
+                  <a:txBody>
+                    <a:bodyPr/>
+                    <a:lstStyle/>
+                    <a:p>
+                      <a:pPr lvl="0" indent="0" marL="0" algn="r">
+                        <a:buNone/>
+                      </a:pPr>
+                      <a:r>
+                        <a:rPr/>
+                        <a:t>71513.33</a:t>
+                      </a:r>
+                    </a:p>
+                  </a:txBody>
+                </a:tc>
+                <a:tc>
+                  <a:txBody>
+                    <a:bodyPr/>
+                    <a:lstStyle/>
+                    <a:p>
+                      <a:pPr lvl="0" indent="0" marL="0" algn="r">
+                        <a:buNone/>
+                      </a:pPr>
+                      <a:r>
+                        <a:rPr/>
+                        <a:t>72952.57</a:t>
+                      </a:r>
+                    </a:p>
+                  </a:txBody>
+                </a:tc>
+                <a:tc>
+                  <a:txBody>
+                    <a:bodyPr/>
+                    <a:lstStyle/>
+                    <a:p>
+                      <a:pPr lvl="0" indent="0" marL="0" algn="r">
+                        <a:buNone/>
+                      </a:pPr>
+                      <a:r>
+                        <a:rPr/>
+                        <a:t>1</a:t>
+                      </a:r>
+                    </a:p>
+                  </a:txBody>
+                </a:tc>
+                <a:tc>
+                  <a:txBody>
+                    <a:bodyPr/>
+                    <a:lstStyle/>
+                    <a:p>
+                      <a:pPr lvl="0" indent="0" marL="0" algn="r">
+                        <a:buNone/>
+                      </a:pPr>
+                      <a:r>
+                        <a:rPr/>
+                        <a:t>1</a:t>
+                      </a:r>
+                    </a:p>
+                  </a:txBody>
+                </a:tc>
+              </a:tr>
+              <a:tr h="0">
+                <a:tc>
+                  <a:txBody>
+                    <a:bodyPr/>
+                    <a:lstStyle/>
+                    <a:p>
+                      <a:pPr lvl="0" indent="0" marL="0" algn="l">
+                        <a:buNone/>
+                      </a:pPr>
+                      <a:r>
+                        <a:rPr/>
+                        <a:t>Qualifications</a:t>
+                      </a:r>
+                    </a:p>
+                  </a:txBody>
+                </a:tc>
+                <a:tc>
+                  <a:txBody>
+                    <a:bodyPr/>
+                    <a:lstStyle/>
+                    <a:p>
+                      <a:pPr lvl="0" indent="0" marL="0" algn="r">
+                        <a:buNone/>
+                      </a:pPr>
+                      <a:r>
+                        <a:rPr/>
+                        <a:t>72607.59</a:t>
+                      </a:r>
+                    </a:p>
+                  </a:txBody>
+                </a:tc>
+                <a:tc>
+                  <a:txBody>
+                    <a:bodyPr/>
+                    <a:lstStyle/>
+                    <a:p>
+                      <a:pPr lvl="0" indent="0" marL="0" algn="r">
+                        <a:buNone/>
+                      </a:pPr>
+                      <a:r>
+                        <a:rPr/>
+                        <a:t>73986.86</a:t>
+                      </a:r>
+                    </a:p>
+                  </a:txBody>
+                </a:tc>
+                <a:tc>
+                  <a:txBody>
+                    <a:bodyPr/>
+                    <a:lstStyle/>
+                    <a:p>
+                      <a:pPr lvl="0" indent="0" marL="0" algn="r">
+                        <a:buNone/>
+                      </a:pPr>
+                      <a:r>
+                        <a:rPr/>
+                        <a:t>2</a:t>
+                      </a:r>
+                    </a:p>
+                  </a:txBody>
+                </a:tc>
+                <a:tc>
+                  <a:txBody>
+                    <a:bodyPr/>
+                    <a:lstStyle/>
+                    <a:p>
+                      <a:pPr lvl="0" indent="0" marL="0" algn="r">
+                        <a:buNone/>
+                      </a:pPr>
+                      <a:r>
+                        <a:rPr/>
+                        <a:t>2</a:t>
+                      </a:r>
+                    </a:p>
+                  </a:txBody>
+                </a:tc>
+              </a:tr>
+              <a:tr h="0">
+                <a:tc>
+                  <a:txBody>
+                    <a:bodyPr/>
+                    <a:lstStyle/>
+                    <a:p>
+                      <a:pPr lvl="0" indent="0" marL="0" algn="l">
+                        <a:buNone/>
+                      </a:pPr>
+                      <a:r>
+                        <a:rPr/>
+                        <a:t>Foundational</a:t>
+                      </a:r>
+                    </a:p>
+                  </a:txBody>
+                </a:tc>
+                <a:tc>
+                  <a:txBody>
+                    <a:bodyPr/>
+                    <a:lstStyle/>
+                    <a:p>
+                      <a:pPr lvl="0" indent="0" marL="0" algn="r">
+                        <a:buNone/>
+                      </a:pPr>
+                      <a:r>
+                        <a:rPr/>
+                        <a:t>72943.21</a:t>
+                      </a:r>
+                    </a:p>
+                  </a:txBody>
+                </a:tc>
+                <a:tc>
+                  <a:txBody>
+                    <a:bodyPr/>
+                    <a:lstStyle/>
+                    <a:p>
+                      <a:pPr lvl="0" indent="0" marL="0" algn="r">
+                        <a:buNone/>
+                      </a:pPr>
+                      <a:r>
+                        <a:rPr/>
+                        <a:t>74202.54</a:t>
+                      </a:r>
+                    </a:p>
+                  </a:txBody>
+                </a:tc>
+                <a:tc>
+                  <a:txBody>
+                    <a:bodyPr/>
+                    <a:lstStyle/>
+                    <a:p>
+                      <a:pPr lvl="0" indent="0" marL="0" algn="r">
+                        <a:buNone/>
+                      </a:pPr>
+                      <a:r>
+                        <a:rPr/>
+                        <a:t>5</a:t>
+                      </a:r>
+                    </a:p>
+                  </a:txBody>
+                </a:tc>
+                <a:tc>
+                  <a:txBody>
+                    <a:bodyPr/>
+                    <a:lstStyle/>
+                    <a:p>
+                      <a:pPr lvl="0" indent="0" marL="0" algn="r">
+                        <a:buNone/>
+                      </a:pPr>
+                      <a:r>
+                        <a:rPr/>
+                        <a:t>3</a:t>
+                      </a:r>
+                    </a:p>
+                  </a:txBody>
+                </a:tc>
+              </a:tr>
+              <a:tr h="0">
+                <a:tc>
+                  <a:txBody>
+                    <a:bodyPr/>
+                    <a:lstStyle/>
+                    <a:p>
+                      <a:pPr lvl="0" indent="0" marL="0" algn="l">
+                        <a:buNone/>
+                      </a:pPr>
+                      <a:r>
+                        <a:rPr/>
+                        <a:t>Jobsat</a:t>
+                      </a:r>
+                    </a:p>
+                  </a:txBody>
+                </a:tc>
+                <a:tc>
+                  <a:txBody>
+                    <a:bodyPr/>
+                    <a:lstStyle/>
+                    <a:p>
+                      <a:pPr lvl="0" indent="0" marL="0" algn="r">
+                        <a:buNone/>
+                      </a:pPr>
+                      <a:r>
+                        <a:rPr/>
+                        <a:t>72901.65</a:t>
+                      </a:r>
+                    </a:p>
+                  </a:txBody>
+                </a:tc>
+                <a:tc>
+                  <a:txBody>
+                    <a:bodyPr/>
+                    <a:lstStyle/>
+                    <a:p>
+                      <a:pPr lvl="0" indent="0" marL="0" algn="r">
+                        <a:buNone/>
+                      </a:pPr>
+                      <a:r>
+                        <a:rPr/>
+                        <a:t>74520.79</a:t>
+                      </a:r>
+                    </a:p>
+                  </a:txBody>
+                </a:tc>
+                <a:tc>
+                  <a:txBody>
+                    <a:bodyPr/>
+                    <a:lstStyle/>
+                    <a:p>
+                      <a:pPr lvl="0" indent="0" marL="0" algn="r">
+                        <a:buNone/>
+                      </a:pPr>
+                      <a:r>
+                        <a:rPr/>
+                        <a:t>4</a:t>
+                      </a:r>
+                    </a:p>
+                  </a:txBody>
+                </a:tc>
+                <a:tc>
+                  <a:txBody>
+                    <a:bodyPr/>
+                    <a:lstStyle/>
+                    <a:p>
+                      <a:pPr lvl="0" indent="0" marL="0" algn="r">
+                        <a:buNone/>
+                      </a:pPr>
+                      <a:r>
+                        <a:rPr/>
+                        <a:t>4</a:t>
+                      </a:r>
+                    </a:p>
+                  </a:txBody>
+                </a:tc>
+              </a:tr>
+              <a:tr h="0">
+                <a:tc>
+                  <a:txBody>
+                    <a:bodyPr/>
+                    <a:lstStyle/>
+                    <a:p>
+                      <a:pPr lvl="0" indent="0" marL="0" algn="l">
+                        <a:buNone/>
+                      </a:pPr>
+                      <a:r>
+                        <a:rPr/>
+                        <a:t>All</a:t>
+                      </a:r>
+                    </a:p>
+                  </a:txBody>
+                </a:tc>
+                <a:tc>
+                  <a:txBody>
+                    <a:bodyPr/>
+                    <a:lstStyle/>
+                    <a:p>
+                      <a:pPr lvl="0" indent="0" marL="0" algn="r">
+                        <a:buNone/>
+                      </a:pPr>
+                      <a:r>
+                        <a:rPr/>
+                        <a:t>72658.77</a:t>
+                      </a:r>
+                    </a:p>
+                  </a:txBody>
+                </a:tc>
+                <a:tc>
+                  <a:txBody>
+                    <a:bodyPr/>
+                    <a:lstStyle/>
+                    <a:p>
+                      <a:pPr lvl="0" indent="0" marL="0" algn="r">
+                        <a:buNone/>
+                      </a:pPr>
+                      <a:r>
+                        <a:rPr/>
+                        <a:t>74577.76</a:t>
+                      </a:r>
+                    </a:p>
+                  </a:txBody>
+                </a:tc>
+                <a:tc>
+                  <a:txBody>
+                    <a:bodyPr/>
+                    <a:lstStyle/>
+                    <a:p>
+                      <a:pPr lvl="0" indent="0" marL="0" algn="r">
+                        <a:buNone/>
+                      </a:pPr>
+                      <a:r>
+                        <a:rPr/>
+                        <a:t>3</a:t>
+                      </a:r>
+                    </a:p>
+                  </a:txBody>
+                </a:tc>
+                <a:tc>
+                  <a:txBody>
+                    <a:bodyPr/>
+                    <a:lstStyle/>
+                    <a:p>
+                      <a:pPr lvl="0" indent="0" marL="0" algn="r">
+                        <a:buNone/>
+                      </a:pPr>
+                      <a:r>
+                        <a:rPr/>
+                        <a:t>5</a:t>
+                      </a:r>
+                    </a:p>
+                  </a:txBody>
+                </a:tc>
+              </a:tr>
+            </a:tbl>
+          </a:graphicData>
+        </a:graphic>
+      </p:graphicFrame>
+    </p:spTree>
+  </p:cSld>
+</p:sld>
+</file>
+
+<file path=ppt/slides/slide24.xml><?xml version="1.0" encoding="utf-8"?>
+<p:sld xmlns:a="http://schemas.openxmlformats.org/drawingml/2006/main" xmlns:r="http://schemas.openxmlformats.org/officeDocument/2006/relationships" xmlns:p="http://schemas.openxmlformats.org/presentationml/2006/main">
+  <p:cSld>
+    <p:spTree>
+      <p:nvGrpSpPr>
+        <p:cNvPr id="1" name=""/>
+        <p:cNvGrpSpPr/>
+        <p:nvPr/>
+      </p:nvGrpSpPr>
+      <p:grpSpPr>
+        <a:xfrm>
+          <a:off x="0" y="0"/>
+          <a:ext cx="0" cy="0"/>
+          <a:chOff x="0" y="0"/>
+          <a:chExt cx="0" cy="0"/>
+        </a:xfrm>
+      </p:grpSpPr>
+      <p:sp>
+        <p:nvSpPr>
+          <p:cNvPr id="2" name="Title 1"/>
+          <p:cNvSpPr>
+            <a:spLocks noGrp="1"/>
+          </p:cNvSpPr>
+          <p:nvPr>
+            <p:ph type="title"/>
+          </p:nvPr>
+        </p:nvSpPr>
+        <p:spPr/>
+        <p:txBody>
+          <a:bodyPr/>
+          <a:lstStyle/>
+          <a:p>
+            <a:pPr lvl="0" indent="0" marL="0">
+              <a:buNone/>
+            </a:pPr>
+            <a:r>
+              <a:rPr/>
+              <a:t>Discussion</a:t>
+            </a:r>
+          </a:p>
+        </p:txBody>
+      </p:sp>
+      <p:sp>
+        <p:nvSpPr>
+          <p:cNvPr id="3" name="Content Placeholder 2"/>
+          <p:cNvSpPr>
+            <a:spLocks noGrp="1"/>
+          </p:cNvSpPr>
+          <p:nvPr>
+            <p:ph idx="1"/>
+          </p:nvPr>
+        </p:nvSpPr>
+        <p:spPr/>
+        <p:txBody>
+          <a:bodyPr/>
+          <a:lstStyle/>
+          <a:p>
+            <a:pPr lvl="0" indent="0" marL="0">
+              <a:buNone/>
+            </a:pPr>
+            <a:r>
+              <a:rPr/>
+              <a:t>As before, we recognise that the full model does not have the best fit (and according to BIC has the worst fit adjusted for complexity), but at the same time we are interested in something like SAFs, so will use it below</a:t>
+            </a:r>
+          </a:p>
+        </p:txBody>
+      </p:sp>
+    </p:spTree>
+  </p:cSld>
+</p:sld>
+</file>
+
+<file path=ppt/slides/slide25.xml><?xml version="1.0" encoding="utf-8"?>
+<p:sld xmlns:a="http://schemas.openxmlformats.org/drawingml/2006/main" xmlns:r="http://schemas.openxmlformats.org/officeDocument/2006/relationships" xmlns:p="http://schemas.openxmlformats.org/presentationml/2006/main">
+  <p:cSld>
+    <p:spTree>
+      <p:nvGrpSpPr>
+        <p:cNvPr id="1" name=""/>
+        <p:cNvGrpSpPr/>
+        <p:nvPr/>
+      </p:nvGrpSpPr>
+      <p:grpSpPr>
+        <a:xfrm>
+          <a:off x="0" y="0"/>
+          <a:ext cx="0" cy="0"/>
+          <a:chOff x="0" y="0"/>
+          <a:chExt cx="0" cy="0"/>
+        </a:xfrm>
+      </p:grpSpPr>
+      <p:sp>
+        <p:nvSpPr>
+          <p:cNvPr id="2" name="Title 1"/>
+          <p:cNvSpPr>
+            <a:spLocks noGrp="1"/>
+          </p:cNvSpPr>
+          <p:nvPr>
+            <p:ph type="title"/>
+          </p:nvPr>
+        </p:nvSpPr>
+        <p:spPr/>
+        <p:txBody>
+          <a:bodyPr/>
+          <a:lstStyle/>
+          <a:p>
+            <a:pPr lvl="0" indent="0" marL="0">
+              <a:buNone/>
+            </a:pPr>
+            <a:r>
+              <a:rPr/>
+              <a:t>Scenario creation</a:t>
+            </a:r>
+          </a:p>
+        </p:txBody>
+      </p:sp>
+    </p:spTree>
+  </p:cSld>
+</p:sld>
+</file>
+
+<file path=ppt/slides/slide26.xml><?xml version="1.0" encoding="utf-8"?>
+<p:sld xmlns:a="http://schemas.openxmlformats.org/drawingml/2006/main" xmlns:r="http://schemas.openxmlformats.org/officeDocument/2006/relationships" xmlns:p="http://schemas.openxmlformats.org/presentationml/2006/main">
+  <p:cSld>
+    <p:spTree>
+      <p:nvGrpSpPr>
+        <p:cNvPr id="1" name=""/>
+        <p:cNvGrpSpPr/>
+        <p:nvPr/>
+      </p:nvGrpSpPr>
+      <p:grpSpPr>
+        <a:xfrm>
+          <a:off x="0" y="0"/>
+          <a:ext cx="0" cy="0"/>
+          <a:chOff x="0" y="0"/>
+          <a:chExt cx="0" cy="0"/>
+        </a:xfrm>
+      </p:grpSpPr>
+      <p:sp>
+        <p:nvSpPr>
+          <p:cNvPr id="2" name="Title 1"/>
+          <p:cNvSpPr>
+            <a:spLocks noGrp="1"/>
+          </p:cNvSpPr>
+          <p:nvPr>
+            <p:ph type="title"/>
+          </p:nvPr>
+        </p:nvSpPr>
+        <p:spPr/>
+        <p:txBody>
+          <a:bodyPr/>
+          <a:lstStyle/>
+          <a:p>
+            <a:pPr lvl="0" indent="0" marL="0">
+              <a:buNone/>
+            </a:pPr>
+            <a:r>
+              <a:rPr/>
+              <a:t>Comparison of scenarios: change in distributions</a:t>
+            </a:r>
+          </a:p>
+        </p:txBody>
+      </p:sp>
+      <p:graphicFrame>
+        <p:nvGraphicFramePr>
+          <p:cNvPr id="6" name="Content Placeholder 5"/>
+          <p:cNvGraphicFramePr>
+            <a:graphicFrameLocks noGrp="1"/>
+          </p:cNvGraphicFramePr>
+          <p:nvPr>
+            <p:ph idx="1"/>
+          </p:nvPr>
+        </p:nvGraphicFramePr>
+        <p:xfrm>
+          <a:off x="457200" y="1193800"/>
+          <a:ext cx="8229600" cy="3390900"/>
+        </p:xfrm>
+        <a:graphic>
+          <a:graphicData uri="http://schemas.openxmlformats.org/drawingml/2006/table">
+            <a:tbl>
+              <a:tblPr firstRow="1" bandRow="1">
+                <a:tableStyleId>{5C22544A-7EE6-4342-B048-85BDC9FD1C3A}</a:tableStyleId>
+              </a:tblPr>
+              <a:tblGrid>
+                <a:gridCol w="914400"/>
+                <a:gridCol w="914400"/>
+                <a:gridCol w="914400"/>
+                <a:gridCol w="914400"/>
+                <a:gridCol w="914400"/>
+                <a:gridCol w="914400"/>
+                <a:gridCol w="914400"/>
+                <a:gridCol w="914400"/>
+                <a:gridCol w="914400"/>
+              </a:tblGrid>
+              <a:tr h="0">
+                <a:tc>
+                  <a:txBody>
+                    <a:bodyPr/>
+                    <a:lstStyle/>
+                    <a:p>
+                      <a:pPr lvl="0" indent="0" marL="0" algn="l">
+                        <a:buNone/>
+                      </a:pPr>
+                      <a:r>
+                        <a:rPr/>
+                        <a:t>state</a:t>
+                      </a:r>
+                    </a:p>
+                  </a:txBody>
+                  <a:tcPr/>
+                </a:tc>
+                <a:tc>
+                  <a:txBody>
+                    <a:bodyPr/>
+                    <a:lstStyle/>
+                    <a:p>
+                      <a:pPr lvl="0" indent="0" marL="0" algn="r">
+                        <a:buNone/>
+                      </a:pPr>
+                      <a:r>
+                        <a:rPr/>
+                        <a:t>baseline</a:t>
+                      </a:r>
+                    </a:p>
+                  </a:txBody>
+                  <a:tcPr/>
+                </a:tc>
+                <a:tc>
+                  <a:txBody>
+                    <a:bodyPr/>
+                    <a:lstStyle/>
+                    <a:p>
+                      <a:pPr lvl="0" indent="0" marL="0" algn="r">
+                        <a:buNone/>
+                      </a:pPr>
+                      <a:r>
+                        <a:rPr/>
+                        <a:t>counter_health</a:t>
+                      </a:r>
+                    </a:p>
+                  </a:txBody>
+                  <a:tcPr/>
+                </a:tc>
+                <a:tc>
+                  <a:txBody>
+                    <a:bodyPr/>
+                    <a:lstStyle/>
+                    <a:p>
+                      <a:pPr lvl="0" indent="0" marL="0" algn="r">
+                        <a:buNone/>
+                      </a:pPr>
+                      <a:r>
+                        <a:rPr/>
+                        <a:t>counter_quals</a:t>
+                      </a:r>
+                    </a:p>
+                  </a:txBody>
+                  <a:tcPr/>
+                </a:tc>
+                <a:tc>
+                  <a:txBody>
+                    <a:bodyPr/>
+                    <a:lstStyle/>
+                    <a:p>
+                      <a:pPr lvl="0" indent="0" marL="0" algn="r">
+                        <a:buNone/>
+                      </a:pPr>
+                      <a:r>
+                        <a:rPr/>
+                        <a:t>counter_jobsat</a:t>
+                      </a:r>
+                    </a:p>
+                  </a:txBody>
+                  <a:tcPr/>
+                </a:tc>
+                <a:tc>
+                  <a:txBody>
+                    <a:bodyPr/>
+                    <a:lstStyle/>
+                    <a:p>
+                      <a:pPr lvl="0" indent="0" marL="0" algn="r">
+                        <a:buNone/>
+                      </a:pPr>
+                      <a:r>
+                        <a:rPr/>
+                        <a:t>counter_health_qual</a:t>
+                      </a:r>
+                    </a:p>
+                  </a:txBody>
+                  <a:tcPr/>
+                </a:tc>
+                <a:tc>
+                  <a:txBody>
+                    <a:bodyPr/>
+                    <a:lstStyle/>
+                    <a:p>
+                      <a:pPr lvl="0" indent="0" marL="0" algn="r">
+                        <a:buNone/>
+                      </a:pPr>
+                      <a:r>
+                        <a:rPr/>
+                        <a:t>counter_health_jobsat</a:t>
+                      </a:r>
+                    </a:p>
+                  </a:txBody>
+                  <a:tcPr/>
+                </a:tc>
+                <a:tc>
+                  <a:txBody>
+                    <a:bodyPr/>
+                    <a:lstStyle/>
+                    <a:p>
+                      <a:pPr lvl="0" indent="0" marL="0" algn="r">
+                        <a:buNone/>
+                      </a:pPr>
+                      <a:r>
+                        <a:rPr/>
+                        <a:t>counter_jobsat_qual</a:t>
+                      </a:r>
+                    </a:p>
+                  </a:txBody>
+                  <a:tcPr/>
+                </a:tc>
+                <a:tc>
+                  <a:txBody>
+                    <a:bodyPr/>
+                    <a:lstStyle/>
+                    <a:p>
+                      <a:pPr lvl="0" indent="0" marL="0" algn="r">
+                        <a:buNone/>
+                      </a:pPr>
+                      <a:r>
+                        <a:rPr/>
+                        <a:t>counter_all</a:t>
+                      </a:r>
+                    </a:p>
+                  </a:txBody>
+                  <a:tcPr/>
+                </a:tc>
+              </a:tr>
+              <a:tr h="0">
+                <a:tc>
+                  <a:txBody>
+                    <a:bodyPr/>
+                    <a:lstStyle/>
+                    <a:p>
+                      <a:pPr lvl="0" indent="0" marL="0" algn="l">
+                        <a:buNone/>
+                      </a:pPr>
+                      <a:r>
+                        <a:rPr/>
+                        <a:t>Employed</a:t>
+                      </a:r>
+                    </a:p>
+                  </a:txBody>
+                </a:tc>
+                <a:tc>
+                  <a:txBody>
+                    <a:bodyPr/>
+                    <a:lstStyle/>
+                    <a:p>
+                      <a:pPr lvl="0" indent="0" marL="0" algn="r">
+                        <a:buNone/>
+                      </a:pPr>
+                      <a:r>
+                        <a:rPr/>
+                        <a:t>95.67</a:t>
+                      </a:r>
+                    </a:p>
+                  </a:txBody>
+                </a:tc>
+                <a:tc>
+                  <a:txBody>
+                    <a:bodyPr/>
+                    <a:lstStyle/>
+                    <a:p>
+                      <a:pPr lvl="0" indent="0" marL="0" algn="r">
+                        <a:buNone/>
+                      </a:pPr>
+                      <a:r>
+                        <a:rPr/>
+                        <a:t>96.53</a:t>
+                      </a:r>
+                    </a:p>
+                  </a:txBody>
+                </a:tc>
+                <a:tc>
+                  <a:txBody>
+                    <a:bodyPr/>
+                    <a:lstStyle/>
+                    <a:p>
+                      <a:pPr lvl="0" indent="0" marL="0" algn="r">
+                        <a:buNone/>
+                      </a:pPr>
+                      <a:r>
+                        <a:rPr/>
+                        <a:t>95.72</a:t>
+                      </a:r>
+                    </a:p>
+                  </a:txBody>
+                </a:tc>
+                <a:tc>
+                  <a:txBody>
+                    <a:bodyPr/>
+                    <a:lstStyle/>
+                    <a:p>
+                      <a:pPr lvl="0" indent="0" marL="0" algn="r">
+                        <a:buNone/>
+                      </a:pPr>
+                      <a:r>
+                        <a:rPr/>
+                        <a:t>96.04</a:t>
+                      </a:r>
+                    </a:p>
+                  </a:txBody>
+                </a:tc>
+                <a:tc>
+                  <a:txBody>
+                    <a:bodyPr/>
+                    <a:lstStyle/>
+                    <a:p>
+                      <a:pPr lvl="0" indent="0" marL="0" algn="r">
+                        <a:buNone/>
+                      </a:pPr>
+                      <a:r>
+                        <a:rPr/>
+                        <a:t>96.45</a:t>
+                      </a:r>
+                    </a:p>
+                  </a:txBody>
+                </a:tc>
+                <a:tc>
+                  <a:txBody>
+                    <a:bodyPr/>
+                    <a:lstStyle/>
+                    <a:p>
+                      <a:pPr lvl="0" indent="0" marL="0" algn="r">
+                        <a:buNone/>
+                      </a:pPr>
+                      <a:r>
+                        <a:rPr/>
+                        <a:t>96.86</a:t>
+                      </a:r>
+                    </a:p>
+                  </a:txBody>
+                </a:tc>
+                <a:tc>
+                  <a:txBody>
+                    <a:bodyPr/>
+                    <a:lstStyle/>
+                    <a:p>
+                      <a:pPr lvl="0" indent="0" marL="0" algn="r">
+                        <a:buNone/>
+                      </a:pPr>
+                      <a:r>
+                        <a:rPr/>
+                        <a:t>96.12</a:t>
+                      </a:r>
+                    </a:p>
+                  </a:txBody>
+                </a:tc>
+                <a:tc>
+                  <a:txBody>
+                    <a:bodyPr/>
+                    <a:lstStyle/>
+                    <a:p>
+                      <a:pPr lvl="0" indent="0" marL="0" algn="r">
+                        <a:buNone/>
+                      </a:pPr>
+                      <a:r>
+                        <a:rPr/>
+                        <a:t>96.82</a:t>
+                      </a:r>
+                    </a:p>
+                  </a:txBody>
+                </a:tc>
+              </a:tr>
+              <a:tr h="0">
+                <a:tc>
+                  <a:txBody>
+                    <a:bodyPr/>
+                    <a:lstStyle/>
+                    <a:p>
+                      <a:pPr lvl="0" indent="0" marL="0" algn="l">
+                        <a:buNone/>
+                      </a:pPr>
+                      <a:r>
+                        <a:rPr/>
+                        <a:t>Inactive care</a:t>
+                      </a:r>
+                    </a:p>
+                  </a:txBody>
+                </a:tc>
+                <a:tc>
+                  <a:txBody>
+                    <a:bodyPr/>
+                    <a:lstStyle/>
+                    <a:p>
+                      <a:pPr lvl="0" indent="0" marL="0" algn="r">
+                        <a:buNone/>
+                      </a:pPr>
+                      <a:r>
+                        <a:rPr/>
+                        <a:t>0.75</a:t>
+                      </a:r>
+                    </a:p>
+                  </a:txBody>
+                </a:tc>
+                <a:tc>
+                  <a:txBody>
+                    <a:bodyPr/>
+                    <a:lstStyle/>
+                    <a:p>
+                      <a:pPr lvl="0" indent="0" marL="0" algn="r">
+                        <a:buNone/>
+                      </a:pPr>
+                      <a:r>
+                        <a:rPr/>
+                        <a:t>0.63</a:t>
+                      </a:r>
+                    </a:p>
+                  </a:txBody>
+                </a:tc>
+                <a:tc>
+                  <a:txBody>
+                    <a:bodyPr/>
+                    <a:lstStyle/>
+                    <a:p>
+                      <a:pPr lvl="0" indent="0" marL="0" algn="r">
+                        <a:buNone/>
+                      </a:pPr>
+                      <a:r>
+                        <a:rPr/>
+                        <a:t>0.63</a:t>
+                      </a:r>
+                    </a:p>
+                  </a:txBody>
+                </a:tc>
+                <a:tc>
+                  <a:txBody>
+                    <a:bodyPr/>
+                    <a:lstStyle/>
+                    <a:p>
+                      <a:pPr lvl="0" indent="0" marL="0" algn="r">
+                        <a:buNone/>
+                      </a:pPr>
+                      <a:r>
+                        <a:rPr/>
+                        <a:t>0.79</a:t>
+                      </a:r>
+                    </a:p>
+                  </a:txBody>
+                </a:tc>
+                <a:tc>
+                  <a:txBody>
+                    <a:bodyPr/>
+                    <a:lstStyle/>
+                    <a:p>
+                      <a:pPr lvl="0" indent="0" marL="0" algn="r">
+                        <a:buNone/>
+                      </a:pPr>
+                      <a:r>
+                        <a:rPr/>
+                        <a:t>0.53</a:t>
+                      </a:r>
+                    </a:p>
+                  </a:txBody>
+                </a:tc>
+                <a:tc>
+                  <a:txBody>
+                    <a:bodyPr/>
+                    <a:lstStyle/>
+                    <a:p>
+                      <a:pPr lvl="0" indent="0" marL="0" algn="r">
+                        <a:buNone/>
+                      </a:pPr>
+                      <a:r>
+                        <a:rPr/>
+                        <a:t>0.67</a:t>
+                      </a:r>
+                    </a:p>
+                  </a:txBody>
+                </a:tc>
+                <a:tc>
+                  <a:txBody>
+                    <a:bodyPr/>
+                    <a:lstStyle/>
+                    <a:p>
+                      <a:pPr lvl="0" indent="0" marL="0" algn="r">
+                        <a:buNone/>
+                      </a:pPr>
+                      <a:r>
+                        <a:rPr/>
+                        <a:t>0.67</a:t>
+                      </a:r>
+                    </a:p>
+                  </a:txBody>
+                </a:tc>
+                <a:tc>
+                  <a:txBody>
+                    <a:bodyPr/>
+                    <a:lstStyle/>
+                    <a:p>
+                      <a:pPr lvl="0" indent="0" marL="0" algn="r">
+                        <a:buNone/>
+                      </a:pPr>
+                      <a:r>
+                        <a:rPr/>
+                        <a:t>0.56</a:t>
+                      </a:r>
+                    </a:p>
+                  </a:txBody>
+                </a:tc>
+              </a:tr>
+              <a:tr h="0">
+                <a:tc>
+                  <a:txBody>
+                    <a:bodyPr/>
+                    <a:lstStyle/>
+                    <a:p>
+                      <a:pPr lvl="0" indent="0" marL="0" algn="l">
+                        <a:buNone/>
+                      </a:pPr>
+                      <a:r>
+                        <a:rPr/>
+                        <a:t>Inactive long term sick</a:t>
+                      </a:r>
+                    </a:p>
+                  </a:txBody>
+                </a:tc>
+                <a:tc>
+                  <a:txBody>
+                    <a:bodyPr/>
+                    <a:lstStyle/>
+                    <a:p>
+                      <a:pPr lvl="0" indent="0" marL="0" algn="r">
+                        <a:buNone/>
+                      </a:pPr>
+                      <a:r>
+                        <a:rPr/>
+                        <a:t>0.41</a:t>
+                      </a:r>
+                    </a:p>
+                  </a:txBody>
+                </a:tc>
+                <a:tc>
+                  <a:txBody>
+                    <a:bodyPr/>
+                    <a:lstStyle/>
+                    <a:p>
+                      <a:pPr lvl="0" indent="0" marL="0" algn="r">
+                        <a:buNone/>
+                      </a:pPr>
+                      <a:r>
+                        <a:rPr/>
+                        <a:t>0.13</a:t>
+                      </a:r>
+                    </a:p>
+                  </a:txBody>
+                </a:tc>
+                <a:tc>
+                  <a:txBody>
+                    <a:bodyPr/>
+                    <a:lstStyle/>
+                    <a:p>
+                      <a:pPr lvl="0" indent="0" marL="0" algn="r">
+                        <a:buNone/>
+                      </a:pPr>
+                      <a:r>
+                        <a:rPr/>
+                        <a:t>0.30</a:t>
+                      </a:r>
+                    </a:p>
+                  </a:txBody>
+                </a:tc>
+                <a:tc>
+                  <a:txBody>
+                    <a:bodyPr/>
+                    <a:lstStyle/>
+                    <a:p>
+                      <a:pPr lvl="0" indent="0" marL="0" algn="r">
+                        <a:buNone/>
+                      </a:pPr>
+                      <a:r>
+                        <a:rPr/>
+                        <a:t>0.43</a:t>
+                      </a:r>
+                    </a:p>
+                  </a:txBody>
+                </a:tc>
+                <a:tc>
+                  <a:txBody>
+                    <a:bodyPr/>
+                    <a:lstStyle/>
+                    <a:p>
+                      <a:pPr lvl="0" indent="0" marL="0" algn="r">
+                        <a:buNone/>
+                      </a:pPr>
+                      <a:r>
+                        <a:rPr/>
+                        <a:t>0.10</a:t>
+                      </a:r>
+                    </a:p>
+                  </a:txBody>
+                </a:tc>
+                <a:tc>
+                  <a:txBody>
+                    <a:bodyPr/>
+                    <a:lstStyle/>
+                    <a:p>
+                      <a:pPr lvl="0" indent="0" marL="0" algn="r">
+                        <a:buNone/>
+                      </a:pPr>
+                      <a:r>
+                        <a:rPr/>
+                        <a:t>0.14</a:t>
+                      </a:r>
+                    </a:p>
+                  </a:txBody>
+                </a:tc>
+                <a:tc>
+                  <a:txBody>
+                    <a:bodyPr/>
+                    <a:lstStyle/>
+                    <a:p>
+                      <a:pPr lvl="0" indent="0" marL="0" algn="r">
+                        <a:buNone/>
+                      </a:pPr>
+                      <a:r>
+                        <a:rPr/>
+                        <a:t>0.32</a:t>
+                      </a:r>
+                    </a:p>
+                  </a:txBody>
+                </a:tc>
+                <a:tc>
+                  <a:txBody>
+                    <a:bodyPr/>
+                    <a:lstStyle/>
+                    <a:p>
+                      <a:pPr lvl="0" indent="0" marL="0" algn="r">
+                        <a:buNone/>
+                      </a:pPr>
+                      <a:r>
+                        <a:rPr/>
+                        <a:t>0.10</a:t>
+                      </a:r>
+                    </a:p>
+                  </a:txBody>
+                </a:tc>
+              </a:tr>
+              <a:tr h="0">
+                <a:tc>
+                  <a:txBody>
+                    <a:bodyPr/>
+                    <a:lstStyle/>
+                    <a:p>
+                      <a:pPr lvl="0" indent="0" marL="0" algn="l">
+                        <a:buNone/>
+                      </a:pPr>
+                      <a:r>
+                        <a:rPr/>
+                        <a:t>Inactive other</a:t>
+                      </a:r>
+                    </a:p>
+                  </a:txBody>
+                </a:tc>
+                <a:tc>
+                  <a:txBody>
+                    <a:bodyPr/>
+                    <a:lstStyle/>
+                    <a:p>
+                      <a:pPr lvl="0" indent="0" marL="0" algn="r">
+                        <a:buNone/>
+                      </a:pPr>
+                      <a:r>
+                        <a:rPr/>
+                        <a:t>0.18</a:t>
+                      </a:r>
+                    </a:p>
+                  </a:txBody>
+                </a:tc>
+                <a:tc>
+                  <a:txBody>
+                    <a:bodyPr/>
+                    <a:lstStyle/>
+                    <a:p>
+                      <a:pPr lvl="0" indent="0" marL="0" algn="r">
+                        <a:buNone/>
+                      </a:pPr>
+                      <a:r>
+                        <a:rPr/>
+                        <a:t>0.14</a:t>
+                      </a:r>
+                    </a:p>
+                  </a:txBody>
+                </a:tc>
+                <a:tc>
+                  <a:txBody>
+                    <a:bodyPr/>
+                    <a:lstStyle/>
+                    <a:p>
+                      <a:pPr lvl="0" indent="0" marL="0" algn="r">
+                        <a:buNone/>
+                      </a:pPr>
+                      <a:r>
+                        <a:rPr/>
+                        <a:t>0.21</a:t>
+                      </a:r>
+                    </a:p>
+                  </a:txBody>
+                </a:tc>
+                <a:tc>
+                  <a:txBody>
+                    <a:bodyPr/>
+                    <a:lstStyle/>
+                    <a:p>
+                      <a:pPr lvl="0" indent="0" marL="0" algn="r">
+                        <a:buNone/>
+                      </a:pPr>
+                      <a:r>
+                        <a:rPr/>
+                        <a:t>0.20</a:t>
+                      </a:r>
+                    </a:p>
+                  </a:txBody>
+                </a:tc>
+                <a:tc>
+                  <a:txBody>
+                    <a:bodyPr/>
+                    <a:lstStyle/>
+                    <a:p>
+                      <a:pPr lvl="0" indent="0" marL="0" algn="r">
+                        <a:buNone/>
+                      </a:pPr>
+                      <a:r>
+                        <a:rPr/>
+                        <a:t>0.17</a:t>
+                      </a:r>
+                    </a:p>
+                  </a:txBody>
+                </a:tc>
+                <a:tc>
+                  <a:txBody>
+                    <a:bodyPr/>
+                    <a:lstStyle/>
+                    <a:p>
+                      <a:pPr lvl="0" indent="0" marL="0" algn="r">
+                        <a:buNone/>
+                      </a:pPr>
+                      <a:r>
+                        <a:rPr/>
+                        <a:t>0.15</a:t>
+                      </a:r>
+                    </a:p>
+                  </a:txBody>
+                </a:tc>
+                <a:tc>
+                  <a:txBody>
+                    <a:bodyPr/>
+                    <a:lstStyle/>
+                    <a:p>
+                      <a:pPr lvl="0" indent="0" marL="0" algn="r">
+                        <a:buNone/>
+                      </a:pPr>
+                      <a:r>
+                        <a:rPr/>
+                        <a:t>0.23</a:t>
+                      </a:r>
+                    </a:p>
+                  </a:txBody>
+                </a:tc>
+                <a:tc>
+                  <a:txBody>
+                    <a:bodyPr/>
+                    <a:lstStyle/>
+                    <a:p>
+                      <a:pPr lvl="0" indent="0" marL="0" algn="r">
+                        <a:buNone/>
+                      </a:pPr>
+                      <a:r>
+                        <a:rPr/>
+                        <a:t>0.18</a:t>
+                      </a:r>
+                    </a:p>
+                  </a:txBody>
+                </a:tc>
+              </a:tr>
+              <a:tr h="0">
+                <a:tc>
+                  <a:txBody>
+                    <a:bodyPr/>
+                    <a:lstStyle/>
+                    <a:p>
+                      <a:pPr lvl="0" indent="0" marL="0" algn="l">
+                        <a:buNone/>
+                      </a:pPr>
+                      <a:r>
+                        <a:rPr/>
+                        <a:t>Inactive retired</a:t>
+                      </a:r>
+                    </a:p>
+                  </a:txBody>
+                </a:tc>
+                <a:tc>
+                  <a:txBody>
+                    <a:bodyPr/>
+                    <a:lstStyle/>
+                    <a:p>
+                      <a:pPr lvl="0" indent="0" marL="0" algn="r">
+                        <a:buNone/>
+                      </a:pPr>
+                      <a:r>
+                        <a:rPr/>
+                        <a:t>1.05</a:t>
+                      </a:r>
+                    </a:p>
+                  </a:txBody>
+                </a:tc>
+                <a:tc>
+                  <a:txBody>
+                    <a:bodyPr/>
+                    <a:lstStyle/>
+                    <a:p>
+                      <a:pPr lvl="0" indent="0" marL="0" algn="r">
+                        <a:buNone/>
+                      </a:pPr>
+                      <a:r>
+                        <a:rPr/>
+                        <a:t>1.04</a:t>
+                      </a:r>
+                    </a:p>
+                  </a:txBody>
+                </a:tc>
+                <a:tc>
+                  <a:txBody>
+                    <a:bodyPr/>
+                    <a:lstStyle/>
+                    <a:p>
+                      <a:pPr lvl="0" indent="0" marL="0" algn="r">
+                        <a:buNone/>
+                      </a:pPr>
+                      <a:r>
+                        <a:rPr/>
+                        <a:t>1.34</a:t>
+                      </a:r>
+                    </a:p>
+                  </a:txBody>
+                </a:tc>
+                <a:tc>
+                  <a:txBody>
+                    <a:bodyPr/>
+                    <a:lstStyle/>
+                    <a:p>
+                      <a:pPr lvl="0" indent="0" marL="0" algn="r">
+                        <a:buNone/>
+                      </a:pPr>
+                      <a:r>
+                        <a:rPr/>
+                        <a:t>0.87</a:t>
+                      </a:r>
+                    </a:p>
+                  </a:txBody>
+                </a:tc>
+                <a:tc>
+                  <a:txBody>
+                    <a:bodyPr/>
+                    <a:lstStyle/>
+                    <a:p>
+                      <a:pPr lvl="0" indent="0" marL="0" algn="r">
+                        <a:buNone/>
+                      </a:pPr>
+                      <a:r>
+                        <a:rPr/>
+                        <a:t>1.33</a:t>
+                      </a:r>
+                    </a:p>
+                  </a:txBody>
+                </a:tc>
+                <a:tc>
+                  <a:txBody>
+                    <a:bodyPr/>
+                    <a:lstStyle/>
+                    <a:p>
+                      <a:pPr lvl="0" indent="0" marL="0" algn="r">
+                        <a:buNone/>
+                      </a:pPr>
+                      <a:r>
+                        <a:rPr/>
+                        <a:t>0.87</a:t>
+                      </a:r>
+                    </a:p>
+                  </a:txBody>
+                </a:tc>
+                <a:tc>
+                  <a:txBody>
+                    <a:bodyPr/>
+                    <a:lstStyle/>
+                    <a:p>
+                      <a:pPr lvl="0" indent="0" marL="0" algn="r">
+                        <a:buNone/>
+                      </a:pPr>
+                      <a:r>
+                        <a:rPr/>
+                        <a:t>1.12</a:t>
+                      </a:r>
+                    </a:p>
+                  </a:txBody>
+                </a:tc>
+                <a:tc>
+                  <a:txBody>
+                    <a:bodyPr/>
+                    <a:lstStyle/>
+                    <a:p>
+                      <a:pPr lvl="0" indent="0" marL="0" algn="r">
+                        <a:buNone/>
+                      </a:pPr>
+                      <a:r>
+                        <a:rPr/>
+                        <a:t>1.11</a:t>
+                      </a:r>
+                    </a:p>
+                  </a:txBody>
+                </a:tc>
+              </a:tr>
+              <a:tr h="0">
+                <a:tc>
+                  <a:txBody>
+                    <a:bodyPr/>
+                    <a:lstStyle/>
+                    <a:p>
+                      <a:pPr lvl="0" indent="0" marL="0" algn="l">
+                        <a:buNone/>
+                      </a:pPr>
+                      <a:r>
+                        <a:rPr/>
+                        <a:t>Inactive student</a:t>
+                      </a:r>
+                    </a:p>
+                  </a:txBody>
+                </a:tc>
+                <a:tc>
+                  <a:txBody>
+                    <a:bodyPr/>
+                    <a:lstStyle/>
+                    <a:p>
+                      <a:pPr lvl="0" indent="0" marL="0" algn="r">
+                        <a:buNone/>
+                      </a:pPr>
+                      <a:r>
+                        <a:rPr/>
+                        <a:t>0.27</a:t>
+                      </a:r>
+                    </a:p>
+                  </a:txBody>
+                </a:tc>
+                <a:tc>
+                  <a:txBody>
+                    <a:bodyPr/>
+                    <a:lstStyle/>
+                    <a:p>
+                      <a:pPr lvl="0" indent="0" marL="0" algn="r">
+                        <a:buNone/>
+                      </a:pPr>
+                      <a:r>
+                        <a:rPr/>
+                        <a:t>0.28</a:t>
+                      </a:r>
+                    </a:p>
+                  </a:txBody>
+                </a:tc>
+                <a:tc>
+                  <a:txBody>
+                    <a:bodyPr/>
+                    <a:lstStyle/>
+                    <a:p>
+                      <a:pPr lvl="0" indent="0" marL="0" algn="r">
+                        <a:buNone/>
+                      </a:pPr>
+                      <a:r>
+                        <a:rPr/>
+                        <a:t>0.32</a:t>
+                      </a:r>
+                    </a:p>
+                  </a:txBody>
+                </a:tc>
+                <a:tc>
+                  <a:txBody>
+                    <a:bodyPr/>
+                    <a:lstStyle/>
+                    <a:p>
+                      <a:pPr lvl="0" indent="0" marL="0" algn="r">
+                        <a:buNone/>
+                      </a:pPr>
+                      <a:r>
+                        <a:rPr/>
+                        <a:t>0.24</a:t>
+                      </a:r>
+                    </a:p>
+                  </a:txBody>
+                </a:tc>
+                <a:tc>
+                  <a:txBody>
+                    <a:bodyPr/>
+                    <a:lstStyle/>
+                    <a:p>
+                      <a:pPr lvl="0" indent="0" marL="0" algn="r">
+                        <a:buNone/>
+                      </a:pPr>
+                      <a:r>
+                        <a:rPr/>
+                        <a:t>0.33</a:t>
+                      </a:r>
+                    </a:p>
+                  </a:txBody>
+                </a:tc>
+                <a:tc>
+                  <a:txBody>
+                    <a:bodyPr/>
+                    <a:lstStyle/>
+                    <a:p>
+                      <a:pPr lvl="0" indent="0" marL="0" algn="r">
+                        <a:buNone/>
+                      </a:pPr>
+                      <a:r>
+                        <a:rPr/>
+                        <a:t>0.25</a:t>
+                      </a:r>
+                    </a:p>
+                  </a:txBody>
+                </a:tc>
+                <a:tc>
+                  <a:txBody>
+                    <a:bodyPr/>
+                    <a:lstStyle/>
+                    <a:p>
+                      <a:pPr lvl="0" indent="0" marL="0" algn="r">
+                        <a:buNone/>
+                      </a:pPr>
+                      <a:r>
+                        <a:rPr/>
+                        <a:t>0.28</a:t>
+                      </a:r>
+                    </a:p>
+                  </a:txBody>
+                </a:tc>
+                <a:tc>
+                  <a:txBody>
+                    <a:bodyPr/>
+                    <a:lstStyle/>
+                    <a:p>
+                      <a:pPr lvl="0" indent="0" marL="0" algn="r">
+                        <a:buNone/>
+                      </a:pPr>
+                      <a:r>
+                        <a:rPr/>
+                        <a:t>0.29</a:t>
+                      </a:r>
+                    </a:p>
+                  </a:txBody>
+                </a:tc>
+              </a:tr>
+              <a:tr h="0">
+                <a:tc>
+                  <a:txBody>
+                    <a:bodyPr/>
+                    <a:lstStyle/>
+                    <a:p>
+                      <a:pPr lvl="0" indent="0" marL="0" algn="l">
+                        <a:buNone/>
+                      </a:pPr>
+                      <a:r>
+                        <a:rPr/>
+                        <a:t>Unemployed</a:t>
+                      </a:r>
+                    </a:p>
+                  </a:txBody>
+                </a:tc>
+                <a:tc>
+                  <a:txBody>
+                    <a:bodyPr/>
+                    <a:lstStyle/>
+                    <a:p>
+                      <a:pPr lvl="0" indent="0" marL="0" algn="r">
+                        <a:buNone/>
+                      </a:pPr>
+                      <a:r>
+                        <a:rPr/>
+                        <a:t>1.67</a:t>
+                      </a:r>
+                    </a:p>
+                  </a:txBody>
+                </a:tc>
+                <a:tc>
+                  <a:txBody>
+                    <a:bodyPr/>
+                    <a:lstStyle/>
+                    <a:p>
+                      <a:pPr lvl="0" indent="0" marL="0" algn="r">
+                        <a:buNone/>
+                      </a:pPr>
+                      <a:r>
+                        <a:rPr/>
+                        <a:t>1.24</a:t>
+                      </a:r>
+                    </a:p>
+                  </a:txBody>
+                </a:tc>
+                <a:tc>
+                  <a:txBody>
+                    <a:bodyPr/>
+                    <a:lstStyle/>
+                    <a:p>
+                      <a:pPr lvl="0" indent="0" marL="0" algn="r">
+                        <a:buNone/>
+                      </a:pPr>
+                      <a:r>
+                        <a:rPr/>
+                        <a:t>1.47</a:t>
+                      </a:r>
+                    </a:p>
+                  </a:txBody>
+                </a:tc>
+                <a:tc>
+                  <a:txBody>
+                    <a:bodyPr/>
+                    <a:lstStyle/>
+                    <a:p>
+                      <a:pPr lvl="0" indent="0" marL="0" algn="r">
+                        <a:buNone/>
+                      </a:pPr>
+                      <a:r>
+                        <a:rPr/>
+                        <a:t>1.43</a:t>
+                      </a:r>
+                    </a:p>
+                  </a:txBody>
+                </a:tc>
+                <a:tc>
+                  <a:txBody>
+                    <a:bodyPr/>
+                    <a:lstStyle/>
+                    <a:p>
+                      <a:pPr lvl="0" indent="0" marL="0" algn="r">
+                        <a:buNone/>
+                      </a:pPr>
+                      <a:r>
+                        <a:rPr/>
+                        <a:t>1.09</a:t>
+                      </a:r>
+                    </a:p>
+                  </a:txBody>
+                </a:tc>
+                <a:tc>
+                  <a:txBody>
+                    <a:bodyPr/>
+                    <a:lstStyle/>
+                    <a:p>
+                      <a:pPr lvl="0" indent="0" marL="0" algn="r">
+                        <a:buNone/>
+                      </a:pPr>
+                      <a:r>
+                        <a:rPr/>
+                        <a:t>1.06</a:t>
+                      </a:r>
+                    </a:p>
+                  </a:txBody>
+                </a:tc>
+                <a:tc>
+                  <a:txBody>
+                    <a:bodyPr/>
+                    <a:lstStyle/>
+                    <a:p>
+                      <a:pPr lvl="0" indent="0" marL="0" algn="r">
+                        <a:buNone/>
+                      </a:pPr>
+                      <a:r>
+                        <a:rPr/>
+                        <a:t>1.26</a:t>
+                      </a:r>
+                    </a:p>
+                  </a:txBody>
+                </a:tc>
+                <a:tc>
+                  <a:txBody>
+                    <a:bodyPr/>
+                    <a:lstStyle/>
+                    <a:p>
+                      <a:pPr lvl="0" indent="0" marL="0" algn="r">
+                        <a:buNone/>
+                      </a:pPr>
+                      <a:r>
+                        <a:rPr/>
+                        <a:t>0.94</a:t>
+                      </a:r>
+                    </a:p>
+                  </a:txBody>
+                </a:tc>
+              </a:tr>
+            </a:tbl>
+          </a:graphicData>
+        </a:graphic>
+      </p:graphicFrame>
     </p:spTree>
   </p:cSld>
 </p:sld>

</xml_diff>